<commit_message>
Updated Presentation for Part 1 and 2
</commit_message>
<xml_diff>
--- a/presentation/DesignReview.pptx
+++ b/presentation/DesignReview.pptx
@@ -6,6 +6,17 @@
   </p:sldMasterIdLst>
   <p:sldIdLst>
     <p:sldId id="256" r:id="rId2"/>
+    <p:sldId id="267" r:id="rId3"/>
+    <p:sldId id="257" r:id="rId4"/>
+    <p:sldId id="261" r:id="rId5"/>
+    <p:sldId id="262" r:id="rId6"/>
+    <p:sldId id="264" r:id="rId7"/>
+    <p:sldId id="265" r:id="rId8"/>
+    <p:sldId id="266" r:id="rId9"/>
+    <p:sldId id="268" r:id="rId10"/>
+    <p:sldId id="270" r:id="rId11"/>
+    <p:sldId id="269" r:id="rId12"/>
+    <p:sldId id="271" r:id="rId13"/>
   </p:sldIdLst>
   <p:sldSz cx="12192000" cy="6858000"/>
   <p:notesSz cx="6858000" cy="9144000"/>
@@ -14088,6 +14099,4898 @@
 </p:sld>
 </file>
 
+<file path=ppt/slides/slide10.xml><?xml version="1.0" encoding="utf-8"?>
+<p:sld xmlns:a="http://schemas.openxmlformats.org/drawingml/2006/main" xmlns:r="http://schemas.openxmlformats.org/officeDocument/2006/relationships" xmlns:p="http://schemas.openxmlformats.org/presentationml/2006/main">
+  <p:cSld>
+    <p:bg>
+      <p:bgPr>
+        <a:solidFill>
+          <a:schemeClr val="bg1"/>
+        </a:solidFill>
+        <a:effectLst/>
+      </p:bgPr>
+    </p:bg>
+    <p:spTree>
+      <p:nvGrpSpPr>
+        <p:cNvPr id="1" name=""/>
+        <p:cNvGrpSpPr/>
+        <p:nvPr/>
+      </p:nvGrpSpPr>
+      <p:grpSpPr>
+        <a:xfrm>
+          <a:off x="0" y="0"/>
+          <a:ext cx="0" cy="0"/>
+          <a:chOff x="0" y="0"/>
+          <a:chExt cx="0" cy="0"/>
+        </a:xfrm>
+      </p:grpSpPr>
+      <p:sp useBgFill="1">
+        <p:nvSpPr>
+          <p:cNvPr id="8" name="Rectangle 7">
+            <a:extLst>
+              <a:ext uri="{FF2B5EF4-FFF2-40B4-BE49-F238E27FC236}">
+                <a16:creationId xmlns:a16="http://schemas.microsoft.com/office/drawing/2014/main" id="{6E4CD457-E37B-4177-94C9-92C24E7321B2}"/>
+              </a:ext>
+              <a:ext uri="{C183D7F6-B498-43B3-948B-1728B52AA6E4}">
+                <adec:decorative xmlns:adec="http://schemas.microsoft.com/office/drawing/2017/decorative" val="1"/>
+              </a:ext>
+            </a:extLst>
+          </p:cNvPr>
+          <p:cNvSpPr>
+            <a:spLocks noGrp="1" noRot="1" noChangeAspect="1" noMove="1" noResize="1" noEditPoints="1" noAdjustHandles="1" noChangeArrowheads="1" noChangeShapeType="1" noTextEdit="1"/>
+          </p:cNvSpPr>
+          <p:nvPr>
+            <p:extLst>
+              <p:ext uri="{386F3935-93C4-4BCD-93E2-E3B085C9AB24}">
+                <p16:designElem xmlns:p16="http://schemas.microsoft.com/office/powerpoint/2015/main" val="1"/>
+              </p:ext>
+            </p:extLst>
+          </p:nvPr>
+        </p:nvSpPr>
+        <p:spPr>
+          <a:xfrm>
+            <a:off x="0" y="0"/>
+            <a:ext cx="12188952" cy="6858000"/>
+          </a:xfrm>
+          <a:prstGeom prst="rect">
+            <a:avLst/>
+          </a:prstGeom>
+          <a:ln>
+            <a:noFill/>
+          </a:ln>
+        </p:spPr>
+        <p:style>
+          <a:lnRef idx="2">
+            <a:schemeClr val="accent1">
+              <a:shade val="50000"/>
+            </a:schemeClr>
+          </a:lnRef>
+          <a:fillRef idx="1">
+            <a:schemeClr val="accent1"/>
+          </a:fillRef>
+          <a:effectRef idx="0">
+            <a:schemeClr val="accent1"/>
+          </a:effectRef>
+          <a:fontRef idx="minor">
+            <a:schemeClr val="lt1"/>
+          </a:fontRef>
+        </p:style>
+        <p:txBody>
+          <a:bodyPr rtlCol="0" anchor="ctr"/>
+          <a:lstStyle/>
+          <a:p>
+            <a:pPr algn="ctr"/>
+            <a:endParaRPr lang="en-US"/>
+          </a:p>
+        </p:txBody>
+      </p:sp>
+      <p:pic>
+        <p:nvPicPr>
+          <p:cNvPr id="3" name="Picture 2" descr="A picture containing game, chair, sport, basketball&#10;&#10;Description automatically generated">
+            <a:extLst>
+              <a:ext uri="{FF2B5EF4-FFF2-40B4-BE49-F238E27FC236}">
+                <a16:creationId xmlns:a16="http://schemas.microsoft.com/office/drawing/2014/main" id="{CAB0468C-7967-D645-86CC-BBC25B43F6B2}"/>
+              </a:ext>
+            </a:extLst>
+          </p:cNvPr>
+          <p:cNvPicPr>
+            <a:picLocks noChangeAspect="1"/>
+          </p:cNvPicPr>
+          <p:nvPr/>
+        </p:nvPicPr>
+        <p:blipFill rotWithShape="1">
+          <a:blip r:embed="rId2"/>
+          <a:srcRect/>
+          <a:stretch/>
+        </p:blipFill>
+        <p:spPr>
+          <a:xfrm>
+            <a:off x="20" y="10"/>
+            <a:ext cx="12191980" cy="6857990"/>
+          </a:xfrm>
+          <a:prstGeom prst="rect">
+            <a:avLst/>
+          </a:prstGeom>
+        </p:spPr>
+      </p:pic>
+    </p:spTree>
+    <p:extLst>
+      <p:ext uri="{BB962C8B-B14F-4D97-AF65-F5344CB8AC3E}">
+        <p14:creationId xmlns:p14="http://schemas.microsoft.com/office/powerpoint/2010/main" val="3496354055"/>
+      </p:ext>
+    </p:extLst>
+  </p:cSld>
+  <p:clrMapOvr>
+    <a:masterClrMapping/>
+  </p:clrMapOvr>
+</p:sld>
+</file>
+
+<file path=ppt/slides/slide11.xml><?xml version="1.0" encoding="utf-8"?>
+<p:sld xmlns:a="http://schemas.openxmlformats.org/drawingml/2006/main" xmlns:r="http://schemas.openxmlformats.org/officeDocument/2006/relationships" xmlns:p="http://schemas.openxmlformats.org/presentationml/2006/main">
+  <p:cSld>
+    <p:bg>
+      <p:bgPr>
+        <a:solidFill>
+          <a:schemeClr val="bg1"/>
+        </a:solidFill>
+        <a:effectLst/>
+      </p:bgPr>
+    </p:bg>
+    <p:spTree>
+      <p:nvGrpSpPr>
+        <p:cNvPr id="1" name=""/>
+        <p:cNvGrpSpPr/>
+        <p:nvPr/>
+      </p:nvGrpSpPr>
+      <p:grpSpPr>
+        <a:xfrm>
+          <a:off x="0" y="0"/>
+          <a:ext cx="0" cy="0"/>
+          <a:chOff x="0" y="0"/>
+          <a:chExt cx="0" cy="0"/>
+        </a:xfrm>
+      </p:grpSpPr>
+      <p:sp useBgFill="1">
+        <p:nvSpPr>
+          <p:cNvPr id="11" name="Rectangle 10">
+            <a:extLst>
+              <a:ext uri="{FF2B5EF4-FFF2-40B4-BE49-F238E27FC236}">
+                <a16:creationId xmlns:a16="http://schemas.microsoft.com/office/drawing/2014/main" id="{6E4CD457-E37B-4177-94C9-92C24E7321B2}"/>
+              </a:ext>
+              <a:ext uri="{C183D7F6-B498-43B3-948B-1728B52AA6E4}">
+                <adec:decorative xmlns:adec="http://schemas.microsoft.com/office/drawing/2017/decorative" val="1"/>
+              </a:ext>
+            </a:extLst>
+          </p:cNvPr>
+          <p:cNvSpPr>
+            <a:spLocks noGrp="1" noRot="1" noChangeAspect="1" noMove="1" noResize="1" noEditPoints="1" noAdjustHandles="1" noChangeArrowheads="1" noChangeShapeType="1" noTextEdit="1"/>
+          </p:cNvSpPr>
+          <p:nvPr>
+            <p:extLst>
+              <p:ext uri="{386F3935-93C4-4BCD-93E2-E3B085C9AB24}">
+                <p16:designElem xmlns:p16="http://schemas.microsoft.com/office/powerpoint/2015/main" val="1"/>
+              </p:ext>
+            </p:extLst>
+          </p:nvPr>
+        </p:nvSpPr>
+        <p:spPr>
+          <a:xfrm>
+            <a:off x="0" y="0"/>
+            <a:ext cx="12188952" cy="6858000"/>
+          </a:xfrm>
+          <a:prstGeom prst="rect">
+            <a:avLst/>
+          </a:prstGeom>
+          <a:ln>
+            <a:noFill/>
+          </a:ln>
+        </p:spPr>
+        <p:style>
+          <a:lnRef idx="2">
+            <a:schemeClr val="accent1">
+              <a:shade val="50000"/>
+            </a:schemeClr>
+          </a:lnRef>
+          <a:fillRef idx="1">
+            <a:schemeClr val="accent1"/>
+          </a:fillRef>
+          <a:effectRef idx="0">
+            <a:schemeClr val="accent1"/>
+          </a:effectRef>
+          <a:fontRef idx="minor">
+            <a:schemeClr val="lt1"/>
+          </a:fontRef>
+        </p:style>
+        <p:txBody>
+          <a:bodyPr rtlCol="0" anchor="ctr"/>
+          <a:lstStyle/>
+          <a:p>
+            <a:pPr algn="ctr"/>
+            <a:endParaRPr lang="en-US"/>
+          </a:p>
+        </p:txBody>
+      </p:sp>
+      <p:pic>
+        <p:nvPicPr>
+          <p:cNvPr id="6" name="Picture 5" descr="A room filled with furniture and a large window&#10;&#10;Description automatically generated">
+            <a:extLst>
+              <a:ext uri="{FF2B5EF4-FFF2-40B4-BE49-F238E27FC236}">
+                <a16:creationId xmlns:a16="http://schemas.microsoft.com/office/drawing/2014/main" id="{FD2246F9-0173-D045-BD33-F70C2FF8CB16}"/>
+              </a:ext>
+            </a:extLst>
+          </p:cNvPr>
+          <p:cNvPicPr>
+            <a:picLocks noChangeAspect="1"/>
+          </p:cNvPicPr>
+          <p:nvPr/>
+        </p:nvPicPr>
+        <p:blipFill rotWithShape="1">
+          <a:blip r:embed="rId2"/>
+          <a:srcRect l="13414" r="6141" b="-1"/>
+          <a:stretch/>
+        </p:blipFill>
+        <p:spPr>
+          <a:xfrm>
+            <a:off x="20" y="10"/>
+            <a:ext cx="12191980" cy="6857990"/>
+          </a:xfrm>
+          <a:prstGeom prst="rect">
+            <a:avLst/>
+          </a:prstGeom>
+        </p:spPr>
+      </p:pic>
+    </p:spTree>
+    <p:extLst>
+      <p:ext uri="{BB962C8B-B14F-4D97-AF65-F5344CB8AC3E}">
+        <p14:creationId xmlns:p14="http://schemas.microsoft.com/office/powerpoint/2010/main" val="4155341856"/>
+      </p:ext>
+    </p:extLst>
+  </p:cSld>
+  <p:clrMapOvr>
+    <a:masterClrMapping/>
+  </p:clrMapOvr>
+</p:sld>
+</file>
+
+<file path=ppt/slides/slide12.xml><?xml version="1.0" encoding="utf-8"?>
+<p:sld xmlns:a="http://schemas.openxmlformats.org/drawingml/2006/main" xmlns:r="http://schemas.openxmlformats.org/officeDocument/2006/relationships" xmlns:p="http://schemas.openxmlformats.org/presentationml/2006/main">
+  <p:cSld>
+    <p:bg>
+      <p:bgPr>
+        <a:solidFill>
+          <a:schemeClr val="bg1"/>
+        </a:solidFill>
+        <a:effectLst/>
+      </p:bgPr>
+    </p:bg>
+    <p:spTree>
+      <p:nvGrpSpPr>
+        <p:cNvPr id="1" name=""/>
+        <p:cNvGrpSpPr/>
+        <p:nvPr/>
+      </p:nvGrpSpPr>
+      <p:grpSpPr>
+        <a:xfrm>
+          <a:off x="0" y="0"/>
+          <a:ext cx="0" cy="0"/>
+          <a:chOff x="0" y="0"/>
+          <a:chExt cx="0" cy="0"/>
+        </a:xfrm>
+      </p:grpSpPr>
+      <p:sp useBgFill="1">
+        <p:nvSpPr>
+          <p:cNvPr id="8" name="Rectangle 7">
+            <a:extLst>
+              <a:ext uri="{FF2B5EF4-FFF2-40B4-BE49-F238E27FC236}">
+                <a16:creationId xmlns:a16="http://schemas.microsoft.com/office/drawing/2014/main" id="{6E4CD457-E37B-4177-94C9-92C24E7321B2}"/>
+              </a:ext>
+              <a:ext uri="{C183D7F6-B498-43B3-948B-1728B52AA6E4}">
+                <adec:decorative xmlns:adec="http://schemas.microsoft.com/office/drawing/2017/decorative" val="1"/>
+              </a:ext>
+            </a:extLst>
+          </p:cNvPr>
+          <p:cNvSpPr>
+            <a:spLocks noGrp="1" noRot="1" noChangeAspect="1" noMove="1" noResize="1" noEditPoints="1" noAdjustHandles="1" noChangeArrowheads="1" noChangeShapeType="1" noTextEdit="1"/>
+          </p:cNvSpPr>
+          <p:nvPr>
+            <p:extLst>
+              <p:ext uri="{386F3935-93C4-4BCD-93E2-E3B085C9AB24}">
+                <p16:designElem xmlns:p16="http://schemas.microsoft.com/office/powerpoint/2015/main" val="1"/>
+              </p:ext>
+            </p:extLst>
+          </p:nvPr>
+        </p:nvSpPr>
+        <p:spPr>
+          <a:xfrm>
+            <a:off x="0" y="0"/>
+            <a:ext cx="12188952" cy="6858000"/>
+          </a:xfrm>
+          <a:prstGeom prst="rect">
+            <a:avLst/>
+          </a:prstGeom>
+          <a:ln>
+            <a:noFill/>
+          </a:ln>
+        </p:spPr>
+        <p:style>
+          <a:lnRef idx="2">
+            <a:schemeClr val="accent1">
+              <a:shade val="50000"/>
+            </a:schemeClr>
+          </a:lnRef>
+          <a:fillRef idx="1">
+            <a:schemeClr val="accent1"/>
+          </a:fillRef>
+          <a:effectRef idx="0">
+            <a:schemeClr val="accent1"/>
+          </a:effectRef>
+          <a:fontRef idx="minor">
+            <a:schemeClr val="lt1"/>
+          </a:fontRef>
+        </p:style>
+        <p:txBody>
+          <a:bodyPr rtlCol="0" anchor="ctr"/>
+          <a:lstStyle/>
+          <a:p>
+            <a:pPr algn="ctr"/>
+            <a:endParaRPr lang="en-US"/>
+          </a:p>
+        </p:txBody>
+      </p:sp>
+      <p:pic>
+        <p:nvPicPr>
+          <p:cNvPr id="3" name="Picture 2" descr="A group of people walking in front of a building&#10;&#10;Description automatically generated">
+            <a:extLst>
+              <a:ext uri="{FF2B5EF4-FFF2-40B4-BE49-F238E27FC236}">
+                <a16:creationId xmlns:a16="http://schemas.microsoft.com/office/drawing/2014/main" id="{EA6BD81B-9444-C540-9D36-FCD9481571A5}"/>
+              </a:ext>
+            </a:extLst>
+          </p:cNvPr>
+          <p:cNvPicPr>
+            <a:picLocks noChangeAspect="1"/>
+          </p:cNvPicPr>
+          <p:nvPr/>
+        </p:nvPicPr>
+        <p:blipFill rotWithShape="1">
+          <a:blip r:embed="rId2"/>
+          <a:srcRect t="10609" b="4804"/>
+          <a:stretch/>
+        </p:blipFill>
+        <p:spPr>
+          <a:xfrm>
+            <a:off x="20" y="10"/>
+            <a:ext cx="12191980" cy="6857990"/>
+          </a:xfrm>
+          <a:prstGeom prst="rect">
+            <a:avLst/>
+          </a:prstGeom>
+        </p:spPr>
+      </p:pic>
+    </p:spTree>
+    <p:extLst>
+      <p:ext uri="{BB962C8B-B14F-4D97-AF65-F5344CB8AC3E}">
+        <p14:creationId xmlns:p14="http://schemas.microsoft.com/office/powerpoint/2010/main" val="3848777956"/>
+      </p:ext>
+    </p:extLst>
+  </p:cSld>
+  <p:clrMapOvr>
+    <a:masterClrMapping/>
+  </p:clrMapOvr>
+</p:sld>
+</file>
+
+<file path=ppt/slides/slide2.xml><?xml version="1.0" encoding="utf-8"?>
+<p:sld xmlns:a="http://schemas.openxmlformats.org/drawingml/2006/main" xmlns:r="http://schemas.openxmlformats.org/officeDocument/2006/relationships" xmlns:p="http://schemas.openxmlformats.org/presentationml/2006/main">
+  <p:cSld>
+    <p:bg>
+      <p:bgPr>
+        <a:solidFill>
+          <a:schemeClr val="bg1"/>
+        </a:solidFill>
+        <a:effectLst/>
+      </p:bgPr>
+    </p:bg>
+    <p:spTree>
+      <p:nvGrpSpPr>
+        <p:cNvPr id="1" name=""/>
+        <p:cNvGrpSpPr/>
+        <p:nvPr/>
+      </p:nvGrpSpPr>
+      <p:grpSpPr>
+        <a:xfrm>
+          <a:off x="0" y="0"/>
+          <a:ext cx="0" cy="0"/>
+          <a:chOff x="0" y="0"/>
+          <a:chExt cx="0" cy="0"/>
+        </a:xfrm>
+      </p:grpSpPr>
+      <p:sp>
+        <p:nvSpPr>
+          <p:cNvPr id="7" name="Graphic 1">
+            <a:extLst>
+              <a:ext uri="{FF2B5EF4-FFF2-40B4-BE49-F238E27FC236}">
+                <a16:creationId xmlns:a16="http://schemas.microsoft.com/office/drawing/2014/main" id="{0D57E7FA-E8FC-45AC-868F-CDC8144939D6}"/>
+              </a:ext>
+              <a:ext uri="{C183D7F6-B498-43B3-948B-1728B52AA6E4}">
+                <adec:decorative xmlns:adec="http://schemas.microsoft.com/office/drawing/2017/decorative" val="1"/>
+              </a:ext>
+            </a:extLst>
+          </p:cNvPr>
+          <p:cNvSpPr>
+            <a:spLocks noGrp="1" noRot="1" noChangeAspect="1" noMove="1" noResize="1" noEditPoints="1" noAdjustHandles="1" noChangeArrowheads="1" noChangeShapeType="1" noTextEdit="1"/>
+          </p:cNvSpPr>
+          <p:nvPr>
+            <p:extLst>
+              <p:ext uri="{386F3935-93C4-4BCD-93E2-E3B085C9AB24}">
+                <p16:designElem xmlns:p16="http://schemas.microsoft.com/office/powerpoint/2015/main" val="1"/>
+              </p:ext>
+            </p:extLst>
+          </p:nvPr>
+        </p:nvSpPr>
+        <p:spPr>
+          <a:xfrm rot="10800000" flipV="1">
+            <a:off x="2599854" y="527562"/>
+            <a:ext cx="6992292" cy="5102484"/>
+          </a:xfrm>
+          <a:custGeom>
+            <a:avLst/>
+            <a:gdLst/>
+            <a:ahLst/>
+            <a:cxnLst/>
+            <a:rect l="l" t="t" r="r" b="b"/>
+            <a:pathLst>
+              <a:path w="6886274" h="5025119">
+                <a:moveTo>
+                  <a:pt x="5458905" y="754119"/>
+                </a:moveTo>
+                <a:cubicBezTo>
+                  <a:pt x="5417216" y="775336"/>
+                  <a:pt x="4594585" y="1111088"/>
+                  <a:pt x="3455557" y="1027709"/>
+                </a:cubicBezTo>
+                <a:cubicBezTo>
+                  <a:pt x="3415356" y="1024731"/>
+                  <a:pt x="3377389" y="1022869"/>
+                  <a:pt x="3338677" y="1021381"/>
+                </a:cubicBezTo>
+                <a:cubicBezTo>
+                  <a:pt x="2996224" y="1006119"/>
+                  <a:pt x="2660100" y="998674"/>
+                  <a:pt x="2518280" y="980435"/>
+                </a:cubicBezTo>
+                <a:cubicBezTo>
+                  <a:pt x="2407355" y="965918"/>
+                  <a:pt x="1840075" y="843082"/>
+                  <a:pt x="1673687" y="739229"/>
+                </a:cubicBezTo>
+                <a:cubicBezTo>
+                  <a:pt x="1503578" y="632771"/>
+                  <a:pt x="1343146" y="515146"/>
+                  <a:pt x="1183459" y="397149"/>
+                </a:cubicBezTo>
+                <a:cubicBezTo>
+                  <a:pt x="1114224" y="346153"/>
+                  <a:pt x="1040522" y="299624"/>
+                  <a:pt x="977987" y="241184"/>
+                </a:cubicBezTo>
+                <a:cubicBezTo>
+                  <a:pt x="915453" y="182372"/>
+                  <a:pt x="855896" y="121326"/>
+                  <a:pt x="788150" y="66980"/>
+                </a:cubicBezTo>
+                <a:cubicBezTo>
+                  <a:pt x="768794" y="51346"/>
+                  <a:pt x="749438" y="34596"/>
+                  <a:pt x="721148" y="31990"/>
+                </a:cubicBezTo>
+                <a:cubicBezTo>
+                  <a:pt x="714820" y="31246"/>
+                  <a:pt x="708120" y="31618"/>
+                  <a:pt x="701792" y="32362"/>
+                </a:cubicBezTo>
+                <a:cubicBezTo>
+                  <a:pt x="694720" y="33107"/>
+                  <a:pt x="689136" y="36829"/>
+                  <a:pt x="686530" y="43157"/>
+                </a:cubicBezTo>
+                <a:cubicBezTo>
+                  <a:pt x="683925" y="50230"/>
+                  <a:pt x="688392" y="54324"/>
+                  <a:pt x="693603" y="58046"/>
+                </a:cubicBezTo>
+                <a:cubicBezTo>
+                  <a:pt x="697325" y="60652"/>
+                  <a:pt x="701047" y="64747"/>
+                  <a:pt x="705886" y="65491"/>
+                </a:cubicBezTo>
+                <a:cubicBezTo>
+                  <a:pt x="736782" y="69958"/>
+                  <a:pt x="748321" y="92664"/>
+                  <a:pt x="762838" y="112764"/>
+                </a:cubicBezTo>
+                <a:cubicBezTo>
+                  <a:pt x="769166" y="121326"/>
+                  <a:pt x="775866" y="128026"/>
+                  <a:pt x="764327" y="140309"/>
+                </a:cubicBezTo>
+                <a:cubicBezTo>
+                  <a:pt x="754277" y="151104"/>
+                  <a:pt x="764699" y="156688"/>
+                  <a:pt x="775121" y="159666"/>
+                </a:cubicBezTo>
+                <a:cubicBezTo>
+                  <a:pt x="789638" y="163760"/>
+                  <a:pt x="806761" y="163016"/>
+                  <a:pt x="823139" y="176416"/>
+                </a:cubicBezTo>
+                <a:cubicBezTo>
+                  <a:pt x="761721" y="177533"/>
+                  <a:pt x="735665" y="142171"/>
+                  <a:pt x="707748" y="109414"/>
+                </a:cubicBezTo>
+                <a:cubicBezTo>
+                  <a:pt x="697325" y="97503"/>
+                  <a:pt x="690253" y="83358"/>
+                  <a:pt x="681319" y="69958"/>
+                </a:cubicBezTo>
+                <a:cubicBezTo>
+                  <a:pt x="670152" y="53580"/>
+                  <a:pt x="657124" y="52835"/>
+                  <a:pt x="640746" y="67352"/>
+                </a:cubicBezTo>
+                <a:cubicBezTo>
+                  <a:pt x="626229" y="80380"/>
+                  <a:pt x="619157" y="79264"/>
+                  <a:pt x="614318" y="61396"/>
+                </a:cubicBezTo>
+                <a:cubicBezTo>
+                  <a:pt x="606873" y="33479"/>
+                  <a:pt x="589750" y="13751"/>
+                  <a:pt x="560716" y="3701"/>
+                </a:cubicBezTo>
+                <a:cubicBezTo>
+                  <a:pt x="554388" y="1467"/>
+                  <a:pt x="546572" y="-3372"/>
+                  <a:pt x="540616" y="3701"/>
+                </a:cubicBezTo>
+                <a:cubicBezTo>
+                  <a:pt x="535405" y="9656"/>
+                  <a:pt x="539871" y="16729"/>
+                  <a:pt x="543594" y="21940"/>
+                </a:cubicBezTo>
+                <a:cubicBezTo>
+                  <a:pt x="550294" y="31246"/>
+                  <a:pt x="556250" y="40179"/>
+                  <a:pt x="558855" y="51346"/>
+                </a:cubicBezTo>
+                <a:cubicBezTo>
+                  <a:pt x="560716" y="58791"/>
+                  <a:pt x="562578" y="66980"/>
+                  <a:pt x="557366" y="72563"/>
+                </a:cubicBezTo>
+                <a:cubicBezTo>
+                  <a:pt x="535777" y="96386"/>
+                  <a:pt x="551411" y="107553"/>
+                  <a:pt x="570022" y="120209"/>
+                </a:cubicBezTo>
+                <a:cubicBezTo>
+                  <a:pt x="595706" y="137332"/>
+                  <a:pt x="605756" y="162643"/>
+                  <a:pt x="599801" y="192794"/>
+                </a:cubicBezTo>
+                <a:cubicBezTo>
+                  <a:pt x="597567" y="205078"/>
+                  <a:pt x="599056" y="212522"/>
+                  <a:pt x="614318" y="212150"/>
+                </a:cubicBezTo>
+                <a:cubicBezTo>
+                  <a:pt x="620273" y="212150"/>
+                  <a:pt x="621762" y="216245"/>
+                  <a:pt x="623996" y="220711"/>
+                </a:cubicBezTo>
+                <a:cubicBezTo>
+                  <a:pt x="671641" y="326053"/>
+                  <a:pt x="740504" y="418366"/>
+                  <a:pt x="821278" y="503235"/>
+                </a:cubicBezTo>
+                <a:cubicBezTo>
+                  <a:pt x="886791" y="572098"/>
+                  <a:pt x="959004" y="634260"/>
+                  <a:pt x="1033822" y="694562"/>
+                </a:cubicBezTo>
+                <a:cubicBezTo>
+                  <a:pt x="1036055" y="696423"/>
+                  <a:pt x="1038289" y="698656"/>
+                  <a:pt x="1039406" y="702378"/>
+                </a:cubicBezTo>
+                <a:cubicBezTo>
+                  <a:pt x="1004044" y="694934"/>
+                  <a:pt x="973521" y="679672"/>
+                  <a:pt x="944114" y="662550"/>
+                </a:cubicBezTo>
+                <a:cubicBezTo>
+                  <a:pt x="865946" y="617138"/>
+                  <a:pt x="800061" y="558325"/>
+                  <a:pt x="733432" y="500629"/>
+                </a:cubicBezTo>
+                <a:cubicBezTo>
+                  <a:pt x="692858" y="465267"/>
+                  <a:pt x="651169" y="431022"/>
+                  <a:pt x="606501" y="399755"/>
+                </a:cubicBezTo>
+                <a:cubicBezTo>
+                  <a:pt x="599056" y="394543"/>
+                  <a:pt x="593845" y="387843"/>
+                  <a:pt x="588634" y="381143"/>
+                </a:cubicBezTo>
+                <a:cubicBezTo>
+                  <a:pt x="585656" y="377421"/>
+                  <a:pt x="581934" y="374071"/>
+                  <a:pt x="575978" y="375560"/>
+                </a:cubicBezTo>
+                <a:cubicBezTo>
+                  <a:pt x="568533" y="377421"/>
+                  <a:pt x="567789" y="383004"/>
+                  <a:pt x="567044" y="388588"/>
+                </a:cubicBezTo>
+                <a:cubicBezTo>
+                  <a:pt x="564811" y="406455"/>
+                  <a:pt x="569650" y="422461"/>
+                  <a:pt x="578956" y="437722"/>
+                </a:cubicBezTo>
+                <a:cubicBezTo>
+                  <a:pt x="603151" y="476806"/>
+                  <a:pt x="638885" y="506957"/>
+                  <a:pt x="675736" y="535619"/>
+                </a:cubicBezTo>
+                <a:cubicBezTo>
+                  <a:pt x="723381" y="572470"/>
+                  <a:pt x="769538" y="610810"/>
+                  <a:pt x="811600" y="652872"/>
+                </a:cubicBezTo>
+                <a:cubicBezTo>
+                  <a:pt x="814578" y="655850"/>
+                  <a:pt x="820161" y="657711"/>
+                  <a:pt x="818300" y="666272"/>
+                </a:cubicBezTo>
+                <a:cubicBezTo>
+                  <a:pt x="791872" y="646544"/>
+                  <a:pt x="766932" y="627188"/>
+                  <a:pt x="741621" y="608576"/>
+                </a:cubicBezTo>
+                <a:cubicBezTo>
+                  <a:pt x="716681" y="589965"/>
+                  <a:pt x="691369" y="571353"/>
+                  <a:pt x="666430" y="553114"/>
+                </a:cubicBezTo>
+                <a:cubicBezTo>
+                  <a:pt x="660474" y="548647"/>
+                  <a:pt x="654146" y="542319"/>
+                  <a:pt x="645585" y="547903"/>
+                </a:cubicBezTo>
+                <a:cubicBezTo>
+                  <a:pt x="636652" y="553486"/>
+                  <a:pt x="637768" y="562792"/>
+                  <a:pt x="640002" y="570236"/>
+                </a:cubicBezTo>
+                <a:cubicBezTo>
+                  <a:pt x="647074" y="592198"/>
+                  <a:pt x="659358" y="611554"/>
+                  <a:pt x="675736" y="628677"/>
+                </a:cubicBezTo>
+                <a:cubicBezTo>
+                  <a:pt x="731570" y="685256"/>
+                  <a:pt x="795966" y="734018"/>
+                  <a:pt x="855896" y="786875"/>
+                </a:cubicBezTo>
+                <a:cubicBezTo>
+                  <a:pt x="888280" y="815537"/>
+                  <a:pt x="918058" y="846060"/>
+                  <a:pt x="946348" y="877699"/>
+                </a:cubicBezTo>
+                <a:cubicBezTo>
+                  <a:pt x="952676" y="884772"/>
+                  <a:pt x="952303" y="891472"/>
+                  <a:pt x="950442" y="899661"/>
+                </a:cubicBezTo>
+                <a:cubicBezTo>
+                  <a:pt x="942998" y="932790"/>
+                  <a:pt x="954537" y="943957"/>
+                  <a:pt x="991760" y="937629"/>
+                </a:cubicBezTo>
+                <a:cubicBezTo>
+                  <a:pt x="1003299" y="935767"/>
+                  <a:pt x="1011116" y="937629"/>
+                  <a:pt x="1018188" y="945445"/>
+                </a:cubicBezTo>
+                <a:cubicBezTo>
+                  <a:pt x="1103802" y="1042225"/>
+                  <a:pt x="1205048" y="1123744"/>
+                  <a:pt x="1315601" y="1196329"/>
+                </a:cubicBezTo>
+                <a:cubicBezTo>
+                  <a:pt x="1360641" y="1225735"/>
+                  <a:pt x="1407170" y="1253653"/>
+                  <a:pt x="1454443" y="1279709"/>
+                </a:cubicBezTo>
+                <a:cubicBezTo>
+                  <a:pt x="1454443" y="1281570"/>
+                  <a:pt x="1454443" y="1283804"/>
+                  <a:pt x="1454443" y="1285665"/>
+                </a:cubicBezTo>
+                <a:cubicBezTo>
+                  <a:pt x="1454071" y="1288270"/>
+                  <a:pt x="1453699" y="1289759"/>
+                  <a:pt x="1453327" y="1291993"/>
+                </a:cubicBezTo>
+                <a:cubicBezTo>
+                  <a:pt x="1386697" y="1251792"/>
+                  <a:pt x="1320812" y="1210474"/>
+                  <a:pt x="1256416" y="1166923"/>
+                </a:cubicBezTo>
+                <a:cubicBezTo>
+                  <a:pt x="1081840" y="1048926"/>
+                  <a:pt x="915080" y="922367"/>
+                  <a:pt x="745715" y="798786"/>
+                </a:cubicBezTo>
+                <a:cubicBezTo>
+                  <a:pt x="688764" y="757096"/>
+                  <a:pt x="643724" y="703867"/>
+                  <a:pt x="592356" y="656966"/>
+                </a:cubicBezTo>
+                <a:cubicBezTo>
+                  <a:pt x="558111" y="625699"/>
+                  <a:pt x="525354" y="592943"/>
+                  <a:pt x="485526" y="567259"/>
+                </a:cubicBezTo>
+                <a:cubicBezTo>
+                  <a:pt x="469148" y="556836"/>
+                  <a:pt x="452025" y="547530"/>
+                  <a:pt x="430063" y="550136"/>
+                </a:cubicBezTo>
+                <a:cubicBezTo>
+                  <a:pt x="421502" y="551253"/>
+                  <a:pt x="411824" y="553486"/>
+                  <a:pt x="408846" y="563164"/>
+                </a:cubicBezTo>
+                <a:cubicBezTo>
+                  <a:pt x="406240" y="572842"/>
+                  <a:pt x="414057" y="577309"/>
+                  <a:pt x="421130" y="581403"/>
+                </a:cubicBezTo>
+                <a:cubicBezTo>
+                  <a:pt x="422991" y="582520"/>
+                  <a:pt x="424852" y="584009"/>
+                  <a:pt x="426713" y="584009"/>
+                </a:cubicBezTo>
+                <a:cubicBezTo>
+                  <a:pt x="462075" y="586242"/>
+                  <a:pt x="470264" y="614532"/>
+                  <a:pt x="487015" y="635005"/>
+                </a:cubicBezTo>
+                <a:cubicBezTo>
+                  <a:pt x="492226" y="641333"/>
+                  <a:pt x="492598" y="647661"/>
+                  <a:pt x="487015" y="655105"/>
+                </a:cubicBezTo>
+                <a:cubicBezTo>
+                  <a:pt x="476964" y="668505"/>
+                  <a:pt x="484037" y="674461"/>
+                  <a:pt x="497437" y="678183"/>
+                </a:cubicBezTo>
+                <a:cubicBezTo>
+                  <a:pt x="510837" y="681906"/>
+                  <a:pt x="525354" y="683022"/>
+                  <a:pt x="539871" y="691584"/>
+                </a:cubicBezTo>
+                <a:cubicBezTo>
+                  <a:pt x="516793" y="698656"/>
+                  <a:pt x="500787" y="691212"/>
+                  <a:pt x="485898" y="681906"/>
+                </a:cubicBezTo>
+                <a:cubicBezTo>
+                  <a:pt x="452397" y="661433"/>
+                  <a:pt x="430808" y="631282"/>
+                  <a:pt x="410335" y="600387"/>
+                </a:cubicBezTo>
+                <a:cubicBezTo>
+                  <a:pt x="406240" y="594431"/>
+                  <a:pt x="402890" y="587731"/>
+                  <a:pt x="397307" y="582892"/>
+                </a:cubicBezTo>
+                <a:cubicBezTo>
+                  <a:pt x="386884" y="573214"/>
+                  <a:pt x="375717" y="572098"/>
+                  <a:pt x="363062" y="584009"/>
+                </a:cubicBezTo>
+                <a:cubicBezTo>
+                  <a:pt x="346311" y="599643"/>
+                  <a:pt x="340356" y="598526"/>
+                  <a:pt x="334772" y="578426"/>
+                </a:cubicBezTo>
+                <a:cubicBezTo>
+                  <a:pt x="327327" y="551253"/>
+                  <a:pt x="310577" y="532269"/>
+                  <a:pt x="281915" y="522219"/>
+                </a:cubicBezTo>
+                <a:cubicBezTo>
+                  <a:pt x="275960" y="519985"/>
+                  <a:pt x="269632" y="517007"/>
+                  <a:pt x="263304" y="521846"/>
+                </a:cubicBezTo>
+                <a:cubicBezTo>
+                  <a:pt x="256604" y="527430"/>
+                  <a:pt x="261070" y="533013"/>
+                  <a:pt x="263676" y="538225"/>
+                </a:cubicBezTo>
+                <a:cubicBezTo>
+                  <a:pt x="267398" y="546414"/>
+                  <a:pt x="271865" y="554603"/>
+                  <a:pt x="275215" y="563164"/>
+                </a:cubicBezTo>
+                <a:cubicBezTo>
+                  <a:pt x="281171" y="576937"/>
+                  <a:pt x="282288" y="591454"/>
+                  <a:pt x="271121" y="604854"/>
+                </a:cubicBezTo>
+                <a:cubicBezTo>
+                  <a:pt x="262931" y="614532"/>
+                  <a:pt x="263676" y="620860"/>
+                  <a:pt x="274471" y="627560"/>
+                </a:cubicBezTo>
+                <a:cubicBezTo>
+                  <a:pt x="309088" y="648405"/>
+                  <a:pt x="331050" y="675578"/>
+                  <a:pt x="319138" y="718012"/>
+                </a:cubicBezTo>
+                <a:cubicBezTo>
+                  <a:pt x="317277" y="723968"/>
+                  <a:pt x="319511" y="729924"/>
+                  <a:pt x="326583" y="729551"/>
+                </a:cubicBezTo>
+                <a:cubicBezTo>
+                  <a:pt x="342217" y="728435"/>
+                  <a:pt x="344822" y="738113"/>
+                  <a:pt x="349289" y="748163"/>
+                </a:cubicBezTo>
+                <a:cubicBezTo>
+                  <a:pt x="392840" y="844571"/>
+                  <a:pt x="455747" y="928695"/>
+                  <a:pt x="528332" y="1007608"/>
+                </a:cubicBezTo>
+                <a:cubicBezTo>
+                  <a:pt x="600173" y="1085777"/>
+                  <a:pt x="680947" y="1155756"/>
+                  <a:pt x="766932" y="1222758"/>
+                </a:cubicBezTo>
+                <a:cubicBezTo>
+                  <a:pt x="742737" y="1220524"/>
+                  <a:pt x="711470" y="1206752"/>
+                  <a:pt x="681319" y="1190746"/>
+                </a:cubicBezTo>
+                <a:cubicBezTo>
+                  <a:pt x="601662" y="1147939"/>
+                  <a:pt x="536149" y="1089871"/>
+                  <a:pt x="469520" y="1032920"/>
+                </a:cubicBezTo>
+                <a:cubicBezTo>
+                  <a:pt x="422991" y="993091"/>
+                  <a:pt x="377579" y="952146"/>
+                  <a:pt x="325466" y="917900"/>
+                </a:cubicBezTo>
+                <a:cubicBezTo>
+                  <a:pt x="319511" y="914178"/>
+                  <a:pt x="315416" y="909339"/>
+                  <a:pt x="312066" y="903383"/>
+                </a:cubicBezTo>
+                <a:cubicBezTo>
+                  <a:pt x="309088" y="898172"/>
+                  <a:pt x="304621" y="893333"/>
+                  <a:pt x="296805" y="895566"/>
+                </a:cubicBezTo>
+                <a:cubicBezTo>
+                  <a:pt x="288988" y="898172"/>
+                  <a:pt x="288243" y="904872"/>
+                  <a:pt x="288243" y="910828"/>
+                </a:cubicBezTo>
+                <a:cubicBezTo>
+                  <a:pt x="289360" y="933162"/>
+                  <a:pt x="295688" y="953262"/>
+                  <a:pt x="309460" y="971129"/>
+                </a:cubicBezTo>
+                <a:cubicBezTo>
+                  <a:pt x="336261" y="1006864"/>
+                  <a:pt x="371995" y="1034781"/>
+                  <a:pt x="407729" y="1062698"/>
+                </a:cubicBezTo>
+                <a:cubicBezTo>
+                  <a:pt x="457236" y="1101038"/>
+                  <a:pt x="503021" y="1142728"/>
+                  <a:pt x="544338" y="1189257"/>
+                </a:cubicBezTo>
+                <a:cubicBezTo>
+                  <a:pt x="514560" y="1166551"/>
+                  <a:pt x="484781" y="1143472"/>
+                  <a:pt x="454630" y="1120766"/>
+                </a:cubicBezTo>
+                <a:cubicBezTo>
+                  <a:pt x="431924" y="1103644"/>
+                  <a:pt x="408474" y="1087265"/>
+                  <a:pt x="385396" y="1070515"/>
+                </a:cubicBezTo>
+                <a:cubicBezTo>
+                  <a:pt x="379812" y="1066421"/>
+                  <a:pt x="373856" y="1061954"/>
+                  <a:pt x="366040" y="1067537"/>
+                </a:cubicBezTo>
+                <a:cubicBezTo>
+                  <a:pt x="358967" y="1072376"/>
+                  <a:pt x="360084" y="1079449"/>
+                  <a:pt x="361573" y="1086149"/>
+                </a:cubicBezTo>
+                <a:cubicBezTo>
+                  <a:pt x="367156" y="1112577"/>
+                  <a:pt x="382790" y="1133794"/>
+                  <a:pt x="402146" y="1152778"/>
+                </a:cubicBezTo>
+                <a:cubicBezTo>
+                  <a:pt x="425596" y="1175484"/>
+                  <a:pt x="450164" y="1197074"/>
+                  <a:pt x="475475" y="1218663"/>
+                </a:cubicBezTo>
+                <a:cubicBezTo>
+                  <a:pt x="448303" y="1212707"/>
+                  <a:pt x="421130" y="1206752"/>
+                  <a:pt x="393957" y="1201913"/>
+                </a:cubicBezTo>
+                <a:cubicBezTo>
+                  <a:pt x="406240" y="1245091"/>
+                  <a:pt x="434902" y="1253653"/>
+                  <a:pt x="460586" y="1260353"/>
+                </a:cubicBezTo>
+                <a:cubicBezTo>
+                  <a:pt x="495204" y="1268914"/>
+                  <a:pt x="528332" y="1279709"/>
+                  <a:pt x="561089" y="1291993"/>
+                </a:cubicBezTo>
+                <a:cubicBezTo>
+                  <a:pt x="574861" y="1304276"/>
+                  <a:pt x="588634" y="1316188"/>
+                  <a:pt x="602034" y="1328843"/>
+                </a:cubicBezTo>
+                <a:cubicBezTo>
+                  <a:pt x="615807" y="1341872"/>
+                  <a:pt x="628835" y="1354900"/>
+                  <a:pt x="641863" y="1368672"/>
+                </a:cubicBezTo>
+                <a:cubicBezTo>
+                  <a:pt x="651169" y="1378722"/>
+                  <a:pt x="662335" y="1387284"/>
+                  <a:pt x="651541" y="1404406"/>
+                </a:cubicBezTo>
+                <a:cubicBezTo>
+                  <a:pt x="646702" y="1412223"/>
+                  <a:pt x="678341" y="1454658"/>
+                  <a:pt x="688392" y="1457263"/>
+                </a:cubicBezTo>
+                <a:cubicBezTo>
+                  <a:pt x="689881" y="1457635"/>
+                  <a:pt x="691369" y="1458008"/>
+                  <a:pt x="692486" y="1458008"/>
+                </a:cubicBezTo>
+                <a:cubicBezTo>
+                  <a:pt x="714076" y="1456519"/>
+                  <a:pt x="718915" y="1469175"/>
+                  <a:pt x="719287" y="1485181"/>
+                </a:cubicBezTo>
+                <a:cubicBezTo>
+                  <a:pt x="719659" y="1500814"/>
+                  <a:pt x="715937" y="1520170"/>
+                  <a:pt x="745343" y="1512353"/>
+                </a:cubicBezTo>
+                <a:cubicBezTo>
+                  <a:pt x="748693" y="1511609"/>
+                  <a:pt x="749438" y="1513842"/>
+                  <a:pt x="750926" y="1516448"/>
+                </a:cubicBezTo>
+                <a:cubicBezTo>
+                  <a:pt x="782938" y="1583077"/>
+                  <a:pt x="836912" y="1634445"/>
+                  <a:pt x="890141" y="1685813"/>
+                </a:cubicBezTo>
+                <a:cubicBezTo>
+                  <a:pt x="893119" y="1688419"/>
+                  <a:pt x="896097" y="1691024"/>
+                  <a:pt x="899074" y="1693630"/>
+                </a:cubicBezTo>
+                <a:cubicBezTo>
+                  <a:pt x="843240" y="1680602"/>
+                  <a:pt x="658985" y="1663851"/>
+                  <a:pt x="605012" y="1669435"/>
+                </a:cubicBezTo>
+                <a:cubicBezTo>
+                  <a:pt x="556994" y="1674274"/>
+                  <a:pt x="285638" y="1593128"/>
+                  <a:pt x="229431" y="1545110"/>
+                </a:cubicBezTo>
+                <a:cubicBezTo>
+                  <a:pt x="221614" y="1582705"/>
+                  <a:pt x="238364" y="1597594"/>
+                  <a:pt x="251765" y="1614717"/>
+                </a:cubicBezTo>
+                <a:cubicBezTo>
+                  <a:pt x="270748" y="1638912"/>
+                  <a:pt x="273726" y="1656035"/>
+                  <a:pt x="237992" y="1675391"/>
+                </a:cubicBezTo>
+                <a:cubicBezTo>
+                  <a:pt x="135628" y="1730481"/>
+                  <a:pt x="136745" y="1732342"/>
+                  <a:pt x="232781" y="1807160"/>
+                </a:cubicBezTo>
+                <a:cubicBezTo>
+                  <a:pt x="237248" y="1810511"/>
+                  <a:pt x="235014" y="1821305"/>
+                  <a:pt x="236131" y="1828750"/>
+                </a:cubicBezTo>
+                <a:cubicBezTo>
+                  <a:pt x="211191" y="1839917"/>
+                  <a:pt x="181785" y="1810883"/>
+                  <a:pt x="152007" y="1842150"/>
+                </a:cubicBezTo>
+                <a:cubicBezTo>
+                  <a:pt x="280426" y="1979503"/>
+                  <a:pt x="475848" y="2110157"/>
+                  <a:pt x="653030" y="2213265"/>
+                </a:cubicBezTo>
+                <a:cubicBezTo>
+                  <a:pt x="509721" y="2247138"/>
+                  <a:pt x="423735" y="2128024"/>
+                  <a:pt x="318394" y="2143285"/>
+                </a:cubicBezTo>
+                <a:cubicBezTo>
+                  <a:pt x="265909" y="2180508"/>
+                  <a:pt x="422246" y="2240810"/>
+                  <a:pt x="272982" y="2258305"/>
+                </a:cubicBezTo>
+                <a:cubicBezTo>
+                  <a:pt x="337750" y="2291061"/>
+                  <a:pt x="385768" y="2323073"/>
+                  <a:pt x="430435" y="2360668"/>
+                </a:cubicBezTo>
+                <a:cubicBezTo>
+                  <a:pt x="509721" y="2428042"/>
+                  <a:pt x="525354" y="2472710"/>
+                  <a:pt x="488876" y="2563162"/>
+                </a:cubicBezTo>
+                <a:cubicBezTo>
+                  <a:pt x="464681" y="2622719"/>
+                  <a:pt x="429691" y="2677437"/>
+                  <a:pt x="460586" y="2748533"/>
+                </a:cubicBezTo>
+                <a:cubicBezTo>
+                  <a:pt x="481803" y="2797295"/>
+                  <a:pt x="473614" y="2829307"/>
+                  <a:pt x="393212" y="2807345"/>
+                </a:cubicBezTo>
+                <a:cubicBezTo>
+                  <a:pt x="306483" y="2783895"/>
+                  <a:pt x="273726" y="2827818"/>
+                  <a:pt x="295688" y="2913059"/>
+                </a:cubicBezTo>
+                <a:cubicBezTo>
+                  <a:pt x="309833" y="2967777"/>
+                  <a:pt x="294943" y="2984900"/>
+                  <a:pt x="235386" y="2978572"/>
+                </a:cubicBezTo>
+                <a:cubicBezTo>
+                  <a:pt x="169501" y="2971499"/>
+                  <a:pt x="106967" y="2935765"/>
+                  <a:pt x="25448" y="2952888"/>
+                </a:cubicBezTo>
+                <a:cubicBezTo>
+                  <a:pt x="90588" y="3052646"/>
+                  <a:pt x="229803" y="3024356"/>
+                  <a:pt x="305738" y="3119275"/>
+                </a:cubicBezTo>
+                <a:cubicBezTo>
+                  <a:pt x="215286" y="3119647"/>
+                  <a:pt x="146051" y="3119275"/>
+                  <a:pt x="79049" y="3098430"/>
+                </a:cubicBezTo>
+                <a:cubicBezTo>
+                  <a:pt x="51132" y="3089869"/>
+                  <a:pt x="20609" y="3081308"/>
+                  <a:pt x="4975" y="3109969"/>
+                </a:cubicBezTo>
+                <a:cubicBezTo>
+                  <a:pt x="-13636" y="3144587"/>
+                  <a:pt x="24331" y="3157615"/>
+                  <a:pt x="47037" y="3163943"/>
+                </a:cubicBezTo>
+                <a:cubicBezTo>
+                  <a:pt x="111061" y="3181438"/>
+                  <a:pt x="160196" y="3222755"/>
+                  <a:pt x="213425" y="3255139"/>
+                </a:cubicBezTo>
+                <a:cubicBezTo>
+                  <a:pt x="329933" y="3326236"/>
+                  <a:pt x="457981" y="3385420"/>
+                  <a:pt x="556622" y="3502301"/>
+                </a:cubicBezTo>
+                <a:cubicBezTo>
+                  <a:pt x="432669" y="3472523"/>
+                  <a:pt x="339983" y="3402915"/>
+                  <a:pt x="224592" y="3388771"/>
+                </a:cubicBezTo>
+                <a:cubicBezTo>
+                  <a:pt x="324722" y="3495601"/>
+                  <a:pt x="453142" y="3565208"/>
+                  <a:pt x="574861" y="3643004"/>
+                </a:cubicBezTo>
+                <a:cubicBezTo>
+                  <a:pt x="609479" y="3664966"/>
+                  <a:pt x="644841" y="3679855"/>
+                  <a:pt x="652657" y="3727501"/>
+                </a:cubicBezTo>
+                <a:cubicBezTo>
+                  <a:pt x="667919" y="3819814"/>
+                  <a:pt x="712959" y="3896494"/>
+                  <a:pt x="810111" y="3937067"/>
+                </a:cubicBezTo>
+                <a:cubicBezTo>
+                  <a:pt x="810856" y="3937439"/>
+                  <a:pt x="805644" y="3951212"/>
+                  <a:pt x="802294" y="3960890"/>
+                </a:cubicBezTo>
+                <a:cubicBezTo>
+                  <a:pt x="743110" y="3963868"/>
+                  <a:pt x="696581" y="3909149"/>
+                  <a:pt x="620646" y="3927017"/>
+                </a:cubicBezTo>
+                <a:cubicBezTo>
+                  <a:pt x="692858" y="4001091"/>
+                  <a:pt x="753532" y="4067720"/>
+                  <a:pt x="856268" y="4103082"/>
+                </a:cubicBezTo>
+                <a:cubicBezTo>
+                  <a:pt x="938531" y="4131372"/>
+                  <a:pt x="1040150" y="4147377"/>
+                  <a:pt x="1099707" y="4238574"/>
+                </a:cubicBezTo>
+                <a:cubicBezTo>
+                  <a:pt x="1030472" y="4256441"/>
+                  <a:pt x="978732" y="4234107"/>
+                  <a:pt x="926992" y="4218102"/>
+                </a:cubicBezTo>
+                <a:cubicBezTo>
+                  <a:pt x="847334" y="4193534"/>
+                  <a:pt x="769166" y="4165617"/>
+                  <a:pt x="689508" y="4140677"/>
+                </a:cubicBezTo>
+                <a:cubicBezTo>
+                  <a:pt x="659358" y="4131372"/>
+                  <a:pt x="626229" y="4124299"/>
+                  <a:pt x="606873" y="4169711"/>
+                </a:cubicBezTo>
+                <a:cubicBezTo>
+                  <a:pt x="707748" y="4179389"/>
+                  <a:pt x="768421" y="4240435"/>
+                  <a:pt x="831701" y="4297759"/>
+                </a:cubicBezTo>
+                <a:cubicBezTo>
+                  <a:pt x="867435" y="4330143"/>
+                  <a:pt x="896469" y="4373322"/>
+                  <a:pt x="960493" y="4356944"/>
+                </a:cubicBezTo>
+                <a:cubicBezTo>
+                  <a:pt x="994366" y="4348382"/>
+                  <a:pt x="1015955" y="4372578"/>
+                  <a:pt x="1012233" y="4402356"/>
+                </a:cubicBezTo>
+                <a:cubicBezTo>
+                  <a:pt x="999577" y="4507325"/>
+                  <a:pt x="1078118" y="4544176"/>
+                  <a:pt x="1159636" y="4564276"/>
+                </a:cubicBezTo>
+                <a:cubicBezTo>
+                  <a:pt x="1313740" y="4602616"/>
+                  <a:pt x="1442160" y="4692324"/>
+                  <a:pt x="1592169" y="4741458"/>
+                </a:cubicBezTo>
+                <a:cubicBezTo>
+                  <a:pt x="1738083" y="4789104"/>
+                  <a:pt x="2833187" y="5010209"/>
+                  <a:pt x="3110499" y="5032171"/>
+                </a:cubicBezTo>
+                <a:cubicBezTo>
+                  <a:pt x="4807501" y="5166546"/>
+                  <a:pt x="6028047" y="4106432"/>
+                  <a:pt x="6033630" y="4091915"/>
+                </a:cubicBezTo>
+                <a:cubicBezTo>
+                  <a:pt x="6059314" y="4023797"/>
+                  <a:pt x="6122965" y="3994390"/>
+                  <a:pt x="6180661" y="3957912"/>
+                </a:cubicBezTo>
+                <a:cubicBezTo>
+                  <a:pt x="6230913" y="3925900"/>
+                  <a:pt x="6284514" y="3892027"/>
+                  <a:pt x="6305359" y="3837309"/>
+                </a:cubicBezTo>
+                <a:cubicBezTo>
+                  <a:pt x="6332904" y="3764724"/>
+                  <a:pt x="6254735" y="3824281"/>
+                  <a:pt x="6240218" y="3796364"/>
+                </a:cubicBezTo>
+                <a:cubicBezTo>
+                  <a:pt x="6269997" y="3758768"/>
+                  <a:pt x="6316153" y="3724151"/>
+                  <a:pt x="6328437" y="3681344"/>
+                </a:cubicBezTo>
+                <a:cubicBezTo>
+                  <a:pt x="6372361" y="3526496"/>
+                  <a:pt x="6466907" y="3413710"/>
+                  <a:pt x="6608355" y="3326236"/>
+                </a:cubicBezTo>
+                <a:cubicBezTo>
+                  <a:pt x="6648928" y="3300924"/>
+                  <a:pt x="6675729" y="3255512"/>
+                  <a:pt x="6731191" y="3248067"/>
+                </a:cubicBezTo>
+                <a:cubicBezTo>
+                  <a:pt x="6854400" y="3232061"/>
+                  <a:pt x="6815315" y="3106992"/>
+                  <a:pt x="6880456" y="3051529"/>
+                </a:cubicBezTo>
+                <a:cubicBezTo>
+                  <a:pt x="6892739" y="3041107"/>
+                  <a:pt x="6903907" y="2777939"/>
+                  <a:pt x="6901673" y="2763795"/>
+                </a:cubicBezTo>
+                <a:cubicBezTo>
+                  <a:pt x="6898323" y="2743322"/>
+                  <a:pt x="6883806" y="2966288"/>
+                  <a:pt x="6871150" y="2948421"/>
+                </a:cubicBezTo>
+                <a:cubicBezTo>
+                  <a:pt x="6858494" y="2930182"/>
+                  <a:pt x="6839138" y="2914176"/>
+                  <a:pt x="6848444" y="2890353"/>
+                </a:cubicBezTo>
+                <a:cubicBezTo>
+                  <a:pt x="6852166" y="2880303"/>
+                  <a:pt x="6849561" y="2846058"/>
+                  <a:pt x="6878223" y="2873230"/>
+                </a:cubicBezTo>
+                <a:cubicBezTo>
+                  <a:pt x="6956763" y="2946932"/>
+                  <a:pt x="6870778" y="2578051"/>
+                  <a:pt x="6762459" y="2568745"/>
+                </a:cubicBezTo>
+                <a:cubicBezTo>
+                  <a:pt x="6801915" y="2465637"/>
+                  <a:pt x="6801915" y="2465637"/>
+                  <a:pt x="6673123" y="2451493"/>
+                </a:cubicBezTo>
+                <a:cubicBezTo>
+                  <a:pt x="6722630" y="2385980"/>
+                  <a:pt x="6722630" y="2369229"/>
+                  <a:pt x="6662700" y="2346896"/>
+                </a:cubicBezTo>
+                <a:cubicBezTo>
+                  <a:pt x="6605005" y="2325306"/>
+                  <a:pt x="6540981" y="2318234"/>
+                  <a:pt x="6487752" y="2285105"/>
+                </a:cubicBezTo>
+                <a:cubicBezTo>
+                  <a:pt x="6536887" y="2201353"/>
+                  <a:pt x="6550659" y="2104573"/>
+                  <a:pt x="6652278" y="2063628"/>
+                </a:cubicBezTo>
+                <a:cubicBezTo>
+                  <a:pt x="6668284" y="2057300"/>
+                  <a:pt x="6679079" y="2031988"/>
+                  <a:pt x="6668656" y="2017843"/>
+                </a:cubicBezTo>
+                <a:cubicBezTo>
+                  <a:pt x="6631805" y="1965359"/>
+                  <a:pt x="6684662" y="1864856"/>
+                  <a:pt x="6570015" y="1854062"/>
+                </a:cubicBezTo>
+                <a:cubicBezTo>
+                  <a:pt x="6555870" y="1852573"/>
+                  <a:pt x="6542842" y="1842150"/>
+                  <a:pt x="6554009" y="1827633"/>
+                </a:cubicBezTo>
+                <a:cubicBezTo>
+                  <a:pt x="6592349" y="1778126"/>
+                  <a:pt x="6545820" y="1781476"/>
+                  <a:pt x="6517531" y="1775149"/>
+                </a:cubicBezTo>
+                <a:cubicBezTo>
+                  <a:pt x="6483285" y="1767704"/>
+                  <a:pt x="6444573" y="1789293"/>
+                  <a:pt x="6412934" y="1762493"/>
+                </a:cubicBezTo>
+                <a:cubicBezTo>
+                  <a:pt x="6420378" y="1734203"/>
+                  <a:pt x="6447923" y="1734575"/>
+                  <a:pt x="6467279" y="1725642"/>
+                </a:cubicBezTo>
+                <a:cubicBezTo>
+                  <a:pt x="6523858" y="1699213"/>
+                  <a:pt x="6570015" y="1667946"/>
+                  <a:pt x="6572621" y="1600200"/>
+                </a:cubicBezTo>
+                <a:cubicBezTo>
+                  <a:pt x="6574854" y="1545482"/>
+                  <a:pt x="6580810" y="1497092"/>
+                  <a:pt x="6502641" y="1480341"/>
+                </a:cubicBezTo>
+                <a:cubicBezTo>
+                  <a:pt x="6490358" y="1477736"/>
+                  <a:pt x="6484030" y="1470664"/>
+                  <a:pt x="6481796" y="1461358"/>
+                </a:cubicBezTo>
+                <a:cubicBezTo>
+                  <a:pt x="6490730" y="1452424"/>
+                  <a:pt x="6499291" y="1443118"/>
+                  <a:pt x="6509713" y="1436418"/>
+                </a:cubicBezTo>
+                <a:cubicBezTo>
+                  <a:pt x="6544703" y="1414457"/>
+                  <a:pt x="6556615" y="1382072"/>
+                  <a:pt x="6567037" y="1348199"/>
+                </a:cubicBezTo>
+                <a:cubicBezTo>
+                  <a:pt x="6573737" y="1326610"/>
+                  <a:pt x="6581554" y="1305393"/>
+                  <a:pt x="6596816" y="1286781"/>
+                </a:cubicBezTo>
+                <a:cubicBezTo>
+                  <a:pt x="6606122" y="1275242"/>
+                  <a:pt x="6617661" y="1266681"/>
+                  <a:pt x="6632178" y="1261842"/>
+                </a:cubicBezTo>
+                <a:cubicBezTo>
+                  <a:pt x="6644833" y="1257375"/>
+                  <a:pt x="6648556" y="1251419"/>
+                  <a:pt x="6639994" y="1240625"/>
+                </a:cubicBezTo>
+                <a:cubicBezTo>
+                  <a:pt x="6615799" y="1209729"/>
+                  <a:pt x="6606122" y="1175856"/>
+                  <a:pt x="6622127" y="1136400"/>
+                </a:cubicBezTo>
+                <a:cubicBezTo>
+                  <a:pt x="6626967" y="1124489"/>
+                  <a:pt x="6623617" y="1114066"/>
+                  <a:pt x="6612077" y="1109599"/>
+                </a:cubicBezTo>
+                <a:cubicBezTo>
+                  <a:pt x="6564059" y="1090616"/>
+                  <a:pt x="6552148" y="1046692"/>
+                  <a:pt x="6531675" y="1009469"/>
+                </a:cubicBezTo>
+                <a:cubicBezTo>
+                  <a:pt x="6502641" y="956612"/>
+                  <a:pt x="6476213" y="902639"/>
+                  <a:pt x="6456113" y="845315"/>
+                </a:cubicBezTo>
+                <a:cubicBezTo>
+                  <a:pt x="6444201" y="811070"/>
+                  <a:pt x="6432662" y="777197"/>
+                  <a:pt x="6440851" y="739229"/>
+                </a:cubicBezTo>
+                <a:cubicBezTo>
+                  <a:pt x="6442712" y="729924"/>
+                  <a:pt x="6439362" y="722107"/>
+                  <a:pt x="6434523" y="715034"/>
+                </a:cubicBezTo>
+                <a:cubicBezTo>
+                  <a:pt x="6414050" y="684139"/>
+                  <a:pt x="6416656" y="651383"/>
+                  <a:pt x="6432290" y="617510"/>
+                </a:cubicBezTo>
+                <a:cubicBezTo>
+                  <a:pt x="6441968" y="597037"/>
+                  <a:pt x="6440851" y="594431"/>
+                  <a:pt x="6416284" y="595176"/>
+                </a:cubicBezTo>
+                <a:cubicBezTo>
+                  <a:pt x="6366405" y="596293"/>
+                  <a:pt x="6316898" y="598154"/>
+                  <a:pt x="6267763" y="591826"/>
+                </a:cubicBezTo>
+                <a:cubicBezTo>
+                  <a:pt x="6212673" y="584753"/>
+                  <a:pt x="6194806" y="568375"/>
+                  <a:pt x="6236496" y="521102"/>
+                </a:cubicBezTo>
+                <a:cubicBezTo>
+                  <a:pt x="6245430" y="511052"/>
+                  <a:pt x="6253246" y="499885"/>
+                  <a:pt x="6257341" y="487229"/>
+                </a:cubicBezTo>
+                <a:cubicBezTo>
+                  <a:pt x="6260319" y="477179"/>
+                  <a:pt x="6257713" y="470106"/>
+                  <a:pt x="6248780" y="465267"/>
+                </a:cubicBezTo>
+                <a:cubicBezTo>
+                  <a:pt x="6238357" y="459312"/>
+                  <a:pt x="6232774" y="467501"/>
+                  <a:pt x="6226818" y="473456"/>
+                </a:cubicBezTo>
+                <a:cubicBezTo>
+                  <a:pt x="6194434" y="505468"/>
+                  <a:pt x="6153861" y="527430"/>
+                  <a:pt x="6115149" y="551625"/>
+                </a:cubicBezTo>
+                <a:cubicBezTo>
+                  <a:pt x="6059686" y="586615"/>
+                  <a:pt x="6001246" y="617510"/>
+                  <a:pt x="5951739" y="659944"/>
+                </a:cubicBezTo>
+                <a:cubicBezTo>
+                  <a:pt x="5939084" y="670739"/>
+                  <a:pt x="5918611" y="662550"/>
+                  <a:pt x="5917122" y="644310"/>
+                </a:cubicBezTo>
+                <a:cubicBezTo>
+                  <a:pt x="5915633" y="626071"/>
+                  <a:pt x="5905583" y="626071"/>
+                  <a:pt x="5890694" y="630538"/>
+                </a:cubicBezTo>
+                <a:cubicBezTo>
+                  <a:pt x="5872826" y="635749"/>
+                  <a:pt x="5854959" y="640960"/>
+                  <a:pt x="5837464" y="646916"/>
+                </a:cubicBezTo>
+                <a:cubicBezTo>
+                  <a:pt x="5819225" y="653244"/>
+                  <a:pt x="5811036" y="666644"/>
+                  <a:pt x="5809175" y="683395"/>
+                </a:cubicBezTo>
+                <a:cubicBezTo>
+                  <a:pt x="5808430" y="689723"/>
+                  <a:pt x="5808803" y="697539"/>
+                  <a:pt x="5815503" y="698656"/>
+                </a:cubicBezTo>
+                <a:cubicBezTo>
+                  <a:pt x="5843048" y="703495"/>
+                  <a:pt x="5755201" y="682278"/>
+                  <a:pt x="5746268" y="667389"/>
+                </a:cubicBezTo>
+                <a:cubicBezTo>
+                  <a:pt x="5745896" y="666644"/>
+                  <a:pt x="5525907" y="720246"/>
+                  <a:pt x="5458905" y="754119"/>
+                </a:cubicBezTo>
+                <a:close/>
+                <a:moveTo>
+                  <a:pt x="885302" y="1333310"/>
+                </a:moveTo>
+                <a:cubicBezTo>
+                  <a:pt x="877857" y="1326982"/>
+                  <a:pt x="870040" y="1321027"/>
+                  <a:pt x="862596" y="1314326"/>
+                </a:cubicBezTo>
+                <a:cubicBezTo>
+                  <a:pt x="863712" y="1312837"/>
+                  <a:pt x="865201" y="1311349"/>
+                  <a:pt x="866318" y="1309860"/>
+                </a:cubicBezTo>
+                <a:cubicBezTo>
+                  <a:pt x="881580" y="1320282"/>
+                  <a:pt x="896841" y="1330705"/>
+                  <a:pt x="912103" y="1341127"/>
+                </a:cubicBezTo>
+                <a:cubicBezTo>
+                  <a:pt x="903541" y="1338522"/>
+                  <a:pt x="894235" y="1335916"/>
+                  <a:pt x="885302" y="1333310"/>
+                </a:cubicBezTo>
+                <a:close/>
+                <a:moveTo>
+                  <a:pt x="1140280" y="787619"/>
+                </a:moveTo>
+                <a:cubicBezTo>
+                  <a:pt x="1231849" y="850154"/>
+                  <a:pt x="1323418" y="913061"/>
+                  <a:pt x="1414987" y="975596"/>
+                </a:cubicBezTo>
+                <a:cubicBezTo>
+                  <a:pt x="1413498" y="977085"/>
+                  <a:pt x="1412381" y="978574"/>
+                  <a:pt x="1410892" y="980063"/>
+                </a:cubicBezTo>
+                <a:cubicBezTo>
+                  <a:pt x="1310390" y="927206"/>
+                  <a:pt x="1215471" y="868394"/>
+                  <a:pt x="1140280" y="787619"/>
+                </a:cubicBezTo>
+                <a:close/>
+              </a:path>
+            </a:pathLst>
+          </a:custGeom>
+          <a:solidFill>
+            <a:schemeClr val="accent1">
+              <a:alpha val="20000"/>
+            </a:schemeClr>
+          </a:solidFill>
+          <a:ln w="32707" cap="flat">
+            <a:noFill/>
+            <a:prstDash val="solid"/>
+            <a:miter/>
+          </a:ln>
+        </p:spPr>
+        <p:txBody>
+          <a:bodyPr rtlCol="0" anchor="ctr"/>
+          <a:lstStyle/>
+          <a:p>
+            <a:endParaRPr lang="en-US" dirty="0"/>
+          </a:p>
+        </p:txBody>
+      </p:sp>
+      <p:sp useBgFill="1">
+        <p:nvSpPr>
+          <p:cNvPr id="9" name="Rectangle 8">
+            <a:extLst>
+              <a:ext uri="{FF2B5EF4-FFF2-40B4-BE49-F238E27FC236}">
+                <a16:creationId xmlns:a16="http://schemas.microsoft.com/office/drawing/2014/main" id="{D839A9B9-F246-4779-A2BA-7AD3DAB5412B}"/>
+              </a:ext>
+              <a:ext uri="{C183D7F6-B498-43B3-948B-1728B52AA6E4}">
+                <adec:decorative xmlns:adec="http://schemas.microsoft.com/office/drawing/2017/decorative" val="1"/>
+              </a:ext>
+            </a:extLst>
+          </p:cNvPr>
+          <p:cNvSpPr>
+            <a:spLocks noGrp="1" noRot="1" noChangeAspect="1" noMove="1" noResize="1" noEditPoints="1" noAdjustHandles="1" noChangeArrowheads="1" noChangeShapeType="1" noTextEdit="1"/>
+          </p:cNvSpPr>
+          <p:nvPr>
+            <p:extLst>
+              <p:ext uri="{386F3935-93C4-4BCD-93E2-E3B085C9AB24}">
+                <p16:designElem xmlns:p16="http://schemas.microsoft.com/office/powerpoint/2015/main" val="1"/>
+              </p:ext>
+            </p:extLst>
+          </p:nvPr>
+        </p:nvSpPr>
+        <p:spPr>
+          <a:xfrm>
+            <a:off x="0" y="0"/>
+            <a:ext cx="12188952" cy="6858000"/>
+          </a:xfrm>
+          <a:prstGeom prst="rect">
+            <a:avLst/>
+          </a:prstGeom>
+          <a:ln>
+            <a:noFill/>
+          </a:ln>
+        </p:spPr>
+        <p:style>
+          <a:lnRef idx="2">
+            <a:schemeClr val="accent1">
+              <a:shade val="50000"/>
+            </a:schemeClr>
+          </a:lnRef>
+          <a:fillRef idx="1">
+            <a:schemeClr val="accent1"/>
+          </a:fillRef>
+          <a:effectRef idx="0">
+            <a:schemeClr val="accent1"/>
+          </a:effectRef>
+          <a:fontRef idx="minor">
+            <a:schemeClr val="lt1"/>
+          </a:fontRef>
+        </p:style>
+        <p:txBody>
+          <a:bodyPr rtlCol="0" anchor="ctr"/>
+          <a:lstStyle/>
+          <a:p>
+            <a:pPr algn="ctr"/>
+            <a:endParaRPr lang="en-US"/>
+          </a:p>
+        </p:txBody>
+      </p:sp>
+      <p:sp>
+        <p:nvSpPr>
+          <p:cNvPr id="2" name="Title 1">
+            <a:extLst>
+              <a:ext uri="{FF2B5EF4-FFF2-40B4-BE49-F238E27FC236}">
+                <a16:creationId xmlns:a16="http://schemas.microsoft.com/office/drawing/2014/main" id="{E0A8E9BC-A174-874F-890C-574E80BC638F}"/>
+              </a:ext>
+            </a:extLst>
+          </p:cNvPr>
+          <p:cNvSpPr>
+            <a:spLocks noGrp="1"/>
+          </p:cNvSpPr>
+          <p:nvPr>
+            <p:ph type="title"/>
+          </p:nvPr>
+        </p:nvSpPr>
+        <p:spPr>
+          <a:xfrm>
+            <a:off x="1524000" y="1834964"/>
+            <a:ext cx="9144000" cy="2387600"/>
+          </a:xfrm>
+        </p:spPr>
+        <p:txBody>
+          <a:bodyPr vert="horz" lIns="91440" tIns="45720" rIns="91440" bIns="45720" rtlCol="0" anchor="b">
+            <a:normAutofit/>
+          </a:bodyPr>
+          <a:lstStyle/>
+          <a:p>
+            <a:pPr algn="ctr"/>
+            <a:r>
+              <a:rPr lang="en-US" sz="6000" dirty="0"/>
+              <a:t>Part 1 – Geiger Dome</a:t>
+            </a:r>
+          </a:p>
+        </p:txBody>
+      </p:sp>
+      <p:sp>
+        <p:nvSpPr>
+          <p:cNvPr id="11" name="Freeform: Shape 10">
+            <a:extLst>
+              <a:ext uri="{FF2B5EF4-FFF2-40B4-BE49-F238E27FC236}">
+                <a16:creationId xmlns:a16="http://schemas.microsoft.com/office/drawing/2014/main" id="{689FF3C7-B796-4C63-BF20-B2EE56888340}"/>
+              </a:ext>
+              <a:ext uri="{C183D7F6-B498-43B3-948B-1728B52AA6E4}">
+                <adec:decorative xmlns:adec="http://schemas.microsoft.com/office/drawing/2017/decorative" val="1"/>
+              </a:ext>
+            </a:extLst>
+          </p:cNvPr>
+          <p:cNvSpPr>
+            <a:spLocks noGrp="1" noRot="1" noChangeAspect="1" noMove="1" noResize="1" noEditPoints="1" noAdjustHandles="1" noChangeArrowheads="1" noChangeShapeType="1" noTextEdit="1"/>
+          </p:cNvSpPr>
+          <p:nvPr>
+            <p:extLst>
+              <p:ext uri="{386F3935-93C4-4BCD-93E2-E3B085C9AB24}">
+                <p16:designElem xmlns:p16="http://schemas.microsoft.com/office/powerpoint/2015/main" val="1"/>
+              </p:ext>
+            </p:extLst>
+          </p:nvPr>
+        </p:nvSpPr>
+        <p:spPr>
+          <a:xfrm>
+            <a:off x="685896" y="1"/>
+            <a:ext cx="11282409" cy="2930115"/>
+          </a:xfrm>
+          <a:custGeom>
+            <a:avLst/>
+            <a:gdLst>
+              <a:gd name="connsiteX0" fmla="*/ 1277174 w 11282409"/>
+              <a:gd name="connsiteY0" fmla="*/ 0 h 2930115"/>
+              <a:gd name="connsiteX1" fmla="*/ 11077320 w 11282409"/>
+              <a:gd name="connsiteY1" fmla="*/ 0 h 2930115"/>
+              <a:gd name="connsiteX2" fmla="*/ 10933044 w 11282409"/>
+              <a:gd name="connsiteY2" fmla="*/ 93916 h 2930115"/>
+              <a:gd name="connsiteX3" fmla="*/ 11087630 w 11282409"/>
+              <a:gd name="connsiteY3" fmla="*/ 165214 h 2930115"/>
+              <a:gd name="connsiteX4" fmla="*/ 10401271 w 11282409"/>
+              <a:gd name="connsiteY4" fmla="*/ 582307 h 2930115"/>
+              <a:gd name="connsiteX5" fmla="*/ 11038163 w 11282409"/>
+              <a:gd name="connsiteY5" fmla="*/ 511009 h 2930115"/>
+              <a:gd name="connsiteX6" fmla="*/ 11004154 w 11282409"/>
+              <a:gd name="connsiteY6" fmla="*/ 568047 h 2930115"/>
+              <a:gd name="connsiteX7" fmla="*/ 10970146 w 11282409"/>
+              <a:gd name="connsiteY7" fmla="*/ 625085 h 2930115"/>
+              <a:gd name="connsiteX8" fmla="*/ 11270042 w 11282409"/>
+              <a:gd name="connsiteY8" fmla="*/ 589437 h 2930115"/>
+              <a:gd name="connsiteX9" fmla="*/ 11270042 w 11282409"/>
+              <a:gd name="connsiteY9" fmla="*/ 650039 h 2930115"/>
+              <a:gd name="connsiteX10" fmla="*/ 11177291 w 11282409"/>
+              <a:gd name="connsiteY10" fmla="*/ 721337 h 2930115"/>
+              <a:gd name="connsiteX11" fmla="*/ 11270042 w 11282409"/>
+              <a:gd name="connsiteY11" fmla="*/ 703512 h 2930115"/>
+              <a:gd name="connsiteX12" fmla="*/ 11282409 w 11282409"/>
+              <a:gd name="connsiteY12" fmla="*/ 703512 h 2930115"/>
+              <a:gd name="connsiteX13" fmla="*/ 11282409 w 11282409"/>
+              <a:gd name="connsiteY13" fmla="*/ 981574 h 2930115"/>
+              <a:gd name="connsiteX14" fmla="*/ 4053985 w 11282409"/>
+              <a:gd name="connsiteY14" fmla="*/ 2928005 h 2930115"/>
+              <a:gd name="connsiteX15" fmla="*/ 3386175 w 11282409"/>
+              <a:gd name="connsiteY15" fmla="*/ 2892355 h 2930115"/>
+              <a:gd name="connsiteX16" fmla="*/ 3228499 w 11282409"/>
+              <a:gd name="connsiteY16" fmla="*/ 2774714 h 2930115"/>
+              <a:gd name="connsiteX17" fmla="*/ 3389267 w 11282409"/>
+              <a:gd name="connsiteY17" fmla="*/ 2717676 h 2930115"/>
+              <a:gd name="connsiteX18" fmla="*/ 3883942 w 11282409"/>
+              <a:gd name="connsiteY18" fmla="*/ 2535866 h 2930115"/>
+              <a:gd name="connsiteX19" fmla="*/ 3401634 w 11282409"/>
+              <a:gd name="connsiteY19" fmla="*/ 2564386 h 2930115"/>
+              <a:gd name="connsiteX20" fmla="*/ 4087994 w 11282409"/>
+              <a:gd name="connsiteY20" fmla="*/ 2414660 h 2930115"/>
+              <a:gd name="connsiteX21" fmla="*/ 4285864 w 11282409"/>
+              <a:gd name="connsiteY21" fmla="*/ 2336233 h 2930115"/>
+              <a:gd name="connsiteX22" fmla="*/ 4091088 w 11282409"/>
+              <a:gd name="connsiteY22" fmla="*/ 2304149 h 2930115"/>
+              <a:gd name="connsiteX23" fmla="*/ 3148114 w 11282409"/>
+              <a:gd name="connsiteY23" fmla="*/ 2400401 h 2930115"/>
+              <a:gd name="connsiteX24" fmla="*/ 3058455 w 11282409"/>
+              <a:gd name="connsiteY24" fmla="*/ 2411095 h 2930115"/>
+              <a:gd name="connsiteX25" fmla="*/ 2443203 w 11282409"/>
+              <a:gd name="connsiteY25" fmla="*/ 2336233 h 2930115"/>
+              <a:gd name="connsiteX26" fmla="*/ 2786383 w 11282409"/>
+              <a:gd name="connsiteY26" fmla="*/ 2257805 h 2930115"/>
+              <a:gd name="connsiteX27" fmla="*/ 2390644 w 11282409"/>
+              <a:gd name="connsiteY27" fmla="*/ 2211461 h 2930115"/>
+              <a:gd name="connsiteX28" fmla="*/ 1911429 w 11282409"/>
+              <a:gd name="connsiteY28" fmla="*/ 2168683 h 2930115"/>
+              <a:gd name="connsiteX29" fmla="*/ 1416755 w 11282409"/>
+              <a:gd name="connsiteY29" fmla="*/ 2026087 h 2930115"/>
+              <a:gd name="connsiteX30" fmla="*/ 1070483 w 11282409"/>
+              <a:gd name="connsiteY30" fmla="*/ 1979743 h 2930115"/>
+              <a:gd name="connsiteX31" fmla="*/ 1104491 w 11282409"/>
+              <a:gd name="connsiteY31" fmla="*/ 1854972 h 2930115"/>
+              <a:gd name="connsiteX32" fmla="*/ 1039566 w 11282409"/>
+              <a:gd name="connsiteY32" fmla="*/ 1748026 h 2930115"/>
+              <a:gd name="connsiteX33" fmla="*/ 1623900 w 11282409"/>
+              <a:gd name="connsiteY33" fmla="*/ 1694553 h 2930115"/>
+              <a:gd name="connsiteX34" fmla="*/ 1401296 w 11282409"/>
+              <a:gd name="connsiteY34" fmla="*/ 1676728 h 2930115"/>
+              <a:gd name="connsiteX35" fmla="*/ 1302362 w 11282409"/>
+              <a:gd name="connsiteY35" fmla="*/ 1623255 h 2930115"/>
+              <a:gd name="connsiteX36" fmla="*/ 1385838 w 11282409"/>
+              <a:gd name="connsiteY36" fmla="*/ 1566216 h 2930115"/>
+              <a:gd name="connsiteX37" fmla="*/ 1756843 w 11282409"/>
+              <a:gd name="connsiteY37" fmla="*/ 1377277 h 2930115"/>
+              <a:gd name="connsiteX38" fmla="*/ 721120 w 11282409"/>
+              <a:gd name="connsiteY38" fmla="*/ 1387972 h 2930115"/>
+              <a:gd name="connsiteX39" fmla="*/ 857154 w 11282409"/>
+              <a:gd name="connsiteY39" fmla="*/ 1323803 h 2930115"/>
+              <a:gd name="connsiteX40" fmla="*/ 2285525 w 11282409"/>
+              <a:gd name="connsiteY40" fmla="*/ 924536 h 2930115"/>
+              <a:gd name="connsiteX41" fmla="*/ 2569963 w 11282409"/>
+              <a:gd name="connsiteY41" fmla="*/ 874628 h 2930115"/>
+              <a:gd name="connsiteX42" fmla="*/ 1803218 w 11282409"/>
+              <a:gd name="connsiteY42" fmla="*/ 856803 h 2930115"/>
+              <a:gd name="connsiteX43" fmla="*/ 625276 w 11282409"/>
+              <a:gd name="connsiteY43" fmla="*/ 682124 h 2930115"/>
+              <a:gd name="connsiteX44" fmla="*/ 736578 w 11282409"/>
+              <a:gd name="connsiteY44" fmla="*/ 521703 h 2930115"/>
+              <a:gd name="connsiteX45" fmla="*/ 155336 w 11282409"/>
+              <a:gd name="connsiteY45" fmla="*/ 550222 h 2930115"/>
+              <a:gd name="connsiteX46" fmla="*/ 421223 w 11282409"/>
+              <a:gd name="connsiteY46" fmla="*/ 425451 h 2930115"/>
+              <a:gd name="connsiteX47" fmla="*/ 201712 w 11282409"/>
+              <a:gd name="connsiteY47" fmla="*/ 404062 h 2930115"/>
+              <a:gd name="connsiteX48" fmla="*/ 3843 w 11282409"/>
+              <a:gd name="connsiteY48" fmla="*/ 314939 h 2930115"/>
+              <a:gd name="connsiteX49" fmla="*/ 829329 w 11282409"/>
+              <a:gd name="connsiteY49" fmla="*/ 175909 h 2930115"/>
+              <a:gd name="connsiteX50" fmla="*/ 1045749 w 11282409"/>
+              <a:gd name="connsiteY50" fmla="*/ 47572 h 2930115"/>
+              <a:gd name="connsiteX51" fmla="*/ 1172509 w 11282409"/>
+              <a:gd name="connsiteY51" fmla="*/ 11924 h 2930115"/>
+              <a:gd name="connsiteX52" fmla="*/ 1257531 w 11282409"/>
+              <a:gd name="connsiteY52" fmla="*/ 7914 h 2930115"/>
+            </a:gdLst>
+            <a:ahLst/>
+            <a:cxnLst>
+              <a:cxn ang="0">
+                <a:pos x="connsiteX0" y="connsiteY0"/>
+              </a:cxn>
+              <a:cxn ang="0">
+                <a:pos x="connsiteX1" y="connsiteY1"/>
+              </a:cxn>
+              <a:cxn ang="0">
+                <a:pos x="connsiteX2" y="connsiteY2"/>
+              </a:cxn>
+              <a:cxn ang="0">
+                <a:pos x="connsiteX3" y="connsiteY3"/>
+              </a:cxn>
+              <a:cxn ang="0">
+                <a:pos x="connsiteX4" y="connsiteY4"/>
+              </a:cxn>
+              <a:cxn ang="0">
+                <a:pos x="connsiteX5" y="connsiteY5"/>
+              </a:cxn>
+              <a:cxn ang="0">
+                <a:pos x="connsiteX6" y="connsiteY6"/>
+              </a:cxn>
+              <a:cxn ang="0">
+                <a:pos x="connsiteX7" y="connsiteY7"/>
+              </a:cxn>
+              <a:cxn ang="0">
+                <a:pos x="connsiteX8" y="connsiteY8"/>
+              </a:cxn>
+              <a:cxn ang="0">
+                <a:pos x="connsiteX9" y="connsiteY9"/>
+              </a:cxn>
+              <a:cxn ang="0">
+                <a:pos x="connsiteX10" y="connsiteY10"/>
+              </a:cxn>
+              <a:cxn ang="0">
+                <a:pos x="connsiteX11" y="connsiteY11"/>
+              </a:cxn>
+              <a:cxn ang="0">
+                <a:pos x="connsiteX12" y="connsiteY12"/>
+              </a:cxn>
+              <a:cxn ang="0">
+                <a:pos x="connsiteX13" y="connsiteY13"/>
+              </a:cxn>
+              <a:cxn ang="0">
+                <a:pos x="connsiteX14" y="connsiteY14"/>
+              </a:cxn>
+              <a:cxn ang="0">
+                <a:pos x="connsiteX15" y="connsiteY15"/>
+              </a:cxn>
+              <a:cxn ang="0">
+                <a:pos x="connsiteX16" y="connsiteY16"/>
+              </a:cxn>
+              <a:cxn ang="0">
+                <a:pos x="connsiteX17" y="connsiteY17"/>
+              </a:cxn>
+              <a:cxn ang="0">
+                <a:pos x="connsiteX18" y="connsiteY18"/>
+              </a:cxn>
+              <a:cxn ang="0">
+                <a:pos x="connsiteX19" y="connsiteY19"/>
+              </a:cxn>
+              <a:cxn ang="0">
+                <a:pos x="connsiteX20" y="connsiteY20"/>
+              </a:cxn>
+              <a:cxn ang="0">
+                <a:pos x="connsiteX21" y="connsiteY21"/>
+              </a:cxn>
+              <a:cxn ang="0">
+                <a:pos x="connsiteX22" y="connsiteY22"/>
+              </a:cxn>
+              <a:cxn ang="0">
+                <a:pos x="connsiteX23" y="connsiteY23"/>
+              </a:cxn>
+              <a:cxn ang="0">
+                <a:pos x="connsiteX24" y="connsiteY24"/>
+              </a:cxn>
+              <a:cxn ang="0">
+                <a:pos x="connsiteX25" y="connsiteY25"/>
+              </a:cxn>
+              <a:cxn ang="0">
+                <a:pos x="connsiteX26" y="connsiteY26"/>
+              </a:cxn>
+              <a:cxn ang="0">
+                <a:pos x="connsiteX27" y="connsiteY27"/>
+              </a:cxn>
+              <a:cxn ang="0">
+                <a:pos x="connsiteX28" y="connsiteY28"/>
+              </a:cxn>
+              <a:cxn ang="0">
+                <a:pos x="connsiteX29" y="connsiteY29"/>
+              </a:cxn>
+              <a:cxn ang="0">
+                <a:pos x="connsiteX30" y="connsiteY30"/>
+              </a:cxn>
+              <a:cxn ang="0">
+                <a:pos x="connsiteX31" y="connsiteY31"/>
+              </a:cxn>
+              <a:cxn ang="0">
+                <a:pos x="connsiteX32" y="connsiteY32"/>
+              </a:cxn>
+              <a:cxn ang="0">
+                <a:pos x="connsiteX33" y="connsiteY33"/>
+              </a:cxn>
+              <a:cxn ang="0">
+                <a:pos x="connsiteX34" y="connsiteY34"/>
+              </a:cxn>
+              <a:cxn ang="0">
+                <a:pos x="connsiteX35" y="connsiteY35"/>
+              </a:cxn>
+              <a:cxn ang="0">
+                <a:pos x="connsiteX36" y="connsiteY36"/>
+              </a:cxn>
+              <a:cxn ang="0">
+                <a:pos x="connsiteX37" y="connsiteY37"/>
+              </a:cxn>
+              <a:cxn ang="0">
+                <a:pos x="connsiteX38" y="connsiteY38"/>
+              </a:cxn>
+              <a:cxn ang="0">
+                <a:pos x="connsiteX39" y="connsiteY39"/>
+              </a:cxn>
+              <a:cxn ang="0">
+                <a:pos x="connsiteX40" y="connsiteY40"/>
+              </a:cxn>
+              <a:cxn ang="0">
+                <a:pos x="connsiteX41" y="connsiteY41"/>
+              </a:cxn>
+              <a:cxn ang="0">
+                <a:pos x="connsiteX42" y="connsiteY42"/>
+              </a:cxn>
+              <a:cxn ang="0">
+                <a:pos x="connsiteX43" y="connsiteY43"/>
+              </a:cxn>
+              <a:cxn ang="0">
+                <a:pos x="connsiteX44" y="connsiteY44"/>
+              </a:cxn>
+              <a:cxn ang="0">
+                <a:pos x="connsiteX45" y="connsiteY45"/>
+              </a:cxn>
+              <a:cxn ang="0">
+                <a:pos x="connsiteX46" y="connsiteY46"/>
+              </a:cxn>
+              <a:cxn ang="0">
+                <a:pos x="connsiteX47" y="connsiteY47"/>
+              </a:cxn>
+              <a:cxn ang="0">
+                <a:pos x="connsiteX48" y="connsiteY48"/>
+              </a:cxn>
+              <a:cxn ang="0">
+                <a:pos x="connsiteX49" y="connsiteY49"/>
+              </a:cxn>
+              <a:cxn ang="0">
+                <a:pos x="connsiteX50" y="connsiteY50"/>
+              </a:cxn>
+              <a:cxn ang="0">
+                <a:pos x="connsiteX51" y="connsiteY51"/>
+              </a:cxn>
+              <a:cxn ang="0">
+                <a:pos x="connsiteX52" y="connsiteY52"/>
+              </a:cxn>
+            </a:cxnLst>
+            <a:rect l="l" t="t" r="r" b="b"/>
+            <a:pathLst>
+              <a:path w="11282409" h="2930115">
+                <a:moveTo>
+                  <a:pt x="1277174" y="0"/>
+                </a:moveTo>
+                <a:lnTo>
+                  <a:pt x="11077320" y="0"/>
+                </a:lnTo>
+                <a:lnTo>
+                  <a:pt x="10933044" y="93916"/>
+                </a:lnTo>
+                <a:cubicBezTo>
+                  <a:pt x="10973237" y="147389"/>
+                  <a:pt x="11059805" y="83222"/>
+                  <a:pt x="11087630" y="165214"/>
+                </a:cubicBezTo>
+                <a:cubicBezTo>
+                  <a:pt x="10865028" y="304245"/>
+                  <a:pt x="10660974" y="478924"/>
+                  <a:pt x="10401271" y="582307"/>
+                </a:cubicBezTo>
+                <a:cubicBezTo>
+                  <a:pt x="10614599" y="507443"/>
+                  <a:pt x="10827927" y="543093"/>
+                  <a:pt x="11038163" y="511009"/>
+                </a:cubicBezTo>
+                <a:cubicBezTo>
+                  <a:pt x="11065988" y="553787"/>
+                  <a:pt x="11019613" y="553787"/>
+                  <a:pt x="11004154" y="568047"/>
+                </a:cubicBezTo>
+                <a:cubicBezTo>
+                  <a:pt x="10988696" y="582307"/>
+                  <a:pt x="10967053" y="593001"/>
+                  <a:pt x="10970146" y="625085"/>
+                </a:cubicBezTo>
+                <a:cubicBezTo>
+                  <a:pt x="11065988" y="639345"/>
+                  <a:pt x="11171107" y="589437"/>
+                  <a:pt x="11270042" y="589437"/>
+                </a:cubicBezTo>
+                <a:lnTo>
+                  <a:pt x="11270042" y="650039"/>
+                </a:lnTo>
+                <a:cubicBezTo>
+                  <a:pt x="11236032" y="671428"/>
+                  <a:pt x="11192750" y="678558"/>
+                  <a:pt x="11177291" y="721337"/>
+                </a:cubicBezTo>
+                <a:cubicBezTo>
+                  <a:pt x="11208207" y="714208"/>
+                  <a:pt x="11239125" y="710643"/>
+                  <a:pt x="11270042" y="703512"/>
+                </a:cubicBezTo>
+                <a:lnTo>
+                  <a:pt x="11282409" y="703512"/>
+                </a:lnTo>
+                <a:lnTo>
+                  <a:pt x="11282409" y="981574"/>
+                </a:lnTo>
+                <a:cubicBezTo>
+                  <a:pt x="9254245" y="2952959"/>
+                  <a:pt x="4397165" y="2906615"/>
+                  <a:pt x="4053985" y="2928005"/>
+                </a:cubicBezTo>
+                <a:cubicBezTo>
+                  <a:pt x="3945776" y="2935134"/>
+                  <a:pt x="3491294" y="2924439"/>
+                  <a:pt x="3386175" y="2892355"/>
+                </a:cubicBezTo>
+                <a:cubicBezTo>
+                  <a:pt x="3243956" y="2853141"/>
+                  <a:pt x="3228499" y="2774714"/>
+                  <a:pt x="3228499" y="2774714"/>
+                </a:cubicBezTo>
+                <a:cubicBezTo>
+                  <a:pt x="3228499" y="2774714"/>
+                  <a:pt x="3299608" y="2742630"/>
+                  <a:pt x="3389267" y="2717676"/>
+                </a:cubicBezTo>
+                <a:cubicBezTo>
+                  <a:pt x="3562404" y="2667768"/>
+                  <a:pt x="3704623" y="2575080"/>
+                  <a:pt x="3883942" y="2535866"/>
+                </a:cubicBezTo>
+                <a:cubicBezTo>
+                  <a:pt x="3723173" y="2546561"/>
+                  <a:pt x="3562404" y="2553691"/>
+                  <a:pt x="3401634" y="2564386"/>
+                </a:cubicBezTo>
+                <a:cubicBezTo>
+                  <a:pt x="3624237" y="2468133"/>
+                  <a:pt x="3859208" y="2453874"/>
+                  <a:pt x="4087994" y="2414660"/>
+                </a:cubicBezTo>
+                <a:cubicBezTo>
+                  <a:pt x="4162197" y="2403966"/>
+                  <a:pt x="4285864" y="2436049"/>
+                  <a:pt x="4285864" y="2336233"/>
+                </a:cubicBezTo>
+                <a:cubicBezTo>
+                  <a:pt x="4282774" y="2272064"/>
+                  <a:pt x="4162197" y="2300584"/>
+                  <a:pt x="4091088" y="2304149"/>
+                </a:cubicBezTo>
+                <a:cubicBezTo>
+                  <a:pt x="3775732" y="2314843"/>
+                  <a:pt x="3463469" y="2361187"/>
+                  <a:pt x="3148114" y="2400401"/>
+                </a:cubicBezTo>
+                <a:cubicBezTo>
+                  <a:pt x="3117196" y="2403966"/>
+                  <a:pt x="3080097" y="2421790"/>
+                  <a:pt x="3058455" y="2411095"/>
+                </a:cubicBezTo>
+                <a:cubicBezTo>
+                  <a:pt x="2879135" y="2339797"/>
+                  <a:pt x="2675082" y="2357622"/>
+                  <a:pt x="2443203" y="2336233"/>
+                </a:cubicBezTo>
+                <a:cubicBezTo>
+                  <a:pt x="2569963" y="2254241"/>
+                  <a:pt x="2678173" y="2311278"/>
+                  <a:pt x="2786383" y="2257805"/>
+                </a:cubicBezTo>
+                <a:cubicBezTo>
+                  <a:pt x="2653440" y="2200766"/>
+                  <a:pt x="2517405" y="2225722"/>
+                  <a:pt x="2390644" y="2211461"/>
+                </a:cubicBezTo>
+                <a:cubicBezTo>
+                  <a:pt x="2297893" y="2200766"/>
+                  <a:pt x="1963988" y="2186507"/>
+                  <a:pt x="1911429" y="2168683"/>
+                </a:cubicBezTo>
+                <a:cubicBezTo>
+                  <a:pt x="1750660" y="2115209"/>
+                  <a:pt x="1558974" y="2122339"/>
+                  <a:pt x="1416755" y="2026087"/>
+                </a:cubicBezTo>
+                <a:cubicBezTo>
+                  <a:pt x="1314728" y="1958354"/>
+                  <a:pt x="1178693" y="2015393"/>
+                  <a:pt x="1070483" y="1979743"/>
+                </a:cubicBezTo>
+                <a:cubicBezTo>
+                  <a:pt x="1024107" y="1929835"/>
+                  <a:pt x="1089033" y="1894186"/>
+                  <a:pt x="1104491" y="1854972"/>
+                </a:cubicBezTo>
+                <a:cubicBezTo>
+                  <a:pt x="1126133" y="1805064"/>
+                  <a:pt x="1067391" y="1794370"/>
+                  <a:pt x="1039566" y="1748026"/>
+                </a:cubicBezTo>
+                <a:cubicBezTo>
+                  <a:pt x="1231252" y="1751591"/>
+                  <a:pt x="1413663" y="1737331"/>
+                  <a:pt x="1623900" y="1694553"/>
+                </a:cubicBezTo>
+                <a:cubicBezTo>
+                  <a:pt x="1537332" y="1630384"/>
+                  <a:pt x="1463130" y="1690987"/>
+                  <a:pt x="1401296" y="1676728"/>
+                </a:cubicBezTo>
+                <a:cubicBezTo>
+                  <a:pt x="1358012" y="1666033"/>
+                  <a:pt x="1302362" y="1676728"/>
+                  <a:pt x="1302362" y="1623255"/>
+                </a:cubicBezTo>
+                <a:cubicBezTo>
+                  <a:pt x="1302362" y="1580476"/>
+                  <a:pt x="1351829" y="1573345"/>
+                  <a:pt x="1385838" y="1566216"/>
+                </a:cubicBezTo>
+                <a:cubicBezTo>
+                  <a:pt x="1518781" y="1541262"/>
+                  <a:pt x="1648633" y="1509178"/>
+                  <a:pt x="1756843" y="1377277"/>
+                </a:cubicBezTo>
+                <a:cubicBezTo>
+                  <a:pt x="1407480" y="1334499"/>
+                  <a:pt x="1048840" y="1502049"/>
+                  <a:pt x="721120" y="1387972"/>
+                </a:cubicBezTo>
+                <a:cubicBezTo>
+                  <a:pt x="748945" y="1313109"/>
+                  <a:pt x="813871" y="1327368"/>
+                  <a:pt x="857154" y="1323803"/>
+                </a:cubicBezTo>
+                <a:cubicBezTo>
+                  <a:pt x="1147775" y="1291720"/>
+                  <a:pt x="2127849" y="903147"/>
+                  <a:pt x="2285525" y="924536"/>
+                </a:cubicBezTo>
+                <a:cubicBezTo>
+                  <a:pt x="2381369" y="935231"/>
+                  <a:pt x="2480304" y="928101"/>
+                  <a:pt x="2569963" y="874628"/>
+                </a:cubicBezTo>
+                <a:cubicBezTo>
+                  <a:pt x="2678173" y="810460"/>
+                  <a:pt x="1988721" y="945926"/>
+                  <a:pt x="1803218" y="856803"/>
+                </a:cubicBezTo>
+                <a:cubicBezTo>
+                  <a:pt x="1713559" y="814024"/>
+                  <a:pt x="956090" y="689253"/>
+                  <a:pt x="625276" y="682124"/>
+                </a:cubicBezTo>
+                <a:cubicBezTo>
+                  <a:pt x="656194" y="614390"/>
+                  <a:pt x="770587" y="617955"/>
+                  <a:pt x="736578" y="521703"/>
+                </a:cubicBezTo>
+                <a:cubicBezTo>
+                  <a:pt x="557259" y="514574"/>
+                  <a:pt x="365573" y="575176"/>
+                  <a:pt x="155336" y="550222"/>
+                </a:cubicBezTo>
+                <a:cubicBezTo>
+                  <a:pt x="229537" y="464666"/>
+                  <a:pt x="337746" y="471795"/>
+                  <a:pt x="421223" y="425451"/>
+                </a:cubicBezTo>
+                <a:cubicBezTo>
+                  <a:pt x="356297" y="361283"/>
+                  <a:pt x="275913" y="400497"/>
+                  <a:pt x="201712" y="404062"/>
+                </a:cubicBezTo>
+                <a:cubicBezTo>
+                  <a:pt x="136786" y="407627"/>
+                  <a:pt x="-27075" y="318505"/>
+                  <a:pt x="3843" y="314939"/>
+                </a:cubicBezTo>
+                <a:cubicBezTo>
+                  <a:pt x="282096" y="293551"/>
+                  <a:pt x="551076" y="197299"/>
+                  <a:pt x="829329" y="175909"/>
+                </a:cubicBezTo>
+                <a:cubicBezTo>
+                  <a:pt x="922080" y="168779"/>
+                  <a:pt x="1027200" y="175909"/>
+                  <a:pt x="1045749" y="47572"/>
+                </a:cubicBezTo>
+                <a:cubicBezTo>
+                  <a:pt x="1048840" y="11924"/>
+                  <a:pt x="1039566" y="4795"/>
+                  <a:pt x="1172509" y="11924"/>
+                </a:cubicBezTo>
+                <a:cubicBezTo>
+                  <a:pt x="1198789" y="13707"/>
+                  <a:pt x="1228933" y="14598"/>
+                  <a:pt x="1257531" y="7914"/>
+                </a:cubicBezTo>
+                <a:close/>
+              </a:path>
+            </a:pathLst>
+          </a:custGeom>
+          <a:solidFill>
+            <a:srgbClr val="7BB11F">
+              <a:alpha val="20000"/>
+            </a:srgbClr>
+          </a:solidFill>
+          <a:ln w="32707" cap="flat">
+            <a:noFill/>
+            <a:prstDash val="solid"/>
+            <a:miter/>
+          </a:ln>
+        </p:spPr>
+        <p:txBody>
+          <a:bodyPr wrap="square" rtlCol="0" anchor="ctr">
+            <a:noAutofit/>
+          </a:bodyPr>
+          <a:lstStyle/>
+          <a:p>
+            <a:endParaRPr lang="en-US">
+              <a:solidFill>
+                <a:schemeClr val="tx1"/>
+              </a:solidFill>
+            </a:endParaRPr>
+          </a:p>
+        </p:txBody>
+      </p:sp>
+    </p:spTree>
+    <p:extLst>
+      <p:ext uri="{BB962C8B-B14F-4D97-AF65-F5344CB8AC3E}">
+        <p14:creationId xmlns:p14="http://schemas.microsoft.com/office/powerpoint/2010/main" val="1334147319"/>
+      </p:ext>
+    </p:extLst>
+  </p:cSld>
+  <p:clrMapOvr>
+    <a:masterClrMapping/>
+  </p:clrMapOvr>
+</p:sld>
+</file>
+
+<file path=ppt/slides/slide3.xml><?xml version="1.0" encoding="utf-8"?>
+<p:sld xmlns:a="http://schemas.openxmlformats.org/drawingml/2006/main" xmlns:r="http://schemas.openxmlformats.org/officeDocument/2006/relationships" xmlns:p="http://schemas.openxmlformats.org/presentationml/2006/main">
+  <p:cSld>
+    <p:bg>
+      <p:bgPr>
+        <a:solidFill>
+          <a:schemeClr val="bg1"/>
+        </a:solidFill>
+        <a:effectLst/>
+      </p:bgPr>
+    </p:bg>
+    <p:spTree>
+      <p:nvGrpSpPr>
+        <p:cNvPr id="1" name=""/>
+        <p:cNvGrpSpPr/>
+        <p:nvPr/>
+      </p:nvGrpSpPr>
+      <p:grpSpPr>
+        <a:xfrm>
+          <a:off x="0" y="0"/>
+          <a:ext cx="0" cy="0"/>
+          <a:chOff x="0" y="0"/>
+          <a:chExt cx="0" cy="0"/>
+        </a:xfrm>
+      </p:grpSpPr>
+      <p:sp useBgFill="1">
+        <p:nvSpPr>
+          <p:cNvPr id="16" name="Rectangle 15">
+            <a:extLst>
+              <a:ext uri="{FF2B5EF4-FFF2-40B4-BE49-F238E27FC236}">
+                <a16:creationId xmlns:a16="http://schemas.microsoft.com/office/drawing/2014/main" id="{D8628CD4-C616-4AE5-93ED-5825EFB50E4E}"/>
+              </a:ext>
+              <a:ext uri="{C183D7F6-B498-43B3-948B-1728B52AA6E4}">
+                <adec:decorative xmlns:adec="http://schemas.microsoft.com/office/drawing/2017/decorative" val="1"/>
+              </a:ext>
+            </a:extLst>
+          </p:cNvPr>
+          <p:cNvSpPr>
+            <a:spLocks noGrp="1" noRot="1" noChangeAspect="1" noMove="1" noResize="1" noEditPoints="1" noAdjustHandles="1" noChangeArrowheads="1" noChangeShapeType="1" noTextEdit="1"/>
+          </p:cNvSpPr>
+          <p:nvPr>
+            <p:extLst>
+              <p:ext uri="{386F3935-93C4-4BCD-93E2-E3B085C9AB24}">
+                <p16:designElem xmlns:p16="http://schemas.microsoft.com/office/powerpoint/2015/main" val="1"/>
+              </p:ext>
+            </p:extLst>
+          </p:nvPr>
+        </p:nvSpPr>
+        <p:spPr>
+          <a:xfrm>
+            <a:off x="0" y="0"/>
+            <a:ext cx="12188952" cy="6858000"/>
+          </a:xfrm>
+          <a:prstGeom prst="rect">
+            <a:avLst/>
+          </a:prstGeom>
+          <a:ln>
+            <a:noFill/>
+          </a:ln>
+        </p:spPr>
+        <p:style>
+          <a:lnRef idx="2">
+            <a:schemeClr val="accent1">
+              <a:shade val="50000"/>
+            </a:schemeClr>
+          </a:lnRef>
+          <a:fillRef idx="1">
+            <a:schemeClr val="accent1"/>
+          </a:fillRef>
+          <a:effectRef idx="0">
+            <a:schemeClr val="accent1"/>
+          </a:effectRef>
+          <a:fontRef idx="minor">
+            <a:schemeClr val="lt1"/>
+          </a:fontRef>
+        </p:style>
+        <p:txBody>
+          <a:bodyPr rtlCol="0" anchor="ctr"/>
+          <a:lstStyle/>
+          <a:p>
+            <a:pPr algn="ctr"/>
+            <a:endParaRPr lang="en-US"/>
+          </a:p>
+        </p:txBody>
+      </p:sp>
+      <p:sp>
+        <p:nvSpPr>
+          <p:cNvPr id="18" name="Rectangle 17">
+            <a:extLst>
+              <a:ext uri="{FF2B5EF4-FFF2-40B4-BE49-F238E27FC236}">
+                <a16:creationId xmlns:a16="http://schemas.microsoft.com/office/drawing/2014/main" id="{EC151479-028A-44AB-BBD0-BFBDDD0902DE}"/>
+              </a:ext>
+              <a:ext uri="{C183D7F6-B498-43B3-948B-1728B52AA6E4}">
+                <adec:decorative xmlns:adec="http://schemas.microsoft.com/office/drawing/2017/decorative" val="1"/>
+              </a:ext>
+            </a:extLst>
+          </p:cNvPr>
+          <p:cNvSpPr>
+            <a:spLocks noGrp="1" noRot="1" noChangeAspect="1" noMove="1" noResize="1" noEditPoints="1" noAdjustHandles="1" noChangeArrowheads="1" noChangeShapeType="1" noTextEdit="1"/>
+          </p:cNvSpPr>
+          <p:nvPr>
+            <p:extLst>
+              <p:ext uri="{386F3935-93C4-4BCD-93E2-E3B085C9AB24}">
+                <p16:designElem xmlns:p16="http://schemas.microsoft.com/office/powerpoint/2015/main" val="1"/>
+              </p:ext>
+            </p:extLst>
+          </p:nvPr>
+        </p:nvSpPr>
+        <p:spPr>
+          <a:xfrm>
+            <a:off x="504444" y="507492"/>
+            <a:ext cx="11183112" cy="5843016"/>
+          </a:xfrm>
+          <a:prstGeom prst="rect">
+            <a:avLst/>
+          </a:prstGeom>
+          <a:solidFill>
+            <a:srgbClr val="FFFFFF"/>
+          </a:solidFill>
+          <a:ln>
+            <a:solidFill>
+              <a:schemeClr val="tx1">
+                <a:lumMod val="75000"/>
+                <a:lumOff val="25000"/>
+              </a:schemeClr>
+            </a:solidFill>
+          </a:ln>
+        </p:spPr>
+        <p:style>
+          <a:lnRef idx="2">
+            <a:schemeClr val="accent1">
+              <a:shade val="50000"/>
+            </a:schemeClr>
+          </a:lnRef>
+          <a:fillRef idx="1">
+            <a:schemeClr val="accent1"/>
+          </a:fillRef>
+          <a:effectRef idx="0">
+            <a:schemeClr val="accent1"/>
+          </a:effectRef>
+          <a:fontRef idx="minor">
+            <a:schemeClr val="lt1"/>
+          </a:fontRef>
+        </p:style>
+        <p:txBody>
+          <a:bodyPr rtlCol="0" anchor="ctr"/>
+          <a:lstStyle/>
+          <a:p>
+            <a:pPr algn="ctr"/>
+            <a:endParaRPr lang="en-US"/>
+          </a:p>
+        </p:txBody>
+      </p:sp>
+      <p:pic>
+        <p:nvPicPr>
+          <p:cNvPr id="4" name="Content Placeholder 3">
+            <a:extLst>
+              <a:ext uri="{FF2B5EF4-FFF2-40B4-BE49-F238E27FC236}">
+                <a16:creationId xmlns:a16="http://schemas.microsoft.com/office/drawing/2014/main" id="{6E4608FE-5A9A-E943-8044-4E1422A61CEE}"/>
+              </a:ext>
+            </a:extLst>
+          </p:cNvPr>
+          <p:cNvPicPr>
+            <a:picLocks noGrp="1" noChangeAspect="1"/>
+          </p:cNvPicPr>
+          <p:nvPr>
+            <p:ph idx="1"/>
+          </p:nvPr>
+        </p:nvPicPr>
+        <p:blipFill rotWithShape="1">
+          <a:blip r:embed="rId2"/>
+          <a:srcRect l="1672" t="-1" r="5076" b="2"/>
+          <a:stretch/>
+        </p:blipFill>
+        <p:spPr>
+          <a:xfrm>
+            <a:off x="602951" y="1014607"/>
+            <a:ext cx="10986098" cy="5124769"/>
+          </a:xfrm>
+          <a:prstGeom prst="rect">
+            <a:avLst/>
+          </a:prstGeom>
+        </p:spPr>
+      </p:pic>
+    </p:spTree>
+    <p:extLst>
+      <p:ext uri="{BB962C8B-B14F-4D97-AF65-F5344CB8AC3E}">
+        <p14:creationId xmlns:p14="http://schemas.microsoft.com/office/powerpoint/2010/main" val="2841131347"/>
+      </p:ext>
+    </p:extLst>
+  </p:cSld>
+  <p:clrMapOvr>
+    <a:masterClrMapping/>
+  </p:clrMapOvr>
+</p:sld>
+</file>
+
+<file path=ppt/slides/slide4.xml><?xml version="1.0" encoding="utf-8"?>
+<p:sld xmlns:a="http://schemas.openxmlformats.org/drawingml/2006/main" xmlns:r="http://schemas.openxmlformats.org/officeDocument/2006/relationships" xmlns:p="http://schemas.openxmlformats.org/presentationml/2006/main">
+  <p:cSld>
+    <p:spTree>
+      <p:nvGrpSpPr>
+        <p:cNvPr id="1" name=""/>
+        <p:cNvGrpSpPr/>
+        <p:nvPr/>
+      </p:nvGrpSpPr>
+      <p:grpSpPr>
+        <a:xfrm>
+          <a:off x="0" y="0"/>
+          <a:ext cx="0" cy="0"/>
+          <a:chOff x="0" y="0"/>
+          <a:chExt cx="0" cy="0"/>
+        </a:xfrm>
+      </p:grpSpPr>
+      <p:sp>
+        <p:nvSpPr>
+          <p:cNvPr id="2" name="Title 1">
+            <a:extLst>
+              <a:ext uri="{FF2B5EF4-FFF2-40B4-BE49-F238E27FC236}">
+                <a16:creationId xmlns:a16="http://schemas.microsoft.com/office/drawing/2014/main" id="{3A2FBC58-2ED3-DF49-A4BC-C003D1BE6198}"/>
+              </a:ext>
+            </a:extLst>
+          </p:cNvPr>
+          <p:cNvSpPr>
+            <a:spLocks noGrp="1"/>
+          </p:cNvSpPr>
+          <p:nvPr>
+            <p:ph type="title"/>
+          </p:nvPr>
+        </p:nvSpPr>
+        <p:spPr>
+          <a:xfrm>
+            <a:off x="838200" y="1113158"/>
+            <a:ext cx="5409042" cy="2806704"/>
+          </a:xfrm>
+        </p:spPr>
+        <p:txBody>
+          <a:bodyPr vert="horz" lIns="91440" tIns="45720" rIns="91440" bIns="45720" rtlCol="0" anchor="b">
+            <a:normAutofit/>
+          </a:bodyPr>
+          <a:lstStyle/>
+          <a:p>
+            <a:r>
+              <a:rPr lang="en-US" sz="4800" dirty="0"/>
+              <a:t>Structural Assumptions</a:t>
+            </a:r>
+          </a:p>
+        </p:txBody>
+      </p:sp>
+      <p:sp>
+        <p:nvSpPr>
+          <p:cNvPr id="4" name="Text Placeholder 3">
+            <a:extLst>
+              <a:ext uri="{FF2B5EF4-FFF2-40B4-BE49-F238E27FC236}">
+                <a16:creationId xmlns:a16="http://schemas.microsoft.com/office/drawing/2014/main" id="{94ABFE83-123E-5E48-ABD9-F6461028B64C}"/>
+              </a:ext>
+            </a:extLst>
+          </p:cNvPr>
+          <p:cNvSpPr>
+            <a:spLocks noGrp="1"/>
+          </p:cNvSpPr>
+          <p:nvPr>
+            <p:ph type="body" sz="half" idx="2"/>
+          </p:nvPr>
+        </p:nvSpPr>
+        <p:spPr>
+          <a:xfrm>
+            <a:off x="838199" y="3986940"/>
+            <a:ext cx="5409042" cy="1467873"/>
+          </a:xfrm>
+        </p:spPr>
+        <p:txBody>
+          <a:bodyPr vert="horz" lIns="91440" tIns="45720" rIns="91440" bIns="45720" rtlCol="0">
+            <a:normAutofit/>
+          </a:bodyPr>
+          <a:lstStyle/>
+          <a:p>
+            <a:r>
+              <a:rPr lang="en-US" sz="2400" dirty="0"/>
+              <a:t>MATERIALS</a:t>
+            </a:r>
+          </a:p>
+        </p:txBody>
+      </p:sp>
+      <p:pic>
+        <p:nvPicPr>
+          <p:cNvPr id="5" name="Picture 4">
+            <a:extLst>
+              <a:ext uri="{FF2B5EF4-FFF2-40B4-BE49-F238E27FC236}">
+                <a16:creationId xmlns:a16="http://schemas.microsoft.com/office/drawing/2014/main" id="{73E0EAA8-4230-5C4C-AFF1-980D8893BE0A}"/>
+              </a:ext>
+            </a:extLst>
+          </p:cNvPr>
+          <p:cNvPicPr>
+            <a:picLocks noChangeAspect="1"/>
+          </p:cNvPicPr>
+          <p:nvPr/>
+        </p:nvPicPr>
+        <p:blipFill>
+          <a:blip r:embed="rId2"/>
+          <a:stretch>
+            <a:fillRect/>
+          </a:stretch>
+        </p:blipFill>
+        <p:spPr>
+          <a:xfrm>
+            <a:off x="5861870" y="937925"/>
+            <a:ext cx="5714768" cy="2243045"/>
+          </a:xfrm>
+          <a:prstGeom prst="rect">
+            <a:avLst/>
+          </a:prstGeom>
+        </p:spPr>
+      </p:pic>
+      <p:pic>
+        <p:nvPicPr>
+          <p:cNvPr id="7" name="Picture 6">
+            <a:extLst>
+              <a:ext uri="{FF2B5EF4-FFF2-40B4-BE49-F238E27FC236}">
+                <a16:creationId xmlns:a16="http://schemas.microsoft.com/office/drawing/2014/main" id="{12B66A20-46CF-A944-980F-297B5DD0B48B}"/>
+              </a:ext>
+            </a:extLst>
+          </p:cNvPr>
+          <p:cNvPicPr>
+            <a:picLocks noChangeAspect="1"/>
+          </p:cNvPicPr>
+          <p:nvPr/>
+        </p:nvPicPr>
+        <p:blipFill>
+          <a:blip r:embed="rId3"/>
+          <a:stretch>
+            <a:fillRect/>
+          </a:stretch>
+        </p:blipFill>
+        <p:spPr>
+          <a:xfrm>
+            <a:off x="6360793" y="3644911"/>
+            <a:ext cx="4771099" cy="2910371"/>
+          </a:xfrm>
+          <a:prstGeom prst="rect">
+            <a:avLst/>
+          </a:prstGeom>
+        </p:spPr>
+      </p:pic>
+    </p:spTree>
+    <p:extLst>
+      <p:ext uri="{BB962C8B-B14F-4D97-AF65-F5344CB8AC3E}">
+        <p14:creationId xmlns:p14="http://schemas.microsoft.com/office/powerpoint/2010/main" val="177038618"/>
+      </p:ext>
+    </p:extLst>
+  </p:cSld>
+  <p:clrMapOvr>
+    <a:masterClrMapping/>
+  </p:clrMapOvr>
+</p:sld>
+</file>
+
+<file path=ppt/slides/slide5.xml><?xml version="1.0" encoding="utf-8"?>
+<p:sld xmlns:a="http://schemas.openxmlformats.org/drawingml/2006/main" xmlns:r="http://schemas.openxmlformats.org/officeDocument/2006/relationships" xmlns:p="http://schemas.openxmlformats.org/presentationml/2006/main">
+  <p:cSld>
+    <p:spTree>
+      <p:nvGrpSpPr>
+        <p:cNvPr id="1" name=""/>
+        <p:cNvGrpSpPr/>
+        <p:nvPr/>
+      </p:nvGrpSpPr>
+      <p:grpSpPr>
+        <a:xfrm>
+          <a:off x="0" y="0"/>
+          <a:ext cx="0" cy="0"/>
+          <a:chOff x="0" y="0"/>
+          <a:chExt cx="0" cy="0"/>
+        </a:xfrm>
+      </p:grpSpPr>
+      <p:sp>
+        <p:nvSpPr>
+          <p:cNvPr id="2" name="Title 1">
+            <a:extLst>
+              <a:ext uri="{FF2B5EF4-FFF2-40B4-BE49-F238E27FC236}">
+                <a16:creationId xmlns:a16="http://schemas.microsoft.com/office/drawing/2014/main" id="{3A2FBC58-2ED3-DF49-A4BC-C003D1BE6198}"/>
+              </a:ext>
+            </a:extLst>
+          </p:cNvPr>
+          <p:cNvSpPr>
+            <a:spLocks noGrp="1"/>
+          </p:cNvSpPr>
+          <p:nvPr>
+            <p:ph type="title"/>
+          </p:nvPr>
+        </p:nvSpPr>
+        <p:spPr>
+          <a:xfrm>
+            <a:off x="838200" y="1113158"/>
+            <a:ext cx="5409042" cy="2806704"/>
+          </a:xfrm>
+        </p:spPr>
+        <p:txBody>
+          <a:bodyPr vert="horz" lIns="91440" tIns="45720" rIns="91440" bIns="45720" rtlCol="0" anchor="b">
+            <a:normAutofit/>
+          </a:bodyPr>
+          <a:lstStyle/>
+          <a:p>
+            <a:r>
+              <a:rPr lang="en-US" sz="4800"/>
+              <a:t>Structural Assumptions</a:t>
+            </a:r>
+          </a:p>
+        </p:txBody>
+      </p:sp>
+      <p:sp>
+        <p:nvSpPr>
+          <p:cNvPr id="4" name="Text Placeholder 3">
+            <a:extLst>
+              <a:ext uri="{FF2B5EF4-FFF2-40B4-BE49-F238E27FC236}">
+                <a16:creationId xmlns:a16="http://schemas.microsoft.com/office/drawing/2014/main" id="{94ABFE83-123E-5E48-ABD9-F6461028B64C}"/>
+              </a:ext>
+            </a:extLst>
+          </p:cNvPr>
+          <p:cNvSpPr>
+            <a:spLocks noGrp="1"/>
+          </p:cNvSpPr>
+          <p:nvPr>
+            <p:ph type="body" sz="half" idx="2"/>
+          </p:nvPr>
+        </p:nvSpPr>
+        <p:spPr>
+          <a:xfrm>
+            <a:off x="838199" y="3986940"/>
+            <a:ext cx="5409042" cy="1467873"/>
+          </a:xfrm>
+        </p:spPr>
+        <p:txBody>
+          <a:bodyPr vert="horz" lIns="91440" tIns="45720" rIns="91440" bIns="45720" rtlCol="0">
+            <a:normAutofit/>
+          </a:bodyPr>
+          <a:lstStyle/>
+          <a:p>
+            <a:r>
+              <a:rPr lang="en-US" sz="2400" dirty="0"/>
+              <a:t>LOADING</a:t>
+            </a:r>
+          </a:p>
+        </p:txBody>
+      </p:sp>
+      <p:pic>
+        <p:nvPicPr>
+          <p:cNvPr id="3" name="Picture 2">
+            <a:extLst>
+              <a:ext uri="{FF2B5EF4-FFF2-40B4-BE49-F238E27FC236}">
+                <a16:creationId xmlns:a16="http://schemas.microsoft.com/office/drawing/2014/main" id="{291EA034-0493-E244-A950-A608D9BEE6E3}"/>
+              </a:ext>
+            </a:extLst>
+          </p:cNvPr>
+          <p:cNvPicPr>
+            <a:picLocks noChangeAspect="1"/>
+          </p:cNvPicPr>
+          <p:nvPr/>
+        </p:nvPicPr>
+        <p:blipFill>
+          <a:blip r:embed="rId2"/>
+          <a:stretch>
+            <a:fillRect/>
+          </a:stretch>
+        </p:blipFill>
+        <p:spPr>
+          <a:xfrm>
+            <a:off x="5898460" y="302718"/>
+            <a:ext cx="4920033" cy="2453008"/>
+          </a:xfrm>
+          <a:prstGeom prst="rect">
+            <a:avLst/>
+          </a:prstGeom>
+        </p:spPr>
+      </p:pic>
+      <p:pic>
+        <p:nvPicPr>
+          <p:cNvPr id="6" name="Picture 5">
+            <a:extLst>
+              <a:ext uri="{FF2B5EF4-FFF2-40B4-BE49-F238E27FC236}">
+                <a16:creationId xmlns:a16="http://schemas.microsoft.com/office/drawing/2014/main" id="{2BDACC65-8DF2-8F43-8F0F-192C6C9F5D05}"/>
+              </a:ext>
+            </a:extLst>
+          </p:cNvPr>
+          <p:cNvPicPr>
+            <a:picLocks noChangeAspect="1"/>
+          </p:cNvPicPr>
+          <p:nvPr/>
+        </p:nvPicPr>
+        <p:blipFill>
+          <a:blip r:embed="rId3"/>
+          <a:stretch>
+            <a:fillRect/>
+          </a:stretch>
+        </p:blipFill>
+        <p:spPr>
+          <a:xfrm>
+            <a:off x="0" y="5454813"/>
+            <a:ext cx="7366000" cy="977900"/>
+          </a:xfrm>
+          <a:prstGeom prst="rect">
+            <a:avLst/>
+          </a:prstGeom>
+        </p:spPr>
+      </p:pic>
+      <p:pic>
+        <p:nvPicPr>
+          <p:cNvPr id="8" name="Picture 7">
+            <a:extLst>
+              <a:ext uri="{FF2B5EF4-FFF2-40B4-BE49-F238E27FC236}">
+                <a16:creationId xmlns:a16="http://schemas.microsoft.com/office/drawing/2014/main" id="{D37878CF-BB35-194E-8818-26EE42CF7FB7}"/>
+              </a:ext>
+            </a:extLst>
+          </p:cNvPr>
+          <p:cNvPicPr>
+            <a:picLocks noChangeAspect="1"/>
+          </p:cNvPicPr>
+          <p:nvPr/>
+        </p:nvPicPr>
+        <p:blipFill rotWithShape="1">
+          <a:blip r:embed="rId4"/>
+          <a:srcRect l="8063"/>
+          <a:stretch/>
+        </p:blipFill>
+        <p:spPr>
+          <a:xfrm>
+            <a:off x="6096000" y="2975253"/>
+            <a:ext cx="6115370" cy="2260625"/>
+          </a:xfrm>
+          <a:prstGeom prst="rect">
+            <a:avLst/>
+          </a:prstGeom>
+        </p:spPr>
+      </p:pic>
+    </p:spTree>
+    <p:extLst>
+      <p:ext uri="{BB962C8B-B14F-4D97-AF65-F5344CB8AC3E}">
+        <p14:creationId xmlns:p14="http://schemas.microsoft.com/office/powerpoint/2010/main" val="854285550"/>
+      </p:ext>
+    </p:extLst>
+  </p:cSld>
+  <p:clrMapOvr>
+    <a:masterClrMapping/>
+  </p:clrMapOvr>
+</p:sld>
+</file>
+
+<file path=ppt/slides/slide6.xml><?xml version="1.0" encoding="utf-8"?>
+<p:sld xmlns:a="http://schemas.openxmlformats.org/drawingml/2006/main" xmlns:r="http://schemas.openxmlformats.org/officeDocument/2006/relationships" xmlns:p="http://schemas.openxmlformats.org/presentationml/2006/main">
+  <p:cSld>
+    <p:spTree>
+      <p:nvGrpSpPr>
+        <p:cNvPr id="1" name=""/>
+        <p:cNvGrpSpPr/>
+        <p:nvPr/>
+      </p:nvGrpSpPr>
+      <p:grpSpPr>
+        <a:xfrm>
+          <a:off x="0" y="0"/>
+          <a:ext cx="0" cy="0"/>
+          <a:chOff x="0" y="0"/>
+          <a:chExt cx="0" cy="0"/>
+        </a:xfrm>
+      </p:grpSpPr>
+      <p:sp>
+        <p:nvSpPr>
+          <p:cNvPr id="2" name="Title 1">
+            <a:extLst>
+              <a:ext uri="{FF2B5EF4-FFF2-40B4-BE49-F238E27FC236}">
+                <a16:creationId xmlns:a16="http://schemas.microsoft.com/office/drawing/2014/main" id="{93DDA839-CC45-B740-8B98-4654DF10666C}"/>
+              </a:ext>
+            </a:extLst>
+          </p:cNvPr>
+          <p:cNvSpPr>
+            <a:spLocks noGrp="1"/>
+          </p:cNvSpPr>
+          <p:nvPr>
+            <p:ph type="title"/>
+          </p:nvPr>
+        </p:nvSpPr>
+        <p:spPr/>
+        <p:txBody>
+          <a:bodyPr/>
+          <a:lstStyle/>
+          <a:p>
+            <a:r>
+              <a:rPr lang="en-US" dirty="0"/>
+              <a:t>Structural Design – Compression Struts</a:t>
+            </a:r>
+          </a:p>
+        </p:txBody>
+      </p:sp>
+      <p:pic>
+        <p:nvPicPr>
+          <p:cNvPr id="4" name="Content Placeholder 3">
+            <a:extLst>
+              <a:ext uri="{FF2B5EF4-FFF2-40B4-BE49-F238E27FC236}">
+                <a16:creationId xmlns:a16="http://schemas.microsoft.com/office/drawing/2014/main" id="{6CA96ED0-8D23-9446-98FC-C1E9A2E9495D}"/>
+              </a:ext>
+            </a:extLst>
+          </p:cNvPr>
+          <p:cNvPicPr>
+            <a:picLocks noGrp="1" noChangeAspect="1"/>
+          </p:cNvPicPr>
+          <p:nvPr>
+            <p:ph idx="1"/>
+          </p:nvPr>
+        </p:nvPicPr>
+        <p:blipFill>
+          <a:blip r:embed="rId2"/>
+          <a:stretch>
+            <a:fillRect/>
+          </a:stretch>
+        </p:blipFill>
+        <p:spPr>
+          <a:xfrm>
+            <a:off x="1027134" y="1690272"/>
+            <a:ext cx="9651690" cy="4572741"/>
+          </a:xfrm>
+          <a:prstGeom prst="rect">
+            <a:avLst/>
+          </a:prstGeom>
+        </p:spPr>
+      </p:pic>
+    </p:spTree>
+    <p:extLst>
+      <p:ext uri="{BB962C8B-B14F-4D97-AF65-F5344CB8AC3E}">
+        <p14:creationId xmlns:p14="http://schemas.microsoft.com/office/powerpoint/2010/main" val="272352276"/>
+      </p:ext>
+    </p:extLst>
+  </p:cSld>
+  <p:clrMapOvr>
+    <a:masterClrMapping/>
+  </p:clrMapOvr>
+</p:sld>
+</file>
+
+<file path=ppt/slides/slide7.xml><?xml version="1.0" encoding="utf-8"?>
+<p:sld xmlns:a="http://schemas.openxmlformats.org/drawingml/2006/main" xmlns:r="http://schemas.openxmlformats.org/officeDocument/2006/relationships" xmlns:p="http://schemas.openxmlformats.org/presentationml/2006/main">
+  <p:cSld>
+    <p:spTree>
+      <p:nvGrpSpPr>
+        <p:cNvPr id="1" name=""/>
+        <p:cNvGrpSpPr/>
+        <p:nvPr/>
+      </p:nvGrpSpPr>
+      <p:grpSpPr>
+        <a:xfrm>
+          <a:off x="0" y="0"/>
+          <a:ext cx="0" cy="0"/>
+          <a:chOff x="0" y="0"/>
+          <a:chExt cx="0" cy="0"/>
+        </a:xfrm>
+      </p:grpSpPr>
+      <p:sp>
+        <p:nvSpPr>
+          <p:cNvPr id="2" name="Title 1">
+            <a:extLst>
+              <a:ext uri="{FF2B5EF4-FFF2-40B4-BE49-F238E27FC236}">
+                <a16:creationId xmlns:a16="http://schemas.microsoft.com/office/drawing/2014/main" id="{93DDA839-CC45-B740-8B98-4654DF10666C}"/>
+              </a:ext>
+            </a:extLst>
+          </p:cNvPr>
+          <p:cNvSpPr>
+            <a:spLocks noGrp="1"/>
+          </p:cNvSpPr>
+          <p:nvPr>
+            <p:ph type="title"/>
+          </p:nvPr>
+        </p:nvSpPr>
+        <p:spPr/>
+        <p:txBody>
+          <a:bodyPr/>
+          <a:lstStyle/>
+          <a:p>
+            <a:r>
+              <a:rPr lang="en-US" dirty="0"/>
+              <a:t>Structural Design – Prestress and Deflection</a:t>
+            </a:r>
+          </a:p>
+        </p:txBody>
+      </p:sp>
+      <p:sp>
+        <p:nvSpPr>
+          <p:cNvPr id="5" name="Content Placeholder 4">
+            <a:extLst>
+              <a:ext uri="{FF2B5EF4-FFF2-40B4-BE49-F238E27FC236}">
+                <a16:creationId xmlns:a16="http://schemas.microsoft.com/office/drawing/2014/main" id="{C7498614-9D76-3243-82CD-01118534D234}"/>
+              </a:ext>
+            </a:extLst>
+          </p:cNvPr>
+          <p:cNvSpPr>
+            <a:spLocks noGrp="1"/>
+          </p:cNvSpPr>
+          <p:nvPr>
+            <p:ph idx="1"/>
+          </p:nvPr>
+        </p:nvSpPr>
+        <p:spPr/>
+        <p:txBody>
+          <a:bodyPr/>
+          <a:lstStyle/>
+          <a:p>
+            <a:r>
+              <a:rPr lang="en-US" dirty="0"/>
+              <a:t>0.01% strain </a:t>
+            </a:r>
+            <a:r>
+              <a:rPr lang="en-US" dirty="0">
+                <a:sym typeface="Wingdings" pitchFamily="2" charset="2"/>
+              </a:rPr>
+              <a:t> prestress of 5% of yield</a:t>
+            </a:r>
+          </a:p>
+          <a:p>
+            <a:r>
+              <a:rPr lang="en-US" dirty="0">
+                <a:sym typeface="Wingdings" pitchFamily="2" charset="2"/>
+              </a:rPr>
+              <a:t>Necessary to avoid tension cables/rods going into compression</a:t>
+            </a:r>
+          </a:p>
+          <a:p>
+            <a:r>
+              <a:rPr lang="en-US" dirty="0">
+                <a:sym typeface="Wingdings" pitchFamily="2" charset="2"/>
+              </a:rPr>
+              <a:t>Reduced maximum deflection</a:t>
+            </a:r>
+          </a:p>
+          <a:p>
+            <a:r>
+              <a:rPr lang="en-US" dirty="0">
+                <a:sym typeface="Wingdings" pitchFamily="2" charset="2"/>
+              </a:rPr>
+              <a:t>0.89m at top, reasonable for 120m span.</a:t>
+            </a:r>
+            <a:endParaRPr lang="en-US" dirty="0"/>
+          </a:p>
+        </p:txBody>
+      </p:sp>
+    </p:spTree>
+    <p:extLst>
+      <p:ext uri="{BB962C8B-B14F-4D97-AF65-F5344CB8AC3E}">
+        <p14:creationId xmlns:p14="http://schemas.microsoft.com/office/powerpoint/2010/main" val="3535201275"/>
+      </p:ext>
+    </p:extLst>
+  </p:cSld>
+  <p:clrMapOvr>
+    <a:masterClrMapping/>
+  </p:clrMapOvr>
+</p:sld>
+</file>
+
+<file path=ppt/slides/slide8.xml><?xml version="1.0" encoding="utf-8"?>
+<p:sld xmlns:a="http://schemas.openxmlformats.org/drawingml/2006/main" xmlns:r="http://schemas.openxmlformats.org/officeDocument/2006/relationships" xmlns:p="http://schemas.openxmlformats.org/presentationml/2006/main">
+  <p:cSld>
+    <p:bg>
+      <p:bgPr>
+        <a:solidFill>
+          <a:schemeClr val="bg1"/>
+        </a:solidFill>
+        <a:effectLst/>
+      </p:bgPr>
+    </p:bg>
+    <p:spTree>
+      <p:nvGrpSpPr>
+        <p:cNvPr id="1" name=""/>
+        <p:cNvGrpSpPr/>
+        <p:nvPr/>
+      </p:nvGrpSpPr>
+      <p:grpSpPr>
+        <a:xfrm>
+          <a:off x="0" y="0"/>
+          <a:ext cx="0" cy="0"/>
+          <a:chOff x="0" y="0"/>
+          <a:chExt cx="0" cy="0"/>
+        </a:xfrm>
+      </p:grpSpPr>
+      <p:sp>
+        <p:nvSpPr>
+          <p:cNvPr id="10" name="Graphic 1">
+            <a:extLst>
+              <a:ext uri="{FF2B5EF4-FFF2-40B4-BE49-F238E27FC236}">
+                <a16:creationId xmlns:a16="http://schemas.microsoft.com/office/drawing/2014/main" id="{0D57E7FA-E8FC-45AC-868F-CDC8144939D6}"/>
+              </a:ext>
+              <a:ext uri="{C183D7F6-B498-43B3-948B-1728B52AA6E4}">
+                <adec:decorative xmlns:adec="http://schemas.microsoft.com/office/drawing/2017/decorative" val="1"/>
+              </a:ext>
+            </a:extLst>
+          </p:cNvPr>
+          <p:cNvSpPr>
+            <a:spLocks noGrp="1" noRot="1" noChangeAspect="1" noMove="1" noResize="1" noEditPoints="1" noAdjustHandles="1" noChangeArrowheads="1" noChangeShapeType="1" noTextEdit="1"/>
+          </p:cNvSpPr>
+          <p:nvPr>
+            <p:extLst>
+              <p:ext uri="{386F3935-93C4-4BCD-93E2-E3B085C9AB24}">
+                <p16:designElem xmlns:p16="http://schemas.microsoft.com/office/powerpoint/2015/main" val="1"/>
+              </p:ext>
+            </p:extLst>
+          </p:nvPr>
+        </p:nvSpPr>
+        <p:spPr>
+          <a:xfrm rot="10800000" flipV="1">
+            <a:off x="2599854" y="527562"/>
+            <a:ext cx="6992292" cy="5102484"/>
+          </a:xfrm>
+          <a:custGeom>
+            <a:avLst/>
+            <a:gdLst/>
+            <a:ahLst/>
+            <a:cxnLst/>
+            <a:rect l="l" t="t" r="r" b="b"/>
+            <a:pathLst>
+              <a:path w="6886274" h="5025119">
+                <a:moveTo>
+                  <a:pt x="5458905" y="754119"/>
+                </a:moveTo>
+                <a:cubicBezTo>
+                  <a:pt x="5417216" y="775336"/>
+                  <a:pt x="4594585" y="1111088"/>
+                  <a:pt x="3455557" y="1027709"/>
+                </a:cubicBezTo>
+                <a:cubicBezTo>
+                  <a:pt x="3415356" y="1024731"/>
+                  <a:pt x="3377389" y="1022869"/>
+                  <a:pt x="3338677" y="1021381"/>
+                </a:cubicBezTo>
+                <a:cubicBezTo>
+                  <a:pt x="2996224" y="1006119"/>
+                  <a:pt x="2660100" y="998674"/>
+                  <a:pt x="2518280" y="980435"/>
+                </a:cubicBezTo>
+                <a:cubicBezTo>
+                  <a:pt x="2407355" y="965918"/>
+                  <a:pt x="1840075" y="843082"/>
+                  <a:pt x="1673687" y="739229"/>
+                </a:cubicBezTo>
+                <a:cubicBezTo>
+                  <a:pt x="1503578" y="632771"/>
+                  <a:pt x="1343146" y="515146"/>
+                  <a:pt x="1183459" y="397149"/>
+                </a:cubicBezTo>
+                <a:cubicBezTo>
+                  <a:pt x="1114224" y="346153"/>
+                  <a:pt x="1040522" y="299624"/>
+                  <a:pt x="977987" y="241184"/>
+                </a:cubicBezTo>
+                <a:cubicBezTo>
+                  <a:pt x="915453" y="182372"/>
+                  <a:pt x="855896" y="121326"/>
+                  <a:pt x="788150" y="66980"/>
+                </a:cubicBezTo>
+                <a:cubicBezTo>
+                  <a:pt x="768794" y="51346"/>
+                  <a:pt x="749438" y="34596"/>
+                  <a:pt x="721148" y="31990"/>
+                </a:cubicBezTo>
+                <a:cubicBezTo>
+                  <a:pt x="714820" y="31246"/>
+                  <a:pt x="708120" y="31618"/>
+                  <a:pt x="701792" y="32362"/>
+                </a:cubicBezTo>
+                <a:cubicBezTo>
+                  <a:pt x="694720" y="33107"/>
+                  <a:pt x="689136" y="36829"/>
+                  <a:pt x="686530" y="43157"/>
+                </a:cubicBezTo>
+                <a:cubicBezTo>
+                  <a:pt x="683925" y="50230"/>
+                  <a:pt x="688392" y="54324"/>
+                  <a:pt x="693603" y="58046"/>
+                </a:cubicBezTo>
+                <a:cubicBezTo>
+                  <a:pt x="697325" y="60652"/>
+                  <a:pt x="701047" y="64747"/>
+                  <a:pt x="705886" y="65491"/>
+                </a:cubicBezTo>
+                <a:cubicBezTo>
+                  <a:pt x="736782" y="69958"/>
+                  <a:pt x="748321" y="92664"/>
+                  <a:pt x="762838" y="112764"/>
+                </a:cubicBezTo>
+                <a:cubicBezTo>
+                  <a:pt x="769166" y="121326"/>
+                  <a:pt x="775866" y="128026"/>
+                  <a:pt x="764327" y="140309"/>
+                </a:cubicBezTo>
+                <a:cubicBezTo>
+                  <a:pt x="754277" y="151104"/>
+                  <a:pt x="764699" y="156688"/>
+                  <a:pt x="775121" y="159666"/>
+                </a:cubicBezTo>
+                <a:cubicBezTo>
+                  <a:pt x="789638" y="163760"/>
+                  <a:pt x="806761" y="163016"/>
+                  <a:pt x="823139" y="176416"/>
+                </a:cubicBezTo>
+                <a:cubicBezTo>
+                  <a:pt x="761721" y="177533"/>
+                  <a:pt x="735665" y="142171"/>
+                  <a:pt x="707748" y="109414"/>
+                </a:cubicBezTo>
+                <a:cubicBezTo>
+                  <a:pt x="697325" y="97503"/>
+                  <a:pt x="690253" y="83358"/>
+                  <a:pt x="681319" y="69958"/>
+                </a:cubicBezTo>
+                <a:cubicBezTo>
+                  <a:pt x="670152" y="53580"/>
+                  <a:pt x="657124" y="52835"/>
+                  <a:pt x="640746" y="67352"/>
+                </a:cubicBezTo>
+                <a:cubicBezTo>
+                  <a:pt x="626229" y="80380"/>
+                  <a:pt x="619157" y="79264"/>
+                  <a:pt x="614318" y="61396"/>
+                </a:cubicBezTo>
+                <a:cubicBezTo>
+                  <a:pt x="606873" y="33479"/>
+                  <a:pt x="589750" y="13751"/>
+                  <a:pt x="560716" y="3701"/>
+                </a:cubicBezTo>
+                <a:cubicBezTo>
+                  <a:pt x="554388" y="1467"/>
+                  <a:pt x="546572" y="-3372"/>
+                  <a:pt x="540616" y="3701"/>
+                </a:cubicBezTo>
+                <a:cubicBezTo>
+                  <a:pt x="535405" y="9656"/>
+                  <a:pt x="539871" y="16729"/>
+                  <a:pt x="543594" y="21940"/>
+                </a:cubicBezTo>
+                <a:cubicBezTo>
+                  <a:pt x="550294" y="31246"/>
+                  <a:pt x="556250" y="40179"/>
+                  <a:pt x="558855" y="51346"/>
+                </a:cubicBezTo>
+                <a:cubicBezTo>
+                  <a:pt x="560716" y="58791"/>
+                  <a:pt x="562578" y="66980"/>
+                  <a:pt x="557366" y="72563"/>
+                </a:cubicBezTo>
+                <a:cubicBezTo>
+                  <a:pt x="535777" y="96386"/>
+                  <a:pt x="551411" y="107553"/>
+                  <a:pt x="570022" y="120209"/>
+                </a:cubicBezTo>
+                <a:cubicBezTo>
+                  <a:pt x="595706" y="137332"/>
+                  <a:pt x="605756" y="162643"/>
+                  <a:pt x="599801" y="192794"/>
+                </a:cubicBezTo>
+                <a:cubicBezTo>
+                  <a:pt x="597567" y="205078"/>
+                  <a:pt x="599056" y="212522"/>
+                  <a:pt x="614318" y="212150"/>
+                </a:cubicBezTo>
+                <a:cubicBezTo>
+                  <a:pt x="620273" y="212150"/>
+                  <a:pt x="621762" y="216245"/>
+                  <a:pt x="623996" y="220711"/>
+                </a:cubicBezTo>
+                <a:cubicBezTo>
+                  <a:pt x="671641" y="326053"/>
+                  <a:pt x="740504" y="418366"/>
+                  <a:pt x="821278" y="503235"/>
+                </a:cubicBezTo>
+                <a:cubicBezTo>
+                  <a:pt x="886791" y="572098"/>
+                  <a:pt x="959004" y="634260"/>
+                  <a:pt x="1033822" y="694562"/>
+                </a:cubicBezTo>
+                <a:cubicBezTo>
+                  <a:pt x="1036055" y="696423"/>
+                  <a:pt x="1038289" y="698656"/>
+                  <a:pt x="1039406" y="702378"/>
+                </a:cubicBezTo>
+                <a:cubicBezTo>
+                  <a:pt x="1004044" y="694934"/>
+                  <a:pt x="973521" y="679672"/>
+                  <a:pt x="944114" y="662550"/>
+                </a:cubicBezTo>
+                <a:cubicBezTo>
+                  <a:pt x="865946" y="617138"/>
+                  <a:pt x="800061" y="558325"/>
+                  <a:pt x="733432" y="500629"/>
+                </a:cubicBezTo>
+                <a:cubicBezTo>
+                  <a:pt x="692858" y="465267"/>
+                  <a:pt x="651169" y="431022"/>
+                  <a:pt x="606501" y="399755"/>
+                </a:cubicBezTo>
+                <a:cubicBezTo>
+                  <a:pt x="599056" y="394543"/>
+                  <a:pt x="593845" y="387843"/>
+                  <a:pt x="588634" y="381143"/>
+                </a:cubicBezTo>
+                <a:cubicBezTo>
+                  <a:pt x="585656" y="377421"/>
+                  <a:pt x="581934" y="374071"/>
+                  <a:pt x="575978" y="375560"/>
+                </a:cubicBezTo>
+                <a:cubicBezTo>
+                  <a:pt x="568533" y="377421"/>
+                  <a:pt x="567789" y="383004"/>
+                  <a:pt x="567044" y="388588"/>
+                </a:cubicBezTo>
+                <a:cubicBezTo>
+                  <a:pt x="564811" y="406455"/>
+                  <a:pt x="569650" y="422461"/>
+                  <a:pt x="578956" y="437722"/>
+                </a:cubicBezTo>
+                <a:cubicBezTo>
+                  <a:pt x="603151" y="476806"/>
+                  <a:pt x="638885" y="506957"/>
+                  <a:pt x="675736" y="535619"/>
+                </a:cubicBezTo>
+                <a:cubicBezTo>
+                  <a:pt x="723381" y="572470"/>
+                  <a:pt x="769538" y="610810"/>
+                  <a:pt x="811600" y="652872"/>
+                </a:cubicBezTo>
+                <a:cubicBezTo>
+                  <a:pt x="814578" y="655850"/>
+                  <a:pt x="820161" y="657711"/>
+                  <a:pt x="818300" y="666272"/>
+                </a:cubicBezTo>
+                <a:cubicBezTo>
+                  <a:pt x="791872" y="646544"/>
+                  <a:pt x="766932" y="627188"/>
+                  <a:pt x="741621" y="608576"/>
+                </a:cubicBezTo>
+                <a:cubicBezTo>
+                  <a:pt x="716681" y="589965"/>
+                  <a:pt x="691369" y="571353"/>
+                  <a:pt x="666430" y="553114"/>
+                </a:cubicBezTo>
+                <a:cubicBezTo>
+                  <a:pt x="660474" y="548647"/>
+                  <a:pt x="654146" y="542319"/>
+                  <a:pt x="645585" y="547903"/>
+                </a:cubicBezTo>
+                <a:cubicBezTo>
+                  <a:pt x="636652" y="553486"/>
+                  <a:pt x="637768" y="562792"/>
+                  <a:pt x="640002" y="570236"/>
+                </a:cubicBezTo>
+                <a:cubicBezTo>
+                  <a:pt x="647074" y="592198"/>
+                  <a:pt x="659358" y="611554"/>
+                  <a:pt x="675736" y="628677"/>
+                </a:cubicBezTo>
+                <a:cubicBezTo>
+                  <a:pt x="731570" y="685256"/>
+                  <a:pt x="795966" y="734018"/>
+                  <a:pt x="855896" y="786875"/>
+                </a:cubicBezTo>
+                <a:cubicBezTo>
+                  <a:pt x="888280" y="815537"/>
+                  <a:pt x="918058" y="846060"/>
+                  <a:pt x="946348" y="877699"/>
+                </a:cubicBezTo>
+                <a:cubicBezTo>
+                  <a:pt x="952676" y="884772"/>
+                  <a:pt x="952303" y="891472"/>
+                  <a:pt x="950442" y="899661"/>
+                </a:cubicBezTo>
+                <a:cubicBezTo>
+                  <a:pt x="942998" y="932790"/>
+                  <a:pt x="954537" y="943957"/>
+                  <a:pt x="991760" y="937629"/>
+                </a:cubicBezTo>
+                <a:cubicBezTo>
+                  <a:pt x="1003299" y="935767"/>
+                  <a:pt x="1011116" y="937629"/>
+                  <a:pt x="1018188" y="945445"/>
+                </a:cubicBezTo>
+                <a:cubicBezTo>
+                  <a:pt x="1103802" y="1042225"/>
+                  <a:pt x="1205048" y="1123744"/>
+                  <a:pt x="1315601" y="1196329"/>
+                </a:cubicBezTo>
+                <a:cubicBezTo>
+                  <a:pt x="1360641" y="1225735"/>
+                  <a:pt x="1407170" y="1253653"/>
+                  <a:pt x="1454443" y="1279709"/>
+                </a:cubicBezTo>
+                <a:cubicBezTo>
+                  <a:pt x="1454443" y="1281570"/>
+                  <a:pt x="1454443" y="1283804"/>
+                  <a:pt x="1454443" y="1285665"/>
+                </a:cubicBezTo>
+                <a:cubicBezTo>
+                  <a:pt x="1454071" y="1288270"/>
+                  <a:pt x="1453699" y="1289759"/>
+                  <a:pt x="1453327" y="1291993"/>
+                </a:cubicBezTo>
+                <a:cubicBezTo>
+                  <a:pt x="1386697" y="1251792"/>
+                  <a:pt x="1320812" y="1210474"/>
+                  <a:pt x="1256416" y="1166923"/>
+                </a:cubicBezTo>
+                <a:cubicBezTo>
+                  <a:pt x="1081840" y="1048926"/>
+                  <a:pt x="915080" y="922367"/>
+                  <a:pt x="745715" y="798786"/>
+                </a:cubicBezTo>
+                <a:cubicBezTo>
+                  <a:pt x="688764" y="757096"/>
+                  <a:pt x="643724" y="703867"/>
+                  <a:pt x="592356" y="656966"/>
+                </a:cubicBezTo>
+                <a:cubicBezTo>
+                  <a:pt x="558111" y="625699"/>
+                  <a:pt x="525354" y="592943"/>
+                  <a:pt x="485526" y="567259"/>
+                </a:cubicBezTo>
+                <a:cubicBezTo>
+                  <a:pt x="469148" y="556836"/>
+                  <a:pt x="452025" y="547530"/>
+                  <a:pt x="430063" y="550136"/>
+                </a:cubicBezTo>
+                <a:cubicBezTo>
+                  <a:pt x="421502" y="551253"/>
+                  <a:pt x="411824" y="553486"/>
+                  <a:pt x="408846" y="563164"/>
+                </a:cubicBezTo>
+                <a:cubicBezTo>
+                  <a:pt x="406240" y="572842"/>
+                  <a:pt x="414057" y="577309"/>
+                  <a:pt x="421130" y="581403"/>
+                </a:cubicBezTo>
+                <a:cubicBezTo>
+                  <a:pt x="422991" y="582520"/>
+                  <a:pt x="424852" y="584009"/>
+                  <a:pt x="426713" y="584009"/>
+                </a:cubicBezTo>
+                <a:cubicBezTo>
+                  <a:pt x="462075" y="586242"/>
+                  <a:pt x="470264" y="614532"/>
+                  <a:pt x="487015" y="635005"/>
+                </a:cubicBezTo>
+                <a:cubicBezTo>
+                  <a:pt x="492226" y="641333"/>
+                  <a:pt x="492598" y="647661"/>
+                  <a:pt x="487015" y="655105"/>
+                </a:cubicBezTo>
+                <a:cubicBezTo>
+                  <a:pt x="476964" y="668505"/>
+                  <a:pt x="484037" y="674461"/>
+                  <a:pt x="497437" y="678183"/>
+                </a:cubicBezTo>
+                <a:cubicBezTo>
+                  <a:pt x="510837" y="681906"/>
+                  <a:pt x="525354" y="683022"/>
+                  <a:pt x="539871" y="691584"/>
+                </a:cubicBezTo>
+                <a:cubicBezTo>
+                  <a:pt x="516793" y="698656"/>
+                  <a:pt x="500787" y="691212"/>
+                  <a:pt x="485898" y="681906"/>
+                </a:cubicBezTo>
+                <a:cubicBezTo>
+                  <a:pt x="452397" y="661433"/>
+                  <a:pt x="430808" y="631282"/>
+                  <a:pt x="410335" y="600387"/>
+                </a:cubicBezTo>
+                <a:cubicBezTo>
+                  <a:pt x="406240" y="594431"/>
+                  <a:pt x="402890" y="587731"/>
+                  <a:pt x="397307" y="582892"/>
+                </a:cubicBezTo>
+                <a:cubicBezTo>
+                  <a:pt x="386884" y="573214"/>
+                  <a:pt x="375717" y="572098"/>
+                  <a:pt x="363062" y="584009"/>
+                </a:cubicBezTo>
+                <a:cubicBezTo>
+                  <a:pt x="346311" y="599643"/>
+                  <a:pt x="340356" y="598526"/>
+                  <a:pt x="334772" y="578426"/>
+                </a:cubicBezTo>
+                <a:cubicBezTo>
+                  <a:pt x="327327" y="551253"/>
+                  <a:pt x="310577" y="532269"/>
+                  <a:pt x="281915" y="522219"/>
+                </a:cubicBezTo>
+                <a:cubicBezTo>
+                  <a:pt x="275960" y="519985"/>
+                  <a:pt x="269632" y="517007"/>
+                  <a:pt x="263304" y="521846"/>
+                </a:cubicBezTo>
+                <a:cubicBezTo>
+                  <a:pt x="256604" y="527430"/>
+                  <a:pt x="261070" y="533013"/>
+                  <a:pt x="263676" y="538225"/>
+                </a:cubicBezTo>
+                <a:cubicBezTo>
+                  <a:pt x="267398" y="546414"/>
+                  <a:pt x="271865" y="554603"/>
+                  <a:pt x="275215" y="563164"/>
+                </a:cubicBezTo>
+                <a:cubicBezTo>
+                  <a:pt x="281171" y="576937"/>
+                  <a:pt x="282288" y="591454"/>
+                  <a:pt x="271121" y="604854"/>
+                </a:cubicBezTo>
+                <a:cubicBezTo>
+                  <a:pt x="262931" y="614532"/>
+                  <a:pt x="263676" y="620860"/>
+                  <a:pt x="274471" y="627560"/>
+                </a:cubicBezTo>
+                <a:cubicBezTo>
+                  <a:pt x="309088" y="648405"/>
+                  <a:pt x="331050" y="675578"/>
+                  <a:pt x="319138" y="718012"/>
+                </a:cubicBezTo>
+                <a:cubicBezTo>
+                  <a:pt x="317277" y="723968"/>
+                  <a:pt x="319511" y="729924"/>
+                  <a:pt x="326583" y="729551"/>
+                </a:cubicBezTo>
+                <a:cubicBezTo>
+                  <a:pt x="342217" y="728435"/>
+                  <a:pt x="344822" y="738113"/>
+                  <a:pt x="349289" y="748163"/>
+                </a:cubicBezTo>
+                <a:cubicBezTo>
+                  <a:pt x="392840" y="844571"/>
+                  <a:pt x="455747" y="928695"/>
+                  <a:pt x="528332" y="1007608"/>
+                </a:cubicBezTo>
+                <a:cubicBezTo>
+                  <a:pt x="600173" y="1085777"/>
+                  <a:pt x="680947" y="1155756"/>
+                  <a:pt x="766932" y="1222758"/>
+                </a:cubicBezTo>
+                <a:cubicBezTo>
+                  <a:pt x="742737" y="1220524"/>
+                  <a:pt x="711470" y="1206752"/>
+                  <a:pt x="681319" y="1190746"/>
+                </a:cubicBezTo>
+                <a:cubicBezTo>
+                  <a:pt x="601662" y="1147939"/>
+                  <a:pt x="536149" y="1089871"/>
+                  <a:pt x="469520" y="1032920"/>
+                </a:cubicBezTo>
+                <a:cubicBezTo>
+                  <a:pt x="422991" y="993091"/>
+                  <a:pt x="377579" y="952146"/>
+                  <a:pt x="325466" y="917900"/>
+                </a:cubicBezTo>
+                <a:cubicBezTo>
+                  <a:pt x="319511" y="914178"/>
+                  <a:pt x="315416" y="909339"/>
+                  <a:pt x="312066" y="903383"/>
+                </a:cubicBezTo>
+                <a:cubicBezTo>
+                  <a:pt x="309088" y="898172"/>
+                  <a:pt x="304621" y="893333"/>
+                  <a:pt x="296805" y="895566"/>
+                </a:cubicBezTo>
+                <a:cubicBezTo>
+                  <a:pt x="288988" y="898172"/>
+                  <a:pt x="288243" y="904872"/>
+                  <a:pt x="288243" y="910828"/>
+                </a:cubicBezTo>
+                <a:cubicBezTo>
+                  <a:pt x="289360" y="933162"/>
+                  <a:pt x="295688" y="953262"/>
+                  <a:pt x="309460" y="971129"/>
+                </a:cubicBezTo>
+                <a:cubicBezTo>
+                  <a:pt x="336261" y="1006864"/>
+                  <a:pt x="371995" y="1034781"/>
+                  <a:pt x="407729" y="1062698"/>
+                </a:cubicBezTo>
+                <a:cubicBezTo>
+                  <a:pt x="457236" y="1101038"/>
+                  <a:pt x="503021" y="1142728"/>
+                  <a:pt x="544338" y="1189257"/>
+                </a:cubicBezTo>
+                <a:cubicBezTo>
+                  <a:pt x="514560" y="1166551"/>
+                  <a:pt x="484781" y="1143472"/>
+                  <a:pt x="454630" y="1120766"/>
+                </a:cubicBezTo>
+                <a:cubicBezTo>
+                  <a:pt x="431924" y="1103644"/>
+                  <a:pt x="408474" y="1087265"/>
+                  <a:pt x="385396" y="1070515"/>
+                </a:cubicBezTo>
+                <a:cubicBezTo>
+                  <a:pt x="379812" y="1066421"/>
+                  <a:pt x="373856" y="1061954"/>
+                  <a:pt x="366040" y="1067537"/>
+                </a:cubicBezTo>
+                <a:cubicBezTo>
+                  <a:pt x="358967" y="1072376"/>
+                  <a:pt x="360084" y="1079449"/>
+                  <a:pt x="361573" y="1086149"/>
+                </a:cubicBezTo>
+                <a:cubicBezTo>
+                  <a:pt x="367156" y="1112577"/>
+                  <a:pt x="382790" y="1133794"/>
+                  <a:pt x="402146" y="1152778"/>
+                </a:cubicBezTo>
+                <a:cubicBezTo>
+                  <a:pt x="425596" y="1175484"/>
+                  <a:pt x="450164" y="1197074"/>
+                  <a:pt x="475475" y="1218663"/>
+                </a:cubicBezTo>
+                <a:cubicBezTo>
+                  <a:pt x="448303" y="1212707"/>
+                  <a:pt x="421130" y="1206752"/>
+                  <a:pt x="393957" y="1201913"/>
+                </a:cubicBezTo>
+                <a:cubicBezTo>
+                  <a:pt x="406240" y="1245091"/>
+                  <a:pt x="434902" y="1253653"/>
+                  <a:pt x="460586" y="1260353"/>
+                </a:cubicBezTo>
+                <a:cubicBezTo>
+                  <a:pt x="495204" y="1268914"/>
+                  <a:pt x="528332" y="1279709"/>
+                  <a:pt x="561089" y="1291993"/>
+                </a:cubicBezTo>
+                <a:cubicBezTo>
+                  <a:pt x="574861" y="1304276"/>
+                  <a:pt x="588634" y="1316188"/>
+                  <a:pt x="602034" y="1328843"/>
+                </a:cubicBezTo>
+                <a:cubicBezTo>
+                  <a:pt x="615807" y="1341872"/>
+                  <a:pt x="628835" y="1354900"/>
+                  <a:pt x="641863" y="1368672"/>
+                </a:cubicBezTo>
+                <a:cubicBezTo>
+                  <a:pt x="651169" y="1378722"/>
+                  <a:pt x="662335" y="1387284"/>
+                  <a:pt x="651541" y="1404406"/>
+                </a:cubicBezTo>
+                <a:cubicBezTo>
+                  <a:pt x="646702" y="1412223"/>
+                  <a:pt x="678341" y="1454658"/>
+                  <a:pt x="688392" y="1457263"/>
+                </a:cubicBezTo>
+                <a:cubicBezTo>
+                  <a:pt x="689881" y="1457635"/>
+                  <a:pt x="691369" y="1458008"/>
+                  <a:pt x="692486" y="1458008"/>
+                </a:cubicBezTo>
+                <a:cubicBezTo>
+                  <a:pt x="714076" y="1456519"/>
+                  <a:pt x="718915" y="1469175"/>
+                  <a:pt x="719287" y="1485181"/>
+                </a:cubicBezTo>
+                <a:cubicBezTo>
+                  <a:pt x="719659" y="1500814"/>
+                  <a:pt x="715937" y="1520170"/>
+                  <a:pt x="745343" y="1512353"/>
+                </a:cubicBezTo>
+                <a:cubicBezTo>
+                  <a:pt x="748693" y="1511609"/>
+                  <a:pt x="749438" y="1513842"/>
+                  <a:pt x="750926" y="1516448"/>
+                </a:cubicBezTo>
+                <a:cubicBezTo>
+                  <a:pt x="782938" y="1583077"/>
+                  <a:pt x="836912" y="1634445"/>
+                  <a:pt x="890141" y="1685813"/>
+                </a:cubicBezTo>
+                <a:cubicBezTo>
+                  <a:pt x="893119" y="1688419"/>
+                  <a:pt x="896097" y="1691024"/>
+                  <a:pt x="899074" y="1693630"/>
+                </a:cubicBezTo>
+                <a:cubicBezTo>
+                  <a:pt x="843240" y="1680602"/>
+                  <a:pt x="658985" y="1663851"/>
+                  <a:pt x="605012" y="1669435"/>
+                </a:cubicBezTo>
+                <a:cubicBezTo>
+                  <a:pt x="556994" y="1674274"/>
+                  <a:pt x="285638" y="1593128"/>
+                  <a:pt x="229431" y="1545110"/>
+                </a:cubicBezTo>
+                <a:cubicBezTo>
+                  <a:pt x="221614" y="1582705"/>
+                  <a:pt x="238364" y="1597594"/>
+                  <a:pt x="251765" y="1614717"/>
+                </a:cubicBezTo>
+                <a:cubicBezTo>
+                  <a:pt x="270748" y="1638912"/>
+                  <a:pt x="273726" y="1656035"/>
+                  <a:pt x="237992" y="1675391"/>
+                </a:cubicBezTo>
+                <a:cubicBezTo>
+                  <a:pt x="135628" y="1730481"/>
+                  <a:pt x="136745" y="1732342"/>
+                  <a:pt x="232781" y="1807160"/>
+                </a:cubicBezTo>
+                <a:cubicBezTo>
+                  <a:pt x="237248" y="1810511"/>
+                  <a:pt x="235014" y="1821305"/>
+                  <a:pt x="236131" y="1828750"/>
+                </a:cubicBezTo>
+                <a:cubicBezTo>
+                  <a:pt x="211191" y="1839917"/>
+                  <a:pt x="181785" y="1810883"/>
+                  <a:pt x="152007" y="1842150"/>
+                </a:cubicBezTo>
+                <a:cubicBezTo>
+                  <a:pt x="280426" y="1979503"/>
+                  <a:pt x="475848" y="2110157"/>
+                  <a:pt x="653030" y="2213265"/>
+                </a:cubicBezTo>
+                <a:cubicBezTo>
+                  <a:pt x="509721" y="2247138"/>
+                  <a:pt x="423735" y="2128024"/>
+                  <a:pt x="318394" y="2143285"/>
+                </a:cubicBezTo>
+                <a:cubicBezTo>
+                  <a:pt x="265909" y="2180508"/>
+                  <a:pt x="422246" y="2240810"/>
+                  <a:pt x="272982" y="2258305"/>
+                </a:cubicBezTo>
+                <a:cubicBezTo>
+                  <a:pt x="337750" y="2291061"/>
+                  <a:pt x="385768" y="2323073"/>
+                  <a:pt x="430435" y="2360668"/>
+                </a:cubicBezTo>
+                <a:cubicBezTo>
+                  <a:pt x="509721" y="2428042"/>
+                  <a:pt x="525354" y="2472710"/>
+                  <a:pt x="488876" y="2563162"/>
+                </a:cubicBezTo>
+                <a:cubicBezTo>
+                  <a:pt x="464681" y="2622719"/>
+                  <a:pt x="429691" y="2677437"/>
+                  <a:pt x="460586" y="2748533"/>
+                </a:cubicBezTo>
+                <a:cubicBezTo>
+                  <a:pt x="481803" y="2797295"/>
+                  <a:pt x="473614" y="2829307"/>
+                  <a:pt x="393212" y="2807345"/>
+                </a:cubicBezTo>
+                <a:cubicBezTo>
+                  <a:pt x="306483" y="2783895"/>
+                  <a:pt x="273726" y="2827818"/>
+                  <a:pt x="295688" y="2913059"/>
+                </a:cubicBezTo>
+                <a:cubicBezTo>
+                  <a:pt x="309833" y="2967777"/>
+                  <a:pt x="294943" y="2984900"/>
+                  <a:pt x="235386" y="2978572"/>
+                </a:cubicBezTo>
+                <a:cubicBezTo>
+                  <a:pt x="169501" y="2971499"/>
+                  <a:pt x="106967" y="2935765"/>
+                  <a:pt x="25448" y="2952888"/>
+                </a:cubicBezTo>
+                <a:cubicBezTo>
+                  <a:pt x="90588" y="3052646"/>
+                  <a:pt x="229803" y="3024356"/>
+                  <a:pt x="305738" y="3119275"/>
+                </a:cubicBezTo>
+                <a:cubicBezTo>
+                  <a:pt x="215286" y="3119647"/>
+                  <a:pt x="146051" y="3119275"/>
+                  <a:pt x="79049" y="3098430"/>
+                </a:cubicBezTo>
+                <a:cubicBezTo>
+                  <a:pt x="51132" y="3089869"/>
+                  <a:pt x="20609" y="3081308"/>
+                  <a:pt x="4975" y="3109969"/>
+                </a:cubicBezTo>
+                <a:cubicBezTo>
+                  <a:pt x="-13636" y="3144587"/>
+                  <a:pt x="24331" y="3157615"/>
+                  <a:pt x="47037" y="3163943"/>
+                </a:cubicBezTo>
+                <a:cubicBezTo>
+                  <a:pt x="111061" y="3181438"/>
+                  <a:pt x="160196" y="3222755"/>
+                  <a:pt x="213425" y="3255139"/>
+                </a:cubicBezTo>
+                <a:cubicBezTo>
+                  <a:pt x="329933" y="3326236"/>
+                  <a:pt x="457981" y="3385420"/>
+                  <a:pt x="556622" y="3502301"/>
+                </a:cubicBezTo>
+                <a:cubicBezTo>
+                  <a:pt x="432669" y="3472523"/>
+                  <a:pt x="339983" y="3402915"/>
+                  <a:pt x="224592" y="3388771"/>
+                </a:cubicBezTo>
+                <a:cubicBezTo>
+                  <a:pt x="324722" y="3495601"/>
+                  <a:pt x="453142" y="3565208"/>
+                  <a:pt x="574861" y="3643004"/>
+                </a:cubicBezTo>
+                <a:cubicBezTo>
+                  <a:pt x="609479" y="3664966"/>
+                  <a:pt x="644841" y="3679855"/>
+                  <a:pt x="652657" y="3727501"/>
+                </a:cubicBezTo>
+                <a:cubicBezTo>
+                  <a:pt x="667919" y="3819814"/>
+                  <a:pt x="712959" y="3896494"/>
+                  <a:pt x="810111" y="3937067"/>
+                </a:cubicBezTo>
+                <a:cubicBezTo>
+                  <a:pt x="810856" y="3937439"/>
+                  <a:pt x="805644" y="3951212"/>
+                  <a:pt x="802294" y="3960890"/>
+                </a:cubicBezTo>
+                <a:cubicBezTo>
+                  <a:pt x="743110" y="3963868"/>
+                  <a:pt x="696581" y="3909149"/>
+                  <a:pt x="620646" y="3927017"/>
+                </a:cubicBezTo>
+                <a:cubicBezTo>
+                  <a:pt x="692858" y="4001091"/>
+                  <a:pt x="753532" y="4067720"/>
+                  <a:pt x="856268" y="4103082"/>
+                </a:cubicBezTo>
+                <a:cubicBezTo>
+                  <a:pt x="938531" y="4131372"/>
+                  <a:pt x="1040150" y="4147377"/>
+                  <a:pt x="1099707" y="4238574"/>
+                </a:cubicBezTo>
+                <a:cubicBezTo>
+                  <a:pt x="1030472" y="4256441"/>
+                  <a:pt x="978732" y="4234107"/>
+                  <a:pt x="926992" y="4218102"/>
+                </a:cubicBezTo>
+                <a:cubicBezTo>
+                  <a:pt x="847334" y="4193534"/>
+                  <a:pt x="769166" y="4165617"/>
+                  <a:pt x="689508" y="4140677"/>
+                </a:cubicBezTo>
+                <a:cubicBezTo>
+                  <a:pt x="659358" y="4131372"/>
+                  <a:pt x="626229" y="4124299"/>
+                  <a:pt x="606873" y="4169711"/>
+                </a:cubicBezTo>
+                <a:cubicBezTo>
+                  <a:pt x="707748" y="4179389"/>
+                  <a:pt x="768421" y="4240435"/>
+                  <a:pt x="831701" y="4297759"/>
+                </a:cubicBezTo>
+                <a:cubicBezTo>
+                  <a:pt x="867435" y="4330143"/>
+                  <a:pt x="896469" y="4373322"/>
+                  <a:pt x="960493" y="4356944"/>
+                </a:cubicBezTo>
+                <a:cubicBezTo>
+                  <a:pt x="994366" y="4348382"/>
+                  <a:pt x="1015955" y="4372578"/>
+                  <a:pt x="1012233" y="4402356"/>
+                </a:cubicBezTo>
+                <a:cubicBezTo>
+                  <a:pt x="999577" y="4507325"/>
+                  <a:pt x="1078118" y="4544176"/>
+                  <a:pt x="1159636" y="4564276"/>
+                </a:cubicBezTo>
+                <a:cubicBezTo>
+                  <a:pt x="1313740" y="4602616"/>
+                  <a:pt x="1442160" y="4692324"/>
+                  <a:pt x="1592169" y="4741458"/>
+                </a:cubicBezTo>
+                <a:cubicBezTo>
+                  <a:pt x="1738083" y="4789104"/>
+                  <a:pt x="2833187" y="5010209"/>
+                  <a:pt x="3110499" y="5032171"/>
+                </a:cubicBezTo>
+                <a:cubicBezTo>
+                  <a:pt x="4807501" y="5166546"/>
+                  <a:pt x="6028047" y="4106432"/>
+                  <a:pt x="6033630" y="4091915"/>
+                </a:cubicBezTo>
+                <a:cubicBezTo>
+                  <a:pt x="6059314" y="4023797"/>
+                  <a:pt x="6122965" y="3994390"/>
+                  <a:pt x="6180661" y="3957912"/>
+                </a:cubicBezTo>
+                <a:cubicBezTo>
+                  <a:pt x="6230913" y="3925900"/>
+                  <a:pt x="6284514" y="3892027"/>
+                  <a:pt x="6305359" y="3837309"/>
+                </a:cubicBezTo>
+                <a:cubicBezTo>
+                  <a:pt x="6332904" y="3764724"/>
+                  <a:pt x="6254735" y="3824281"/>
+                  <a:pt x="6240218" y="3796364"/>
+                </a:cubicBezTo>
+                <a:cubicBezTo>
+                  <a:pt x="6269997" y="3758768"/>
+                  <a:pt x="6316153" y="3724151"/>
+                  <a:pt x="6328437" y="3681344"/>
+                </a:cubicBezTo>
+                <a:cubicBezTo>
+                  <a:pt x="6372361" y="3526496"/>
+                  <a:pt x="6466907" y="3413710"/>
+                  <a:pt x="6608355" y="3326236"/>
+                </a:cubicBezTo>
+                <a:cubicBezTo>
+                  <a:pt x="6648928" y="3300924"/>
+                  <a:pt x="6675729" y="3255512"/>
+                  <a:pt x="6731191" y="3248067"/>
+                </a:cubicBezTo>
+                <a:cubicBezTo>
+                  <a:pt x="6854400" y="3232061"/>
+                  <a:pt x="6815315" y="3106992"/>
+                  <a:pt x="6880456" y="3051529"/>
+                </a:cubicBezTo>
+                <a:cubicBezTo>
+                  <a:pt x="6892739" y="3041107"/>
+                  <a:pt x="6903907" y="2777939"/>
+                  <a:pt x="6901673" y="2763795"/>
+                </a:cubicBezTo>
+                <a:cubicBezTo>
+                  <a:pt x="6898323" y="2743322"/>
+                  <a:pt x="6883806" y="2966288"/>
+                  <a:pt x="6871150" y="2948421"/>
+                </a:cubicBezTo>
+                <a:cubicBezTo>
+                  <a:pt x="6858494" y="2930182"/>
+                  <a:pt x="6839138" y="2914176"/>
+                  <a:pt x="6848444" y="2890353"/>
+                </a:cubicBezTo>
+                <a:cubicBezTo>
+                  <a:pt x="6852166" y="2880303"/>
+                  <a:pt x="6849561" y="2846058"/>
+                  <a:pt x="6878223" y="2873230"/>
+                </a:cubicBezTo>
+                <a:cubicBezTo>
+                  <a:pt x="6956763" y="2946932"/>
+                  <a:pt x="6870778" y="2578051"/>
+                  <a:pt x="6762459" y="2568745"/>
+                </a:cubicBezTo>
+                <a:cubicBezTo>
+                  <a:pt x="6801915" y="2465637"/>
+                  <a:pt x="6801915" y="2465637"/>
+                  <a:pt x="6673123" y="2451493"/>
+                </a:cubicBezTo>
+                <a:cubicBezTo>
+                  <a:pt x="6722630" y="2385980"/>
+                  <a:pt x="6722630" y="2369229"/>
+                  <a:pt x="6662700" y="2346896"/>
+                </a:cubicBezTo>
+                <a:cubicBezTo>
+                  <a:pt x="6605005" y="2325306"/>
+                  <a:pt x="6540981" y="2318234"/>
+                  <a:pt x="6487752" y="2285105"/>
+                </a:cubicBezTo>
+                <a:cubicBezTo>
+                  <a:pt x="6536887" y="2201353"/>
+                  <a:pt x="6550659" y="2104573"/>
+                  <a:pt x="6652278" y="2063628"/>
+                </a:cubicBezTo>
+                <a:cubicBezTo>
+                  <a:pt x="6668284" y="2057300"/>
+                  <a:pt x="6679079" y="2031988"/>
+                  <a:pt x="6668656" y="2017843"/>
+                </a:cubicBezTo>
+                <a:cubicBezTo>
+                  <a:pt x="6631805" y="1965359"/>
+                  <a:pt x="6684662" y="1864856"/>
+                  <a:pt x="6570015" y="1854062"/>
+                </a:cubicBezTo>
+                <a:cubicBezTo>
+                  <a:pt x="6555870" y="1852573"/>
+                  <a:pt x="6542842" y="1842150"/>
+                  <a:pt x="6554009" y="1827633"/>
+                </a:cubicBezTo>
+                <a:cubicBezTo>
+                  <a:pt x="6592349" y="1778126"/>
+                  <a:pt x="6545820" y="1781476"/>
+                  <a:pt x="6517531" y="1775149"/>
+                </a:cubicBezTo>
+                <a:cubicBezTo>
+                  <a:pt x="6483285" y="1767704"/>
+                  <a:pt x="6444573" y="1789293"/>
+                  <a:pt x="6412934" y="1762493"/>
+                </a:cubicBezTo>
+                <a:cubicBezTo>
+                  <a:pt x="6420378" y="1734203"/>
+                  <a:pt x="6447923" y="1734575"/>
+                  <a:pt x="6467279" y="1725642"/>
+                </a:cubicBezTo>
+                <a:cubicBezTo>
+                  <a:pt x="6523858" y="1699213"/>
+                  <a:pt x="6570015" y="1667946"/>
+                  <a:pt x="6572621" y="1600200"/>
+                </a:cubicBezTo>
+                <a:cubicBezTo>
+                  <a:pt x="6574854" y="1545482"/>
+                  <a:pt x="6580810" y="1497092"/>
+                  <a:pt x="6502641" y="1480341"/>
+                </a:cubicBezTo>
+                <a:cubicBezTo>
+                  <a:pt x="6490358" y="1477736"/>
+                  <a:pt x="6484030" y="1470664"/>
+                  <a:pt x="6481796" y="1461358"/>
+                </a:cubicBezTo>
+                <a:cubicBezTo>
+                  <a:pt x="6490730" y="1452424"/>
+                  <a:pt x="6499291" y="1443118"/>
+                  <a:pt x="6509713" y="1436418"/>
+                </a:cubicBezTo>
+                <a:cubicBezTo>
+                  <a:pt x="6544703" y="1414457"/>
+                  <a:pt x="6556615" y="1382072"/>
+                  <a:pt x="6567037" y="1348199"/>
+                </a:cubicBezTo>
+                <a:cubicBezTo>
+                  <a:pt x="6573737" y="1326610"/>
+                  <a:pt x="6581554" y="1305393"/>
+                  <a:pt x="6596816" y="1286781"/>
+                </a:cubicBezTo>
+                <a:cubicBezTo>
+                  <a:pt x="6606122" y="1275242"/>
+                  <a:pt x="6617661" y="1266681"/>
+                  <a:pt x="6632178" y="1261842"/>
+                </a:cubicBezTo>
+                <a:cubicBezTo>
+                  <a:pt x="6644833" y="1257375"/>
+                  <a:pt x="6648556" y="1251419"/>
+                  <a:pt x="6639994" y="1240625"/>
+                </a:cubicBezTo>
+                <a:cubicBezTo>
+                  <a:pt x="6615799" y="1209729"/>
+                  <a:pt x="6606122" y="1175856"/>
+                  <a:pt x="6622127" y="1136400"/>
+                </a:cubicBezTo>
+                <a:cubicBezTo>
+                  <a:pt x="6626967" y="1124489"/>
+                  <a:pt x="6623617" y="1114066"/>
+                  <a:pt x="6612077" y="1109599"/>
+                </a:cubicBezTo>
+                <a:cubicBezTo>
+                  <a:pt x="6564059" y="1090616"/>
+                  <a:pt x="6552148" y="1046692"/>
+                  <a:pt x="6531675" y="1009469"/>
+                </a:cubicBezTo>
+                <a:cubicBezTo>
+                  <a:pt x="6502641" y="956612"/>
+                  <a:pt x="6476213" y="902639"/>
+                  <a:pt x="6456113" y="845315"/>
+                </a:cubicBezTo>
+                <a:cubicBezTo>
+                  <a:pt x="6444201" y="811070"/>
+                  <a:pt x="6432662" y="777197"/>
+                  <a:pt x="6440851" y="739229"/>
+                </a:cubicBezTo>
+                <a:cubicBezTo>
+                  <a:pt x="6442712" y="729924"/>
+                  <a:pt x="6439362" y="722107"/>
+                  <a:pt x="6434523" y="715034"/>
+                </a:cubicBezTo>
+                <a:cubicBezTo>
+                  <a:pt x="6414050" y="684139"/>
+                  <a:pt x="6416656" y="651383"/>
+                  <a:pt x="6432290" y="617510"/>
+                </a:cubicBezTo>
+                <a:cubicBezTo>
+                  <a:pt x="6441968" y="597037"/>
+                  <a:pt x="6440851" y="594431"/>
+                  <a:pt x="6416284" y="595176"/>
+                </a:cubicBezTo>
+                <a:cubicBezTo>
+                  <a:pt x="6366405" y="596293"/>
+                  <a:pt x="6316898" y="598154"/>
+                  <a:pt x="6267763" y="591826"/>
+                </a:cubicBezTo>
+                <a:cubicBezTo>
+                  <a:pt x="6212673" y="584753"/>
+                  <a:pt x="6194806" y="568375"/>
+                  <a:pt x="6236496" y="521102"/>
+                </a:cubicBezTo>
+                <a:cubicBezTo>
+                  <a:pt x="6245430" y="511052"/>
+                  <a:pt x="6253246" y="499885"/>
+                  <a:pt x="6257341" y="487229"/>
+                </a:cubicBezTo>
+                <a:cubicBezTo>
+                  <a:pt x="6260319" y="477179"/>
+                  <a:pt x="6257713" y="470106"/>
+                  <a:pt x="6248780" y="465267"/>
+                </a:cubicBezTo>
+                <a:cubicBezTo>
+                  <a:pt x="6238357" y="459312"/>
+                  <a:pt x="6232774" y="467501"/>
+                  <a:pt x="6226818" y="473456"/>
+                </a:cubicBezTo>
+                <a:cubicBezTo>
+                  <a:pt x="6194434" y="505468"/>
+                  <a:pt x="6153861" y="527430"/>
+                  <a:pt x="6115149" y="551625"/>
+                </a:cubicBezTo>
+                <a:cubicBezTo>
+                  <a:pt x="6059686" y="586615"/>
+                  <a:pt x="6001246" y="617510"/>
+                  <a:pt x="5951739" y="659944"/>
+                </a:cubicBezTo>
+                <a:cubicBezTo>
+                  <a:pt x="5939084" y="670739"/>
+                  <a:pt x="5918611" y="662550"/>
+                  <a:pt x="5917122" y="644310"/>
+                </a:cubicBezTo>
+                <a:cubicBezTo>
+                  <a:pt x="5915633" y="626071"/>
+                  <a:pt x="5905583" y="626071"/>
+                  <a:pt x="5890694" y="630538"/>
+                </a:cubicBezTo>
+                <a:cubicBezTo>
+                  <a:pt x="5872826" y="635749"/>
+                  <a:pt x="5854959" y="640960"/>
+                  <a:pt x="5837464" y="646916"/>
+                </a:cubicBezTo>
+                <a:cubicBezTo>
+                  <a:pt x="5819225" y="653244"/>
+                  <a:pt x="5811036" y="666644"/>
+                  <a:pt x="5809175" y="683395"/>
+                </a:cubicBezTo>
+                <a:cubicBezTo>
+                  <a:pt x="5808430" y="689723"/>
+                  <a:pt x="5808803" y="697539"/>
+                  <a:pt x="5815503" y="698656"/>
+                </a:cubicBezTo>
+                <a:cubicBezTo>
+                  <a:pt x="5843048" y="703495"/>
+                  <a:pt x="5755201" y="682278"/>
+                  <a:pt x="5746268" y="667389"/>
+                </a:cubicBezTo>
+                <a:cubicBezTo>
+                  <a:pt x="5745896" y="666644"/>
+                  <a:pt x="5525907" y="720246"/>
+                  <a:pt x="5458905" y="754119"/>
+                </a:cubicBezTo>
+                <a:close/>
+                <a:moveTo>
+                  <a:pt x="885302" y="1333310"/>
+                </a:moveTo>
+                <a:cubicBezTo>
+                  <a:pt x="877857" y="1326982"/>
+                  <a:pt x="870040" y="1321027"/>
+                  <a:pt x="862596" y="1314326"/>
+                </a:cubicBezTo>
+                <a:cubicBezTo>
+                  <a:pt x="863712" y="1312837"/>
+                  <a:pt x="865201" y="1311349"/>
+                  <a:pt x="866318" y="1309860"/>
+                </a:cubicBezTo>
+                <a:cubicBezTo>
+                  <a:pt x="881580" y="1320282"/>
+                  <a:pt x="896841" y="1330705"/>
+                  <a:pt x="912103" y="1341127"/>
+                </a:cubicBezTo>
+                <a:cubicBezTo>
+                  <a:pt x="903541" y="1338522"/>
+                  <a:pt x="894235" y="1335916"/>
+                  <a:pt x="885302" y="1333310"/>
+                </a:cubicBezTo>
+                <a:close/>
+                <a:moveTo>
+                  <a:pt x="1140280" y="787619"/>
+                </a:moveTo>
+                <a:cubicBezTo>
+                  <a:pt x="1231849" y="850154"/>
+                  <a:pt x="1323418" y="913061"/>
+                  <a:pt x="1414987" y="975596"/>
+                </a:cubicBezTo>
+                <a:cubicBezTo>
+                  <a:pt x="1413498" y="977085"/>
+                  <a:pt x="1412381" y="978574"/>
+                  <a:pt x="1410892" y="980063"/>
+                </a:cubicBezTo>
+                <a:cubicBezTo>
+                  <a:pt x="1310390" y="927206"/>
+                  <a:pt x="1215471" y="868394"/>
+                  <a:pt x="1140280" y="787619"/>
+                </a:cubicBezTo>
+                <a:close/>
+              </a:path>
+            </a:pathLst>
+          </a:custGeom>
+          <a:solidFill>
+            <a:schemeClr val="accent1">
+              <a:alpha val="20000"/>
+            </a:schemeClr>
+          </a:solidFill>
+          <a:ln w="32707" cap="flat">
+            <a:noFill/>
+            <a:prstDash val="solid"/>
+            <a:miter/>
+          </a:ln>
+        </p:spPr>
+        <p:txBody>
+          <a:bodyPr rtlCol="0" anchor="ctr"/>
+          <a:lstStyle/>
+          <a:p>
+            <a:endParaRPr lang="en-US" dirty="0"/>
+          </a:p>
+        </p:txBody>
+      </p:sp>
+      <p:sp useBgFill="1">
+        <p:nvSpPr>
+          <p:cNvPr id="12" name="Rectangle 11">
+            <a:extLst>
+              <a:ext uri="{FF2B5EF4-FFF2-40B4-BE49-F238E27FC236}">
+                <a16:creationId xmlns:a16="http://schemas.microsoft.com/office/drawing/2014/main" id="{D839A9B9-F246-4779-A2BA-7AD3DAB5412B}"/>
+              </a:ext>
+              <a:ext uri="{C183D7F6-B498-43B3-948B-1728B52AA6E4}">
+                <adec:decorative xmlns:adec="http://schemas.microsoft.com/office/drawing/2017/decorative" val="1"/>
+              </a:ext>
+            </a:extLst>
+          </p:cNvPr>
+          <p:cNvSpPr>
+            <a:spLocks noGrp="1" noRot="1" noChangeAspect="1" noMove="1" noResize="1" noEditPoints="1" noAdjustHandles="1" noChangeArrowheads="1" noChangeShapeType="1" noTextEdit="1"/>
+          </p:cNvSpPr>
+          <p:nvPr>
+            <p:extLst>
+              <p:ext uri="{386F3935-93C4-4BCD-93E2-E3B085C9AB24}">
+                <p16:designElem xmlns:p16="http://schemas.microsoft.com/office/powerpoint/2015/main" val="1"/>
+              </p:ext>
+            </p:extLst>
+          </p:nvPr>
+        </p:nvSpPr>
+        <p:spPr>
+          <a:xfrm>
+            <a:off x="0" y="0"/>
+            <a:ext cx="12188952" cy="6858000"/>
+          </a:xfrm>
+          <a:prstGeom prst="rect">
+            <a:avLst/>
+          </a:prstGeom>
+          <a:ln>
+            <a:noFill/>
+          </a:ln>
+        </p:spPr>
+        <p:style>
+          <a:lnRef idx="2">
+            <a:schemeClr val="accent1">
+              <a:shade val="50000"/>
+            </a:schemeClr>
+          </a:lnRef>
+          <a:fillRef idx="1">
+            <a:schemeClr val="accent1"/>
+          </a:fillRef>
+          <a:effectRef idx="0">
+            <a:schemeClr val="accent1"/>
+          </a:effectRef>
+          <a:fontRef idx="minor">
+            <a:schemeClr val="lt1"/>
+          </a:fontRef>
+        </p:style>
+        <p:txBody>
+          <a:bodyPr rtlCol="0" anchor="ctr"/>
+          <a:lstStyle/>
+          <a:p>
+            <a:pPr algn="ctr"/>
+            <a:endParaRPr lang="en-US"/>
+          </a:p>
+        </p:txBody>
+      </p:sp>
+      <p:sp>
+        <p:nvSpPr>
+          <p:cNvPr id="2" name="Title 1">
+            <a:extLst>
+              <a:ext uri="{FF2B5EF4-FFF2-40B4-BE49-F238E27FC236}">
+                <a16:creationId xmlns:a16="http://schemas.microsoft.com/office/drawing/2014/main" id="{E0A8E9BC-A174-874F-890C-574E80BC638F}"/>
+              </a:ext>
+            </a:extLst>
+          </p:cNvPr>
+          <p:cNvSpPr>
+            <a:spLocks noGrp="1"/>
+          </p:cNvSpPr>
+          <p:nvPr>
+            <p:ph type="title"/>
+          </p:nvPr>
+        </p:nvSpPr>
+        <p:spPr>
+          <a:xfrm>
+            <a:off x="1524000" y="1834964"/>
+            <a:ext cx="9144000" cy="2387600"/>
+          </a:xfrm>
+        </p:spPr>
+        <p:txBody>
+          <a:bodyPr vert="horz" lIns="91440" tIns="45720" rIns="91440" bIns="45720" rtlCol="0" anchor="b">
+            <a:normAutofit/>
+          </a:bodyPr>
+          <a:lstStyle/>
+          <a:p>
+            <a:pPr algn="ctr"/>
+            <a:r>
+              <a:rPr lang="en-US" sz="6000"/>
+              <a:t>Part 2 – Equad Courtyard</a:t>
+            </a:r>
+          </a:p>
+        </p:txBody>
+      </p:sp>
+      <p:sp>
+        <p:nvSpPr>
+          <p:cNvPr id="14" name="Freeform: Shape 13">
+            <a:extLst>
+              <a:ext uri="{FF2B5EF4-FFF2-40B4-BE49-F238E27FC236}">
+                <a16:creationId xmlns:a16="http://schemas.microsoft.com/office/drawing/2014/main" id="{689FF3C7-B796-4C63-BF20-B2EE56888340}"/>
+              </a:ext>
+              <a:ext uri="{C183D7F6-B498-43B3-948B-1728B52AA6E4}">
+                <adec:decorative xmlns:adec="http://schemas.microsoft.com/office/drawing/2017/decorative" val="1"/>
+              </a:ext>
+            </a:extLst>
+          </p:cNvPr>
+          <p:cNvSpPr>
+            <a:spLocks noGrp="1" noRot="1" noChangeAspect="1" noMove="1" noResize="1" noEditPoints="1" noAdjustHandles="1" noChangeArrowheads="1" noChangeShapeType="1" noTextEdit="1"/>
+          </p:cNvSpPr>
+          <p:nvPr>
+            <p:extLst>
+              <p:ext uri="{386F3935-93C4-4BCD-93E2-E3B085C9AB24}">
+                <p16:designElem xmlns:p16="http://schemas.microsoft.com/office/powerpoint/2015/main" val="1"/>
+              </p:ext>
+            </p:extLst>
+          </p:nvPr>
+        </p:nvSpPr>
+        <p:spPr>
+          <a:xfrm>
+            <a:off x="685896" y="1"/>
+            <a:ext cx="11282409" cy="2930115"/>
+          </a:xfrm>
+          <a:custGeom>
+            <a:avLst/>
+            <a:gdLst>
+              <a:gd name="connsiteX0" fmla="*/ 1277174 w 11282409"/>
+              <a:gd name="connsiteY0" fmla="*/ 0 h 2930115"/>
+              <a:gd name="connsiteX1" fmla="*/ 11077320 w 11282409"/>
+              <a:gd name="connsiteY1" fmla="*/ 0 h 2930115"/>
+              <a:gd name="connsiteX2" fmla="*/ 10933044 w 11282409"/>
+              <a:gd name="connsiteY2" fmla="*/ 93916 h 2930115"/>
+              <a:gd name="connsiteX3" fmla="*/ 11087630 w 11282409"/>
+              <a:gd name="connsiteY3" fmla="*/ 165214 h 2930115"/>
+              <a:gd name="connsiteX4" fmla="*/ 10401271 w 11282409"/>
+              <a:gd name="connsiteY4" fmla="*/ 582307 h 2930115"/>
+              <a:gd name="connsiteX5" fmla="*/ 11038163 w 11282409"/>
+              <a:gd name="connsiteY5" fmla="*/ 511009 h 2930115"/>
+              <a:gd name="connsiteX6" fmla="*/ 11004154 w 11282409"/>
+              <a:gd name="connsiteY6" fmla="*/ 568047 h 2930115"/>
+              <a:gd name="connsiteX7" fmla="*/ 10970146 w 11282409"/>
+              <a:gd name="connsiteY7" fmla="*/ 625085 h 2930115"/>
+              <a:gd name="connsiteX8" fmla="*/ 11270042 w 11282409"/>
+              <a:gd name="connsiteY8" fmla="*/ 589437 h 2930115"/>
+              <a:gd name="connsiteX9" fmla="*/ 11270042 w 11282409"/>
+              <a:gd name="connsiteY9" fmla="*/ 650039 h 2930115"/>
+              <a:gd name="connsiteX10" fmla="*/ 11177291 w 11282409"/>
+              <a:gd name="connsiteY10" fmla="*/ 721337 h 2930115"/>
+              <a:gd name="connsiteX11" fmla="*/ 11270042 w 11282409"/>
+              <a:gd name="connsiteY11" fmla="*/ 703512 h 2930115"/>
+              <a:gd name="connsiteX12" fmla="*/ 11282409 w 11282409"/>
+              <a:gd name="connsiteY12" fmla="*/ 703512 h 2930115"/>
+              <a:gd name="connsiteX13" fmla="*/ 11282409 w 11282409"/>
+              <a:gd name="connsiteY13" fmla="*/ 981574 h 2930115"/>
+              <a:gd name="connsiteX14" fmla="*/ 4053985 w 11282409"/>
+              <a:gd name="connsiteY14" fmla="*/ 2928005 h 2930115"/>
+              <a:gd name="connsiteX15" fmla="*/ 3386175 w 11282409"/>
+              <a:gd name="connsiteY15" fmla="*/ 2892355 h 2930115"/>
+              <a:gd name="connsiteX16" fmla="*/ 3228499 w 11282409"/>
+              <a:gd name="connsiteY16" fmla="*/ 2774714 h 2930115"/>
+              <a:gd name="connsiteX17" fmla="*/ 3389267 w 11282409"/>
+              <a:gd name="connsiteY17" fmla="*/ 2717676 h 2930115"/>
+              <a:gd name="connsiteX18" fmla="*/ 3883942 w 11282409"/>
+              <a:gd name="connsiteY18" fmla="*/ 2535866 h 2930115"/>
+              <a:gd name="connsiteX19" fmla="*/ 3401634 w 11282409"/>
+              <a:gd name="connsiteY19" fmla="*/ 2564386 h 2930115"/>
+              <a:gd name="connsiteX20" fmla="*/ 4087994 w 11282409"/>
+              <a:gd name="connsiteY20" fmla="*/ 2414660 h 2930115"/>
+              <a:gd name="connsiteX21" fmla="*/ 4285864 w 11282409"/>
+              <a:gd name="connsiteY21" fmla="*/ 2336233 h 2930115"/>
+              <a:gd name="connsiteX22" fmla="*/ 4091088 w 11282409"/>
+              <a:gd name="connsiteY22" fmla="*/ 2304149 h 2930115"/>
+              <a:gd name="connsiteX23" fmla="*/ 3148114 w 11282409"/>
+              <a:gd name="connsiteY23" fmla="*/ 2400401 h 2930115"/>
+              <a:gd name="connsiteX24" fmla="*/ 3058455 w 11282409"/>
+              <a:gd name="connsiteY24" fmla="*/ 2411095 h 2930115"/>
+              <a:gd name="connsiteX25" fmla="*/ 2443203 w 11282409"/>
+              <a:gd name="connsiteY25" fmla="*/ 2336233 h 2930115"/>
+              <a:gd name="connsiteX26" fmla="*/ 2786383 w 11282409"/>
+              <a:gd name="connsiteY26" fmla="*/ 2257805 h 2930115"/>
+              <a:gd name="connsiteX27" fmla="*/ 2390644 w 11282409"/>
+              <a:gd name="connsiteY27" fmla="*/ 2211461 h 2930115"/>
+              <a:gd name="connsiteX28" fmla="*/ 1911429 w 11282409"/>
+              <a:gd name="connsiteY28" fmla="*/ 2168683 h 2930115"/>
+              <a:gd name="connsiteX29" fmla="*/ 1416755 w 11282409"/>
+              <a:gd name="connsiteY29" fmla="*/ 2026087 h 2930115"/>
+              <a:gd name="connsiteX30" fmla="*/ 1070483 w 11282409"/>
+              <a:gd name="connsiteY30" fmla="*/ 1979743 h 2930115"/>
+              <a:gd name="connsiteX31" fmla="*/ 1104491 w 11282409"/>
+              <a:gd name="connsiteY31" fmla="*/ 1854972 h 2930115"/>
+              <a:gd name="connsiteX32" fmla="*/ 1039566 w 11282409"/>
+              <a:gd name="connsiteY32" fmla="*/ 1748026 h 2930115"/>
+              <a:gd name="connsiteX33" fmla="*/ 1623900 w 11282409"/>
+              <a:gd name="connsiteY33" fmla="*/ 1694553 h 2930115"/>
+              <a:gd name="connsiteX34" fmla="*/ 1401296 w 11282409"/>
+              <a:gd name="connsiteY34" fmla="*/ 1676728 h 2930115"/>
+              <a:gd name="connsiteX35" fmla="*/ 1302362 w 11282409"/>
+              <a:gd name="connsiteY35" fmla="*/ 1623255 h 2930115"/>
+              <a:gd name="connsiteX36" fmla="*/ 1385838 w 11282409"/>
+              <a:gd name="connsiteY36" fmla="*/ 1566216 h 2930115"/>
+              <a:gd name="connsiteX37" fmla="*/ 1756843 w 11282409"/>
+              <a:gd name="connsiteY37" fmla="*/ 1377277 h 2930115"/>
+              <a:gd name="connsiteX38" fmla="*/ 721120 w 11282409"/>
+              <a:gd name="connsiteY38" fmla="*/ 1387972 h 2930115"/>
+              <a:gd name="connsiteX39" fmla="*/ 857154 w 11282409"/>
+              <a:gd name="connsiteY39" fmla="*/ 1323803 h 2930115"/>
+              <a:gd name="connsiteX40" fmla="*/ 2285525 w 11282409"/>
+              <a:gd name="connsiteY40" fmla="*/ 924536 h 2930115"/>
+              <a:gd name="connsiteX41" fmla="*/ 2569963 w 11282409"/>
+              <a:gd name="connsiteY41" fmla="*/ 874628 h 2930115"/>
+              <a:gd name="connsiteX42" fmla="*/ 1803218 w 11282409"/>
+              <a:gd name="connsiteY42" fmla="*/ 856803 h 2930115"/>
+              <a:gd name="connsiteX43" fmla="*/ 625276 w 11282409"/>
+              <a:gd name="connsiteY43" fmla="*/ 682124 h 2930115"/>
+              <a:gd name="connsiteX44" fmla="*/ 736578 w 11282409"/>
+              <a:gd name="connsiteY44" fmla="*/ 521703 h 2930115"/>
+              <a:gd name="connsiteX45" fmla="*/ 155336 w 11282409"/>
+              <a:gd name="connsiteY45" fmla="*/ 550222 h 2930115"/>
+              <a:gd name="connsiteX46" fmla="*/ 421223 w 11282409"/>
+              <a:gd name="connsiteY46" fmla="*/ 425451 h 2930115"/>
+              <a:gd name="connsiteX47" fmla="*/ 201712 w 11282409"/>
+              <a:gd name="connsiteY47" fmla="*/ 404062 h 2930115"/>
+              <a:gd name="connsiteX48" fmla="*/ 3843 w 11282409"/>
+              <a:gd name="connsiteY48" fmla="*/ 314939 h 2930115"/>
+              <a:gd name="connsiteX49" fmla="*/ 829329 w 11282409"/>
+              <a:gd name="connsiteY49" fmla="*/ 175909 h 2930115"/>
+              <a:gd name="connsiteX50" fmla="*/ 1045749 w 11282409"/>
+              <a:gd name="connsiteY50" fmla="*/ 47572 h 2930115"/>
+              <a:gd name="connsiteX51" fmla="*/ 1172509 w 11282409"/>
+              <a:gd name="connsiteY51" fmla="*/ 11924 h 2930115"/>
+              <a:gd name="connsiteX52" fmla="*/ 1257531 w 11282409"/>
+              <a:gd name="connsiteY52" fmla="*/ 7914 h 2930115"/>
+            </a:gdLst>
+            <a:ahLst/>
+            <a:cxnLst>
+              <a:cxn ang="0">
+                <a:pos x="connsiteX0" y="connsiteY0"/>
+              </a:cxn>
+              <a:cxn ang="0">
+                <a:pos x="connsiteX1" y="connsiteY1"/>
+              </a:cxn>
+              <a:cxn ang="0">
+                <a:pos x="connsiteX2" y="connsiteY2"/>
+              </a:cxn>
+              <a:cxn ang="0">
+                <a:pos x="connsiteX3" y="connsiteY3"/>
+              </a:cxn>
+              <a:cxn ang="0">
+                <a:pos x="connsiteX4" y="connsiteY4"/>
+              </a:cxn>
+              <a:cxn ang="0">
+                <a:pos x="connsiteX5" y="connsiteY5"/>
+              </a:cxn>
+              <a:cxn ang="0">
+                <a:pos x="connsiteX6" y="connsiteY6"/>
+              </a:cxn>
+              <a:cxn ang="0">
+                <a:pos x="connsiteX7" y="connsiteY7"/>
+              </a:cxn>
+              <a:cxn ang="0">
+                <a:pos x="connsiteX8" y="connsiteY8"/>
+              </a:cxn>
+              <a:cxn ang="0">
+                <a:pos x="connsiteX9" y="connsiteY9"/>
+              </a:cxn>
+              <a:cxn ang="0">
+                <a:pos x="connsiteX10" y="connsiteY10"/>
+              </a:cxn>
+              <a:cxn ang="0">
+                <a:pos x="connsiteX11" y="connsiteY11"/>
+              </a:cxn>
+              <a:cxn ang="0">
+                <a:pos x="connsiteX12" y="connsiteY12"/>
+              </a:cxn>
+              <a:cxn ang="0">
+                <a:pos x="connsiteX13" y="connsiteY13"/>
+              </a:cxn>
+              <a:cxn ang="0">
+                <a:pos x="connsiteX14" y="connsiteY14"/>
+              </a:cxn>
+              <a:cxn ang="0">
+                <a:pos x="connsiteX15" y="connsiteY15"/>
+              </a:cxn>
+              <a:cxn ang="0">
+                <a:pos x="connsiteX16" y="connsiteY16"/>
+              </a:cxn>
+              <a:cxn ang="0">
+                <a:pos x="connsiteX17" y="connsiteY17"/>
+              </a:cxn>
+              <a:cxn ang="0">
+                <a:pos x="connsiteX18" y="connsiteY18"/>
+              </a:cxn>
+              <a:cxn ang="0">
+                <a:pos x="connsiteX19" y="connsiteY19"/>
+              </a:cxn>
+              <a:cxn ang="0">
+                <a:pos x="connsiteX20" y="connsiteY20"/>
+              </a:cxn>
+              <a:cxn ang="0">
+                <a:pos x="connsiteX21" y="connsiteY21"/>
+              </a:cxn>
+              <a:cxn ang="0">
+                <a:pos x="connsiteX22" y="connsiteY22"/>
+              </a:cxn>
+              <a:cxn ang="0">
+                <a:pos x="connsiteX23" y="connsiteY23"/>
+              </a:cxn>
+              <a:cxn ang="0">
+                <a:pos x="connsiteX24" y="connsiteY24"/>
+              </a:cxn>
+              <a:cxn ang="0">
+                <a:pos x="connsiteX25" y="connsiteY25"/>
+              </a:cxn>
+              <a:cxn ang="0">
+                <a:pos x="connsiteX26" y="connsiteY26"/>
+              </a:cxn>
+              <a:cxn ang="0">
+                <a:pos x="connsiteX27" y="connsiteY27"/>
+              </a:cxn>
+              <a:cxn ang="0">
+                <a:pos x="connsiteX28" y="connsiteY28"/>
+              </a:cxn>
+              <a:cxn ang="0">
+                <a:pos x="connsiteX29" y="connsiteY29"/>
+              </a:cxn>
+              <a:cxn ang="0">
+                <a:pos x="connsiteX30" y="connsiteY30"/>
+              </a:cxn>
+              <a:cxn ang="0">
+                <a:pos x="connsiteX31" y="connsiteY31"/>
+              </a:cxn>
+              <a:cxn ang="0">
+                <a:pos x="connsiteX32" y="connsiteY32"/>
+              </a:cxn>
+              <a:cxn ang="0">
+                <a:pos x="connsiteX33" y="connsiteY33"/>
+              </a:cxn>
+              <a:cxn ang="0">
+                <a:pos x="connsiteX34" y="connsiteY34"/>
+              </a:cxn>
+              <a:cxn ang="0">
+                <a:pos x="connsiteX35" y="connsiteY35"/>
+              </a:cxn>
+              <a:cxn ang="0">
+                <a:pos x="connsiteX36" y="connsiteY36"/>
+              </a:cxn>
+              <a:cxn ang="0">
+                <a:pos x="connsiteX37" y="connsiteY37"/>
+              </a:cxn>
+              <a:cxn ang="0">
+                <a:pos x="connsiteX38" y="connsiteY38"/>
+              </a:cxn>
+              <a:cxn ang="0">
+                <a:pos x="connsiteX39" y="connsiteY39"/>
+              </a:cxn>
+              <a:cxn ang="0">
+                <a:pos x="connsiteX40" y="connsiteY40"/>
+              </a:cxn>
+              <a:cxn ang="0">
+                <a:pos x="connsiteX41" y="connsiteY41"/>
+              </a:cxn>
+              <a:cxn ang="0">
+                <a:pos x="connsiteX42" y="connsiteY42"/>
+              </a:cxn>
+              <a:cxn ang="0">
+                <a:pos x="connsiteX43" y="connsiteY43"/>
+              </a:cxn>
+              <a:cxn ang="0">
+                <a:pos x="connsiteX44" y="connsiteY44"/>
+              </a:cxn>
+              <a:cxn ang="0">
+                <a:pos x="connsiteX45" y="connsiteY45"/>
+              </a:cxn>
+              <a:cxn ang="0">
+                <a:pos x="connsiteX46" y="connsiteY46"/>
+              </a:cxn>
+              <a:cxn ang="0">
+                <a:pos x="connsiteX47" y="connsiteY47"/>
+              </a:cxn>
+              <a:cxn ang="0">
+                <a:pos x="connsiteX48" y="connsiteY48"/>
+              </a:cxn>
+              <a:cxn ang="0">
+                <a:pos x="connsiteX49" y="connsiteY49"/>
+              </a:cxn>
+              <a:cxn ang="0">
+                <a:pos x="connsiteX50" y="connsiteY50"/>
+              </a:cxn>
+              <a:cxn ang="0">
+                <a:pos x="connsiteX51" y="connsiteY51"/>
+              </a:cxn>
+              <a:cxn ang="0">
+                <a:pos x="connsiteX52" y="connsiteY52"/>
+              </a:cxn>
+            </a:cxnLst>
+            <a:rect l="l" t="t" r="r" b="b"/>
+            <a:pathLst>
+              <a:path w="11282409" h="2930115">
+                <a:moveTo>
+                  <a:pt x="1277174" y="0"/>
+                </a:moveTo>
+                <a:lnTo>
+                  <a:pt x="11077320" y="0"/>
+                </a:lnTo>
+                <a:lnTo>
+                  <a:pt x="10933044" y="93916"/>
+                </a:lnTo>
+                <a:cubicBezTo>
+                  <a:pt x="10973237" y="147389"/>
+                  <a:pt x="11059805" y="83222"/>
+                  <a:pt x="11087630" y="165214"/>
+                </a:cubicBezTo>
+                <a:cubicBezTo>
+                  <a:pt x="10865028" y="304245"/>
+                  <a:pt x="10660974" y="478924"/>
+                  <a:pt x="10401271" y="582307"/>
+                </a:cubicBezTo>
+                <a:cubicBezTo>
+                  <a:pt x="10614599" y="507443"/>
+                  <a:pt x="10827927" y="543093"/>
+                  <a:pt x="11038163" y="511009"/>
+                </a:cubicBezTo>
+                <a:cubicBezTo>
+                  <a:pt x="11065988" y="553787"/>
+                  <a:pt x="11019613" y="553787"/>
+                  <a:pt x="11004154" y="568047"/>
+                </a:cubicBezTo>
+                <a:cubicBezTo>
+                  <a:pt x="10988696" y="582307"/>
+                  <a:pt x="10967053" y="593001"/>
+                  <a:pt x="10970146" y="625085"/>
+                </a:cubicBezTo>
+                <a:cubicBezTo>
+                  <a:pt x="11065988" y="639345"/>
+                  <a:pt x="11171107" y="589437"/>
+                  <a:pt x="11270042" y="589437"/>
+                </a:cubicBezTo>
+                <a:lnTo>
+                  <a:pt x="11270042" y="650039"/>
+                </a:lnTo>
+                <a:cubicBezTo>
+                  <a:pt x="11236032" y="671428"/>
+                  <a:pt x="11192750" y="678558"/>
+                  <a:pt x="11177291" y="721337"/>
+                </a:cubicBezTo>
+                <a:cubicBezTo>
+                  <a:pt x="11208207" y="714208"/>
+                  <a:pt x="11239125" y="710643"/>
+                  <a:pt x="11270042" y="703512"/>
+                </a:cubicBezTo>
+                <a:lnTo>
+                  <a:pt x="11282409" y="703512"/>
+                </a:lnTo>
+                <a:lnTo>
+                  <a:pt x="11282409" y="981574"/>
+                </a:lnTo>
+                <a:cubicBezTo>
+                  <a:pt x="9254245" y="2952959"/>
+                  <a:pt x="4397165" y="2906615"/>
+                  <a:pt x="4053985" y="2928005"/>
+                </a:cubicBezTo>
+                <a:cubicBezTo>
+                  <a:pt x="3945776" y="2935134"/>
+                  <a:pt x="3491294" y="2924439"/>
+                  <a:pt x="3386175" y="2892355"/>
+                </a:cubicBezTo>
+                <a:cubicBezTo>
+                  <a:pt x="3243956" y="2853141"/>
+                  <a:pt x="3228499" y="2774714"/>
+                  <a:pt x="3228499" y="2774714"/>
+                </a:cubicBezTo>
+                <a:cubicBezTo>
+                  <a:pt x="3228499" y="2774714"/>
+                  <a:pt x="3299608" y="2742630"/>
+                  <a:pt x="3389267" y="2717676"/>
+                </a:cubicBezTo>
+                <a:cubicBezTo>
+                  <a:pt x="3562404" y="2667768"/>
+                  <a:pt x="3704623" y="2575080"/>
+                  <a:pt x="3883942" y="2535866"/>
+                </a:cubicBezTo>
+                <a:cubicBezTo>
+                  <a:pt x="3723173" y="2546561"/>
+                  <a:pt x="3562404" y="2553691"/>
+                  <a:pt x="3401634" y="2564386"/>
+                </a:cubicBezTo>
+                <a:cubicBezTo>
+                  <a:pt x="3624237" y="2468133"/>
+                  <a:pt x="3859208" y="2453874"/>
+                  <a:pt x="4087994" y="2414660"/>
+                </a:cubicBezTo>
+                <a:cubicBezTo>
+                  <a:pt x="4162197" y="2403966"/>
+                  <a:pt x="4285864" y="2436049"/>
+                  <a:pt x="4285864" y="2336233"/>
+                </a:cubicBezTo>
+                <a:cubicBezTo>
+                  <a:pt x="4282774" y="2272064"/>
+                  <a:pt x="4162197" y="2300584"/>
+                  <a:pt x="4091088" y="2304149"/>
+                </a:cubicBezTo>
+                <a:cubicBezTo>
+                  <a:pt x="3775732" y="2314843"/>
+                  <a:pt x="3463469" y="2361187"/>
+                  <a:pt x="3148114" y="2400401"/>
+                </a:cubicBezTo>
+                <a:cubicBezTo>
+                  <a:pt x="3117196" y="2403966"/>
+                  <a:pt x="3080097" y="2421790"/>
+                  <a:pt x="3058455" y="2411095"/>
+                </a:cubicBezTo>
+                <a:cubicBezTo>
+                  <a:pt x="2879135" y="2339797"/>
+                  <a:pt x="2675082" y="2357622"/>
+                  <a:pt x="2443203" y="2336233"/>
+                </a:cubicBezTo>
+                <a:cubicBezTo>
+                  <a:pt x="2569963" y="2254241"/>
+                  <a:pt x="2678173" y="2311278"/>
+                  <a:pt x="2786383" y="2257805"/>
+                </a:cubicBezTo>
+                <a:cubicBezTo>
+                  <a:pt x="2653440" y="2200766"/>
+                  <a:pt x="2517405" y="2225722"/>
+                  <a:pt x="2390644" y="2211461"/>
+                </a:cubicBezTo>
+                <a:cubicBezTo>
+                  <a:pt x="2297893" y="2200766"/>
+                  <a:pt x="1963988" y="2186507"/>
+                  <a:pt x="1911429" y="2168683"/>
+                </a:cubicBezTo>
+                <a:cubicBezTo>
+                  <a:pt x="1750660" y="2115209"/>
+                  <a:pt x="1558974" y="2122339"/>
+                  <a:pt x="1416755" y="2026087"/>
+                </a:cubicBezTo>
+                <a:cubicBezTo>
+                  <a:pt x="1314728" y="1958354"/>
+                  <a:pt x="1178693" y="2015393"/>
+                  <a:pt x="1070483" y="1979743"/>
+                </a:cubicBezTo>
+                <a:cubicBezTo>
+                  <a:pt x="1024107" y="1929835"/>
+                  <a:pt x="1089033" y="1894186"/>
+                  <a:pt x="1104491" y="1854972"/>
+                </a:cubicBezTo>
+                <a:cubicBezTo>
+                  <a:pt x="1126133" y="1805064"/>
+                  <a:pt x="1067391" y="1794370"/>
+                  <a:pt x="1039566" y="1748026"/>
+                </a:cubicBezTo>
+                <a:cubicBezTo>
+                  <a:pt x="1231252" y="1751591"/>
+                  <a:pt x="1413663" y="1737331"/>
+                  <a:pt x="1623900" y="1694553"/>
+                </a:cubicBezTo>
+                <a:cubicBezTo>
+                  <a:pt x="1537332" y="1630384"/>
+                  <a:pt x="1463130" y="1690987"/>
+                  <a:pt x="1401296" y="1676728"/>
+                </a:cubicBezTo>
+                <a:cubicBezTo>
+                  <a:pt x="1358012" y="1666033"/>
+                  <a:pt x="1302362" y="1676728"/>
+                  <a:pt x="1302362" y="1623255"/>
+                </a:cubicBezTo>
+                <a:cubicBezTo>
+                  <a:pt x="1302362" y="1580476"/>
+                  <a:pt x="1351829" y="1573345"/>
+                  <a:pt x="1385838" y="1566216"/>
+                </a:cubicBezTo>
+                <a:cubicBezTo>
+                  <a:pt x="1518781" y="1541262"/>
+                  <a:pt x="1648633" y="1509178"/>
+                  <a:pt x="1756843" y="1377277"/>
+                </a:cubicBezTo>
+                <a:cubicBezTo>
+                  <a:pt x="1407480" y="1334499"/>
+                  <a:pt x="1048840" y="1502049"/>
+                  <a:pt x="721120" y="1387972"/>
+                </a:cubicBezTo>
+                <a:cubicBezTo>
+                  <a:pt x="748945" y="1313109"/>
+                  <a:pt x="813871" y="1327368"/>
+                  <a:pt x="857154" y="1323803"/>
+                </a:cubicBezTo>
+                <a:cubicBezTo>
+                  <a:pt x="1147775" y="1291720"/>
+                  <a:pt x="2127849" y="903147"/>
+                  <a:pt x="2285525" y="924536"/>
+                </a:cubicBezTo>
+                <a:cubicBezTo>
+                  <a:pt x="2381369" y="935231"/>
+                  <a:pt x="2480304" y="928101"/>
+                  <a:pt x="2569963" y="874628"/>
+                </a:cubicBezTo>
+                <a:cubicBezTo>
+                  <a:pt x="2678173" y="810460"/>
+                  <a:pt x="1988721" y="945926"/>
+                  <a:pt x="1803218" y="856803"/>
+                </a:cubicBezTo>
+                <a:cubicBezTo>
+                  <a:pt x="1713559" y="814024"/>
+                  <a:pt x="956090" y="689253"/>
+                  <a:pt x="625276" y="682124"/>
+                </a:cubicBezTo>
+                <a:cubicBezTo>
+                  <a:pt x="656194" y="614390"/>
+                  <a:pt x="770587" y="617955"/>
+                  <a:pt x="736578" y="521703"/>
+                </a:cubicBezTo>
+                <a:cubicBezTo>
+                  <a:pt x="557259" y="514574"/>
+                  <a:pt x="365573" y="575176"/>
+                  <a:pt x="155336" y="550222"/>
+                </a:cubicBezTo>
+                <a:cubicBezTo>
+                  <a:pt x="229537" y="464666"/>
+                  <a:pt x="337746" y="471795"/>
+                  <a:pt x="421223" y="425451"/>
+                </a:cubicBezTo>
+                <a:cubicBezTo>
+                  <a:pt x="356297" y="361283"/>
+                  <a:pt x="275913" y="400497"/>
+                  <a:pt x="201712" y="404062"/>
+                </a:cubicBezTo>
+                <a:cubicBezTo>
+                  <a:pt x="136786" y="407627"/>
+                  <a:pt x="-27075" y="318505"/>
+                  <a:pt x="3843" y="314939"/>
+                </a:cubicBezTo>
+                <a:cubicBezTo>
+                  <a:pt x="282096" y="293551"/>
+                  <a:pt x="551076" y="197299"/>
+                  <a:pt x="829329" y="175909"/>
+                </a:cubicBezTo>
+                <a:cubicBezTo>
+                  <a:pt x="922080" y="168779"/>
+                  <a:pt x="1027200" y="175909"/>
+                  <a:pt x="1045749" y="47572"/>
+                </a:cubicBezTo>
+                <a:cubicBezTo>
+                  <a:pt x="1048840" y="11924"/>
+                  <a:pt x="1039566" y="4795"/>
+                  <a:pt x="1172509" y="11924"/>
+                </a:cubicBezTo>
+                <a:cubicBezTo>
+                  <a:pt x="1198789" y="13707"/>
+                  <a:pt x="1228933" y="14598"/>
+                  <a:pt x="1257531" y="7914"/>
+                </a:cubicBezTo>
+                <a:close/>
+              </a:path>
+            </a:pathLst>
+          </a:custGeom>
+          <a:solidFill>
+            <a:srgbClr val="7BB11F">
+              <a:alpha val="20000"/>
+            </a:srgbClr>
+          </a:solidFill>
+          <a:ln w="32707" cap="flat">
+            <a:noFill/>
+            <a:prstDash val="solid"/>
+            <a:miter/>
+          </a:ln>
+        </p:spPr>
+        <p:txBody>
+          <a:bodyPr wrap="square" rtlCol="0" anchor="ctr">
+            <a:noAutofit/>
+          </a:bodyPr>
+          <a:lstStyle/>
+          <a:p>
+            <a:endParaRPr lang="en-US">
+              <a:solidFill>
+                <a:schemeClr val="tx1"/>
+              </a:solidFill>
+            </a:endParaRPr>
+          </a:p>
+        </p:txBody>
+      </p:sp>
+    </p:spTree>
+    <p:extLst>
+      <p:ext uri="{BB962C8B-B14F-4D97-AF65-F5344CB8AC3E}">
+        <p14:creationId xmlns:p14="http://schemas.microsoft.com/office/powerpoint/2010/main" val="1858874621"/>
+      </p:ext>
+    </p:extLst>
+  </p:cSld>
+  <p:clrMapOvr>
+    <a:masterClrMapping/>
+  </p:clrMapOvr>
+</p:sld>
+</file>
+
+<file path=ppt/slides/slide9.xml><?xml version="1.0" encoding="utf-8"?>
+<p:sld xmlns:a="http://schemas.openxmlformats.org/drawingml/2006/main" xmlns:r="http://schemas.openxmlformats.org/officeDocument/2006/relationships" xmlns:p="http://schemas.openxmlformats.org/presentationml/2006/main">
+  <p:cSld>
+    <p:spTree>
+      <p:nvGrpSpPr>
+        <p:cNvPr id="1" name=""/>
+        <p:cNvGrpSpPr/>
+        <p:nvPr/>
+      </p:nvGrpSpPr>
+      <p:grpSpPr>
+        <a:xfrm>
+          <a:off x="0" y="0"/>
+          <a:ext cx="0" cy="0"/>
+          <a:chOff x="0" y="0"/>
+          <a:chExt cx="0" cy="0"/>
+        </a:xfrm>
+      </p:grpSpPr>
+      <p:pic>
+        <p:nvPicPr>
+          <p:cNvPr id="8" name="Picture 7" descr="A group of people walking down a street next to a building&#10;&#10;Description automatically generated">
+            <a:extLst>
+              <a:ext uri="{FF2B5EF4-FFF2-40B4-BE49-F238E27FC236}">
+                <a16:creationId xmlns:a16="http://schemas.microsoft.com/office/drawing/2014/main" id="{3EC8018A-DB34-6D4A-85E9-E1504BD0E9CB}"/>
+              </a:ext>
+            </a:extLst>
+          </p:cNvPr>
+          <p:cNvPicPr>
+            <a:picLocks noChangeAspect="1"/>
+          </p:cNvPicPr>
+          <p:nvPr/>
+        </p:nvPicPr>
+        <p:blipFill>
+          <a:blip r:embed="rId2"/>
+          <a:stretch>
+            <a:fillRect/>
+          </a:stretch>
+        </p:blipFill>
+        <p:spPr>
+          <a:xfrm>
+            <a:off x="0" y="3175"/>
+            <a:ext cx="12192000" cy="6851650"/>
+          </a:xfrm>
+          <a:prstGeom prst="rect">
+            <a:avLst/>
+          </a:prstGeom>
+        </p:spPr>
+      </p:pic>
+    </p:spTree>
+    <p:extLst>
+      <p:ext uri="{BB962C8B-B14F-4D97-AF65-F5344CB8AC3E}">
+        <p14:creationId xmlns:p14="http://schemas.microsoft.com/office/powerpoint/2010/main" val="1748991663"/>
+      </p:ext>
+    </p:extLst>
+  </p:cSld>
+  <p:clrMapOvr>
+    <a:masterClrMapping/>
+  </p:clrMapOvr>
+</p:sld>
+</file>
+
 <file path=ppt/theme/theme1.xml><?xml version="1.0" encoding="utf-8"?>
 <a:theme xmlns:a="http://schemas.openxmlformats.org/drawingml/2006/main" name="BrushVTI">
   <a:themeElements>

</xml_diff>